<commit_message>
C_L_alpha em rad e plano de evacuação
</commit_message>
<xml_diff>
--- a/DesignDeAltoNivel.pptx
+++ b/DesignDeAltoNivel.pptx
@@ -7,6 +7,7 @@
   <p:sldIdLst>
     <p:sldId id="257" r:id="rId2"/>
     <p:sldId id="258" r:id="rId3"/>
+    <p:sldId id="259" r:id="rId4"/>
   </p:sldIdLst>
   <p:sldSz cx="12192000" cy="6858000"/>
   <p:notesSz cx="6858000" cy="9144000"/>
@@ -105,6 +106,11 @@
       </a:defRPr>
     </a:lvl9pPr>
   </p:defaultTextStyle>
+  <p:extLst>
+    <p:ext uri="{EFAFB233-063F-42B5-8137-9DF3F51BA10A}">
+      <p15:sldGuideLst xmlns:p15="http://schemas.microsoft.com/office/powerpoint/2012/main"/>
+    </p:ext>
+  </p:extLst>
 </p:presentation>
 </file>
 
@@ -255,7 +261,7 @@
           <a:p>
             <a:fld id="{4ED91E11-6E8C-46BE-9183-7EBA352FEBBF}" type="datetimeFigureOut">
               <a:rPr lang="pt-PT" smtClean="0"/>
-              <a:t>27/06/2022</a:t>
+              <a:t>28/06/2022</a:t>
             </a:fld>
             <a:endParaRPr lang="pt-PT" dirty="0"/>
           </a:p>
@@ -309,7 +315,7 @@
           <a:p>
             <a:fld id="{F079EAC3-D70F-48B7-ACC5-C0391A2F8C09}" type="slidenum">
               <a:rPr lang="pt-PT" smtClean="0"/>
-              <a:t>‹nº›</a:t>
+              <a:t>‹#›</a:t>
             </a:fld>
             <a:endParaRPr lang="pt-PT" dirty="0"/>
           </a:p>
@@ -453,7 +459,7 @@
           <a:p>
             <a:fld id="{4ED91E11-6E8C-46BE-9183-7EBA352FEBBF}" type="datetimeFigureOut">
               <a:rPr lang="pt-PT" smtClean="0"/>
-              <a:t>27/06/2022</a:t>
+              <a:t>28/06/2022</a:t>
             </a:fld>
             <a:endParaRPr lang="pt-PT" dirty="0"/>
           </a:p>
@@ -507,7 +513,7 @@
           <a:p>
             <a:fld id="{F079EAC3-D70F-48B7-ACC5-C0391A2F8C09}" type="slidenum">
               <a:rPr lang="pt-PT" smtClean="0"/>
-              <a:t>‹nº›</a:t>
+              <a:t>‹#›</a:t>
             </a:fld>
             <a:endParaRPr lang="pt-PT" dirty="0"/>
           </a:p>
@@ -661,7 +667,7 @@
           <a:p>
             <a:fld id="{4ED91E11-6E8C-46BE-9183-7EBA352FEBBF}" type="datetimeFigureOut">
               <a:rPr lang="pt-PT" smtClean="0"/>
-              <a:t>27/06/2022</a:t>
+              <a:t>28/06/2022</a:t>
             </a:fld>
             <a:endParaRPr lang="pt-PT" dirty="0"/>
           </a:p>
@@ -715,7 +721,7 @@
           <a:p>
             <a:fld id="{F079EAC3-D70F-48B7-ACC5-C0391A2F8C09}" type="slidenum">
               <a:rPr lang="pt-PT" smtClean="0"/>
-              <a:t>‹nº›</a:t>
+              <a:t>‹#›</a:t>
             </a:fld>
             <a:endParaRPr lang="pt-PT" dirty="0"/>
           </a:p>
@@ -859,7 +865,7 @@
           <a:p>
             <a:fld id="{4ED91E11-6E8C-46BE-9183-7EBA352FEBBF}" type="datetimeFigureOut">
               <a:rPr lang="pt-PT" smtClean="0"/>
-              <a:t>27/06/2022</a:t>
+              <a:t>28/06/2022</a:t>
             </a:fld>
             <a:endParaRPr lang="pt-PT" dirty="0"/>
           </a:p>
@@ -913,7 +919,7 @@
           <a:p>
             <a:fld id="{F079EAC3-D70F-48B7-ACC5-C0391A2F8C09}" type="slidenum">
               <a:rPr lang="pt-PT" smtClean="0"/>
-              <a:t>‹nº›</a:t>
+              <a:t>‹#›</a:t>
             </a:fld>
             <a:endParaRPr lang="pt-PT" dirty="0"/>
           </a:p>
@@ -1134,7 +1140,7 @@
           <a:p>
             <a:fld id="{4ED91E11-6E8C-46BE-9183-7EBA352FEBBF}" type="datetimeFigureOut">
               <a:rPr lang="pt-PT" smtClean="0"/>
-              <a:t>27/06/2022</a:t>
+              <a:t>28/06/2022</a:t>
             </a:fld>
             <a:endParaRPr lang="pt-PT" dirty="0"/>
           </a:p>
@@ -1188,7 +1194,7 @@
           <a:p>
             <a:fld id="{F079EAC3-D70F-48B7-ACC5-C0391A2F8C09}" type="slidenum">
               <a:rPr lang="pt-PT" smtClean="0"/>
-              <a:t>‹nº›</a:t>
+              <a:t>‹#›</a:t>
             </a:fld>
             <a:endParaRPr lang="pt-PT" dirty="0"/>
           </a:p>
@@ -1399,7 +1405,7 @@
           <a:p>
             <a:fld id="{4ED91E11-6E8C-46BE-9183-7EBA352FEBBF}" type="datetimeFigureOut">
               <a:rPr lang="pt-PT" smtClean="0"/>
-              <a:t>27/06/2022</a:t>
+              <a:t>28/06/2022</a:t>
             </a:fld>
             <a:endParaRPr lang="pt-PT" dirty="0"/>
           </a:p>
@@ -1453,7 +1459,7 @@
           <a:p>
             <a:fld id="{F079EAC3-D70F-48B7-ACC5-C0391A2F8C09}" type="slidenum">
               <a:rPr lang="pt-PT" smtClean="0"/>
-              <a:t>‹nº›</a:t>
+              <a:t>‹#›</a:t>
             </a:fld>
             <a:endParaRPr lang="pt-PT" dirty="0"/>
           </a:p>
@@ -1811,7 +1817,7 @@
           <a:p>
             <a:fld id="{4ED91E11-6E8C-46BE-9183-7EBA352FEBBF}" type="datetimeFigureOut">
               <a:rPr lang="pt-PT" smtClean="0"/>
-              <a:t>27/06/2022</a:t>
+              <a:t>28/06/2022</a:t>
             </a:fld>
             <a:endParaRPr lang="pt-PT" dirty="0"/>
           </a:p>
@@ -1865,7 +1871,7 @@
           <a:p>
             <a:fld id="{F079EAC3-D70F-48B7-ACC5-C0391A2F8C09}" type="slidenum">
               <a:rPr lang="pt-PT" smtClean="0"/>
-              <a:t>‹nº›</a:t>
+              <a:t>‹#›</a:t>
             </a:fld>
             <a:endParaRPr lang="pt-PT" dirty="0"/>
           </a:p>
@@ -1952,7 +1958,7 @@
           <a:p>
             <a:fld id="{4ED91E11-6E8C-46BE-9183-7EBA352FEBBF}" type="datetimeFigureOut">
               <a:rPr lang="pt-PT" smtClean="0"/>
-              <a:t>27/06/2022</a:t>
+              <a:t>28/06/2022</a:t>
             </a:fld>
             <a:endParaRPr lang="pt-PT" dirty="0"/>
           </a:p>
@@ -2006,7 +2012,7 @@
           <a:p>
             <a:fld id="{F079EAC3-D70F-48B7-ACC5-C0391A2F8C09}" type="slidenum">
               <a:rPr lang="pt-PT" smtClean="0"/>
-              <a:t>‹nº›</a:t>
+              <a:t>‹#›</a:t>
             </a:fld>
             <a:endParaRPr lang="pt-PT" dirty="0"/>
           </a:p>
@@ -2065,7 +2071,7 @@
           <a:p>
             <a:fld id="{4ED91E11-6E8C-46BE-9183-7EBA352FEBBF}" type="datetimeFigureOut">
               <a:rPr lang="pt-PT" smtClean="0"/>
-              <a:t>27/06/2022</a:t>
+              <a:t>28/06/2022</a:t>
             </a:fld>
             <a:endParaRPr lang="pt-PT" dirty="0"/>
           </a:p>
@@ -2119,7 +2125,7 @@
           <a:p>
             <a:fld id="{F079EAC3-D70F-48B7-ACC5-C0391A2F8C09}" type="slidenum">
               <a:rPr lang="pt-PT" smtClean="0"/>
-              <a:t>‹nº›</a:t>
+              <a:t>‹#›</a:t>
             </a:fld>
             <a:endParaRPr lang="pt-PT" dirty="0"/>
           </a:p>
@@ -2376,7 +2382,7 @@
           <a:p>
             <a:fld id="{4ED91E11-6E8C-46BE-9183-7EBA352FEBBF}" type="datetimeFigureOut">
               <a:rPr lang="pt-PT" smtClean="0"/>
-              <a:t>27/06/2022</a:t>
+              <a:t>28/06/2022</a:t>
             </a:fld>
             <a:endParaRPr lang="pt-PT" dirty="0"/>
           </a:p>
@@ -2430,7 +2436,7 @@
           <a:p>
             <a:fld id="{F079EAC3-D70F-48B7-ACC5-C0391A2F8C09}" type="slidenum">
               <a:rPr lang="pt-PT" smtClean="0"/>
-              <a:t>‹nº›</a:t>
+              <a:t>‹#›</a:t>
             </a:fld>
             <a:endParaRPr lang="pt-PT" dirty="0"/>
           </a:p>
@@ -2664,7 +2670,7 @@
           <a:p>
             <a:fld id="{4ED91E11-6E8C-46BE-9183-7EBA352FEBBF}" type="datetimeFigureOut">
               <a:rPr lang="pt-PT" smtClean="0"/>
-              <a:t>27/06/2022</a:t>
+              <a:t>28/06/2022</a:t>
             </a:fld>
             <a:endParaRPr lang="pt-PT" dirty="0"/>
           </a:p>
@@ -2718,7 +2724,7 @@
           <a:p>
             <a:fld id="{F079EAC3-D70F-48B7-ACC5-C0391A2F8C09}" type="slidenum">
               <a:rPr lang="pt-PT" smtClean="0"/>
-              <a:t>‹nº›</a:t>
+              <a:t>‹#›</a:t>
             </a:fld>
             <a:endParaRPr lang="pt-PT" dirty="0"/>
           </a:p>
@@ -2905,7 +2911,7 @@
           <a:p>
             <a:fld id="{4ED91E11-6E8C-46BE-9183-7EBA352FEBBF}" type="datetimeFigureOut">
               <a:rPr lang="pt-PT" smtClean="0"/>
-              <a:t>27/06/2022</a:t>
+              <a:t>28/06/2022</a:t>
             </a:fld>
             <a:endParaRPr lang="pt-PT" dirty="0"/>
           </a:p>
@@ -2995,7 +3001,7 @@
           <a:p>
             <a:fld id="{F079EAC3-D70F-48B7-ACC5-C0391A2F8C09}" type="slidenum">
               <a:rPr lang="pt-PT" smtClean="0"/>
-              <a:t>‹nº›</a:t>
+              <a:t>‹#›</a:t>
             </a:fld>
             <a:endParaRPr lang="pt-PT" dirty="0"/>
           </a:p>
@@ -3336,7 +3342,7 @@
         </p:nvGrpSpPr>
         <p:grpSpPr>
           <a:xfrm>
-            <a:off x="2124236" y="803945"/>
+            <a:off x="2157188" y="820421"/>
             <a:ext cx="6737856" cy="5358158"/>
             <a:chOff x="2124236" y="803945"/>
             <a:chExt cx="6737856" cy="5358158"/>
@@ -5727,7 +5733,7 @@
               <a:pPr algn="ctr"/>
               <a:r>
                 <a:rPr lang="pt-PT" sz="1200" dirty="0"/>
-                <a:t>Bagage</a:t>
+                <a:t>Baggage</a:t>
               </a:r>
             </a:p>
           </p:txBody>
@@ -6528,7 +6534,7 @@
               </a:r>
               <a:r>
                 <a:rPr lang="pt-PT" sz="800" dirty="0"/>
-                <a:t>Electric Motor</a:t>
+                <a:t>Electric Rotor</a:t>
               </a:r>
             </a:p>
           </p:txBody>
@@ -8876,6 +8882,2107 @@
 </p:sld>
 </file>
 
+<file path=ppt/slides/slide3.xml><?xml version="1.0" encoding="utf-8"?>
+<p:sld xmlns:a="http://schemas.openxmlformats.org/drawingml/2006/main" xmlns:r="http://schemas.openxmlformats.org/officeDocument/2006/relationships" xmlns:p="http://schemas.openxmlformats.org/presentationml/2006/main">
+  <p:cSld>
+    <p:spTree>
+      <p:nvGrpSpPr>
+        <p:cNvPr id="1" name=""/>
+        <p:cNvGrpSpPr/>
+        <p:nvPr/>
+      </p:nvGrpSpPr>
+      <p:grpSpPr>
+        <a:xfrm>
+          <a:off x="0" y="0"/>
+          <a:ext cx="0" cy="0"/>
+          <a:chOff x="0" y="0"/>
+          <a:chExt cx="0" cy="0"/>
+        </a:xfrm>
+      </p:grpSpPr>
+      <p:grpSp>
+        <p:nvGrpSpPr>
+          <p:cNvPr id="112" name="Agrupar 111">
+            <a:extLst>
+              <a:ext uri="{FF2B5EF4-FFF2-40B4-BE49-F238E27FC236}">
+                <a16:creationId xmlns:a16="http://schemas.microsoft.com/office/drawing/2014/main" id="{CB3BEEB5-D039-7BAA-4AE4-476AA991CF53}"/>
+              </a:ext>
+            </a:extLst>
+          </p:cNvPr>
+          <p:cNvGrpSpPr/>
+          <p:nvPr/>
+        </p:nvGrpSpPr>
+        <p:grpSpPr>
+          <a:xfrm>
+            <a:off x="2237954" y="820421"/>
+            <a:ext cx="6657090" cy="4723095"/>
+            <a:chOff x="2205002" y="803945"/>
+            <a:chExt cx="6657090" cy="4723095"/>
+          </a:xfrm>
+        </p:grpSpPr>
+        <p:grpSp>
+          <p:nvGrpSpPr>
+            <p:cNvPr id="13" name="Agrupar 12">
+              <a:extLst>
+                <a:ext uri="{FF2B5EF4-FFF2-40B4-BE49-F238E27FC236}">
+                  <a16:creationId xmlns:a16="http://schemas.microsoft.com/office/drawing/2014/main" id="{7D681D2C-1226-68D3-E858-81DF708ADBF9}"/>
+                </a:ext>
+              </a:extLst>
+            </p:cNvPr>
+            <p:cNvGrpSpPr/>
+            <p:nvPr/>
+          </p:nvGrpSpPr>
+          <p:grpSpPr>
+            <a:xfrm flipH="1">
+              <a:off x="3089239" y="1848232"/>
+              <a:ext cx="5538906" cy="3678808"/>
+              <a:chOff x="3203563" y="990982"/>
+              <a:chExt cx="5538906" cy="3678808"/>
+            </a:xfrm>
+          </p:grpSpPr>
+          <p:sp>
+            <p:nvSpPr>
+              <p:cNvPr id="8" name="Retângulo 7">
+                <a:extLst>
+                  <a:ext uri="{FF2B5EF4-FFF2-40B4-BE49-F238E27FC236}">
+                    <a16:creationId xmlns:a16="http://schemas.microsoft.com/office/drawing/2014/main" id="{9E6BDAEE-2DF3-B4FD-6729-0E9FE57D7A76}"/>
+                  </a:ext>
+                </a:extLst>
+              </p:cNvPr>
+              <p:cNvSpPr/>
+              <p:nvPr/>
+            </p:nvSpPr>
+            <p:spPr>
+              <a:xfrm>
+                <a:off x="3510280" y="990982"/>
+                <a:ext cx="1226820" cy="3337178"/>
+              </a:xfrm>
+              <a:prstGeom prst="rect">
+                <a:avLst/>
+              </a:prstGeom>
+              <a:solidFill>
+                <a:schemeClr val="bg2">
+                  <a:lumMod val="90000"/>
+                </a:schemeClr>
+              </a:solidFill>
+              <a:ln>
+                <a:solidFill>
+                  <a:schemeClr val="bg2">
+                    <a:lumMod val="50000"/>
+                  </a:schemeClr>
+                </a:solidFill>
+              </a:ln>
+            </p:spPr>
+            <p:style>
+              <a:lnRef idx="2">
+                <a:schemeClr val="accent1">
+                  <a:shade val="50000"/>
+                </a:schemeClr>
+              </a:lnRef>
+              <a:fillRef idx="1">
+                <a:schemeClr val="accent1"/>
+              </a:fillRef>
+              <a:effectRef idx="0">
+                <a:schemeClr val="accent1"/>
+              </a:effectRef>
+              <a:fontRef idx="minor">
+                <a:schemeClr val="lt1"/>
+              </a:fontRef>
+            </p:style>
+            <p:txBody>
+              <a:bodyPr rtlCol="0" anchor="ctr"/>
+              <a:lstStyle/>
+              <a:p>
+                <a:pPr algn="ctr"/>
+                <a:endParaRPr lang="pt-PT" dirty="0"/>
+              </a:p>
+            </p:txBody>
+          </p:sp>
+          <p:sp>
+            <p:nvSpPr>
+              <p:cNvPr id="9" name="Retângulo 8">
+                <a:extLst>
+                  <a:ext uri="{FF2B5EF4-FFF2-40B4-BE49-F238E27FC236}">
+                    <a16:creationId xmlns:a16="http://schemas.microsoft.com/office/drawing/2014/main" id="{064401E6-1760-7B57-FA17-A25A90420738}"/>
+                  </a:ext>
+                </a:extLst>
+              </p:cNvPr>
+              <p:cNvSpPr/>
+              <p:nvPr/>
+            </p:nvSpPr>
+            <p:spPr>
+              <a:xfrm>
+                <a:off x="6173966" y="990982"/>
+                <a:ext cx="1226820" cy="3337178"/>
+              </a:xfrm>
+              <a:prstGeom prst="rect">
+                <a:avLst/>
+              </a:prstGeom>
+              <a:solidFill>
+                <a:schemeClr val="bg2">
+                  <a:lumMod val="90000"/>
+                </a:schemeClr>
+              </a:solidFill>
+              <a:ln>
+                <a:solidFill>
+                  <a:schemeClr val="bg2">
+                    <a:lumMod val="50000"/>
+                  </a:schemeClr>
+                </a:solidFill>
+              </a:ln>
+            </p:spPr>
+            <p:style>
+              <a:lnRef idx="2">
+                <a:schemeClr val="accent1">
+                  <a:shade val="50000"/>
+                </a:schemeClr>
+              </a:lnRef>
+              <a:fillRef idx="1">
+                <a:schemeClr val="accent1"/>
+              </a:fillRef>
+              <a:effectRef idx="0">
+                <a:schemeClr val="accent1"/>
+              </a:effectRef>
+              <a:fontRef idx="minor">
+                <a:schemeClr val="lt1"/>
+              </a:fontRef>
+            </p:style>
+            <p:txBody>
+              <a:bodyPr rtlCol="0" anchor="ctr"/>
+              <a:lstStyle/>
+              <a:p>
+                <a:pPr algn="ctr"/>
+                <a:endParaRPr lang="pt-PT" dirty="0"/>
+              </a:p>
+            </p:txBody>
+          </p:sp>
+          <p:sp>
+            <p:nvSpPr>
+              <p:cNvPr id="6" name="Retângulo 5">
+                <a:extLst>
+                  <a:ext uri="{FF2B5EF4-FFF2-40B4-BE49-F238E27FC236}">
+                    <a16:creationId xmlns:a16="http://schemas.microsoft.com/office/drawing/2014/main" id="{A8A3E4C9-41B0-CAE7-7F23-19CECA504009}"/>
+                  </a:ext>
+                </a:extLst>
+              </p:cNvPr>
+              <p:cNvSpPr/>
+              <p:nvPr/>
+            </p:nvSpPr>
+            <p:spPr>
+              <a:xfrm>
+                <a:off x="4119217" y="3269974"/>
+                <a:ext cx="3988905" cy="1393466"/>
+              </a:xfrm>
+              <a:prstGeom prst="rect">
+                <a:avLst/>
+              </a:prstGeom>
+              <a:solidFill>
+                <a:schemeClr val="bg2">
+                  <a:lumMod val="90000"/>
+                </a:schemeClr>
+              </a:solidFill>
+              <a:ln>
+                <a:solidFill>
+                  <a:schemeClr val="bg2">
+                    <a:lumMod val="50000"/>
+                  </a:schemeClr>
+                </a:solidFill>
+              </a:ln>
+            </p:spPr>
+            <p:style>
+              <a:lnRef idx="2">
+                <a:schemeClr val="accent1">
+                  <a:shade val="50000"/>
+                </a:schemeClr>
+              </a:lnRef>
+              <a:fillRef idx="1">
+                <a:schemeClr val="accent1"/>
+              </a:fillRef>
+              <a:effectRef idx="0">
+                <a:schemeClr val="accent1"/>
+              </a:effectRef>
+              <a:fontRef idx="minor">
+                <a:schemeClr val="lt1"/>
+              </a:fontRef>
+            </p:style>
+            <p:txBody>
+              <a:bodyPr rtlCol="0" anchor="ctr"/>
+              <a:lstStyle/>
+              <a:p>
+                <a:pPr algn="ctr"/>
+                <a:endParaRPr lang="pt-PT" dirty="0"/>
+              </a:p>
+            </p:txBody>
+          </p:sp>
+          <p:sp>
+            <p:nvSpPr>
+              <p:cNvPr id="7" name="Fluxograma: Atraso 6">
+                <a:extLst>
+                  <a:ext uri="{FF2B5EF4-FFF2-40B4-BE49-F238E27FC236}">
+                    <a16:creationId xmlns:a16="http://schemas.microsoft.com/office/drawing/2014/main" id="{A6DF496E-F81E-8138-F775-0BB5981FBC7C}"/>
+                  </a:ext>
+                </a:extLst>
+              </p:cNvPr>
+              <p:cNvSpPr/>
+              <p:nvPr/>
+            </p:nvSpPr>
+            <p:spPr>
+              <a:xfrm flipH="1">
+                <a:off x="3203563" y="3269974"/>
+                <a:ext cx="915654" cy="1393466"/>
+              </a:xfrm>
+              <a:custGeom>
+                <a:avLst/>
+                <a:gdLst>
+                  <a:gd name="connsiteX0" fmla="*/ 0 w 915642"/>
+                  <a:gd name="connsiteY0" fmla="*/ 0 h 1393466"/>
+                  <a:gd name="connsiteX1" fmla="*/ 457821 w 915642"/>
+                  <a:gd name="connsiteY1" fmla="*/ 0 h 1393466"/>
+                  <a:gd name="connsiteX2" fmla="*/ 915642 w 915642"/>
+                  <a:gd name="connsiteY2" fmla="*/ 696733 h 1393466"/>
+                  <a:gd name="connsiteX3" fmla="*/ 457821 w 915642"/>
+                  <a:gd name="connsiteY3" fmla="*/ 1393466 h 1393466"/>
+                  <a:gd name="connsiteX4" fmla="*/ 0 w 915642"/>
+                  <a:gd name="connsiteY4" fmla="*/ 1393466 h 1393466"/>
+                  <a:gd name="connsiteX5" fmla="*/ 0 w 915642"/>
+                  <a:gd name="connsiteY5" fmla="*/ 0 h 1393466"/>
+                  <a:gd name="connsiteX0" fmla="*/ 0 w 921802"/>
+                  <a:gd name="connsiteY0" fmla="*/ 0 h 1393466"/>
+                  <a:gd name="connsiteX1" fmla="*/ 162546 w 921802"/>
+                  <a:gd name="connsiteY1" fmla="*/ 9525 h 1393466"/>
+                  <a:gd name="connsiteX2" fmla="*/ 915642 w 921802"/>
+                  <a:gd name="connsiteY2" fmla="*/ 696733 h 1393466"/>
+                  <a:gd name="connsiteX3" fmla="*/ 457821 w 921802"/>
+                  <a:gd name="connsiteY3" fmla="*/ 1393466 h 1393466"/>
+                  <a:gd name="connsiteX4" fmla="*/ 0 w 921802"/>
+                  <a:gd name="connsiteY4" fmla="*/ 1393466 h 1393466"/>
+                  <a:gd name="connsiteX5" fmla="*/ 0 w 921802"/>
+                  <a:gd name="connsiteY5" fmla="*/ 0 h 1393466"/>
+                  <a:gd name="connsiteX0" fmla="*/ 0 w 917247"/>
+                  <a:gd name="connsiteY0" fmla="*/ 0 h 1393466"/>
+                  <a:gd name="connsiteX1" fmla="*/ 319709 w 917247"/>
+                  <a:gd name="connsiteY1" fmla="*/ 4762 h 1393466"/>
+                  <a:gd name="connsiteX2" fmla="*/ 915642 w 917247"/>
+                  <a:gd name="connsiteY2" fmla="*/ 696733 h 1393466"/>
+                  <a:gd name="connsiteX3" fmla="*/ 457821 w 917247"/>
+                  <a:gd name="connsiteY3" fmla="*/ 1393466 h 1393466"/>
+                  <a:gd name="connsiteX4" fmla="*/ 0 w 917247"/>
+                  <a:gd name="connsiteY4" fmla="*/ 1393466 h 1393466"/>
+                  <a:gd name="connsiteX5" fmla="*/ 0 w 917247"/>
+                  <a:gd name="connsiteY5" fmla="*/ 0 h 1393466"/>
+                  <a:gd name="connsiteX0" fmla="*/ 0 w 917247"/>
+                  <a:gd name="connsiteY0" fmla="*/ 0 h 1395582"/>
+                  <a:gd name="connsiteX1" fmla="*/ 319709 w 917247"/>
+                  <a:gd name="connsiteY1" fmla="*/ 4762 h 1395582"/>
+                  <a:gd name="connsiteX2" fmla="*/ 915642 w 917247"/>
+                  <a:gd name="connsiteY2" fmla="*/ 696733 h 1395582"/>
+                  <a:gd name="connsiteX3" fmla="*/ 457821 w 917247"/>
+                  <a:gd name="connsiteY3" fmla="*/ 1393466 h 1395582"/>
+                  <a:gd name="connsiteX4" fmla="*/ 0 w 917247"/>
+                  <a:gd name="connsiteY4" fmla="*/ 1393466 h 1395582"/>
+                  <a:gd name="connsiteX5" fmla="*/ 0 w 917247"/>
+                  <a:gd name="connsiteY5" fmla="*/ 0 h 1395582"/>
+                  <a:gd name="connsiteX0" fmla="*/ 0 w 916004"/>
+                  <a:gd name="connsiteY0" fmla="*/ 0 h 1395582"/>
+                  <a:gd name="connsiteX1" fmla="*/ 319709 w 916004"/>
+                  <a:gd name="connsiteY1" fmla="*/ 4762 h 1395582"/>
+                  <a:gd name="connsiteX2" fmla="*/ 915642 w 916004"/>
+                  <a:gd name="connsiteY2" fmla="*/ 696733 h 1395582"/>
+                  <a:gd name="connsiteX3" fmla="*/ 391146 w 916004"/>
+                  <a:gd name="connsiteY3" fmla="*/ 1393466 h 1395582"/>
+                  <a:gd name="connsiteX4" fmla="*/ 0 w 916004"/>
+                  <a:gd name="connsiteY4" fmla="*/ 1393466 h 1395582"/>
+                  <a:gd name="connsiteX5" fmla="*/ 0 w 916004"/>
+                  <a:gd name="connsiteY5" fmla="*/ 0 h 1395582"/>
+                  <a:gd name="connsiteX0" fmla="*/ 0 w 915678"/>
+                  <a:gd name="connsiteY0" fmla="*/ 0 h 1399561"/>
+                  <a:gd name="connsiteX1" fmla="*/ 319709 w 915678"/>
+                  <a:gd name="connsiteY1" fmla="*/ 4762 h 1399561"/>
+                  <a:gd name="connsiteX2" fmla="*/ 915642 w 915678"/>
+                  <a:gd name="connsiteY2" fmla="*/ 696733 h 1399561"/>
+                  <a:gd name="connsiteX3" fmla="*/ 343521 w 915678"/>
+                  <a:gd name="connsiteY3" fmla="*/ 1398228 h 1399561"/>
+                  <a:gd name="connsiteX4" fmla="*/ 0 w 915678"/>
+                  <a:gd name="connsiteY4" fmla="*/ 1393466 h 1399561"/>
+                  <a:gd name="connsiteX5" fmla="*/ 0 w 915678"/>
+                  <a:gd name="connsiteY5" fmla="*/ 0 h 1399561"/>
+                  <a:gd name="connsiteX0" fmla="*/ 0 w 915654"/>
+                  <a:gd name="connsiteY0" fmla="*/ 0 h 1393466"/>
+                  <a:gd name="connsiteX1" fmla="*/ 319709 w 915654"/>
+                  <a:gd name="connsiteY1" fmla="*/ 4762 h 1393466"/>
+                  <a:gd name="connsiteX2" fmla="*/ 915642 w 915654"/>
+                  <a:gd name="connsiteY2" fmla="*/ 696733 h 1393466"/>
+                  <a:gd name="connsiteX3" fmla="*/ 333996 w 915654"/>
+                  <a:gd name="connsiteY3" fmla="*/ 1391878 h 1393466"/>
+                  <a:gd name="connsiteX4" fmla="*/ 0 w 915654"/>
+                  <a:gd name="connsiteY4" fmla="*/ 1393466 h 1393466"/>
+                  <a:gd name="connsiteX5" fmla="*/ 0 w 915654"/>
+                  <a:gd name="connsiteY5" fmla="*/ 0 h 1393466"/>
+                </a:gdLst>
+                <a:ahLst/>
+                <a:cxnLst>
+                  <a:cxn ang="0">
+                    <a:pos x="connsiteX0" y="connsiteY0"/>
+                  </a:cxn>
+                  <a:cxn ang="0">
+                    <a:pos x="connsiteX1" y="connsiteY1"/>
+                  </a:cxn>
+                  <a:cxn ang="0">
+                    <a:pos x="connsiteX2" y="connsiteY2"/>
+                  </a:cxn>
+                  <a:cxn ang="0">
+                    <a:pos x="connsiteX3" y="connsiteY3"/>
+                  </a:cxn>
+                  <a:cxn ang="0">
+                    <a:pos x="connsiteX4" y="connsiteY4"/>
+                  </a:cxn>
+                  <a:cxn ang="0">
+                    <a:pos x="connsiteX5" y="connsiteY5"/>
+                  </a:cxn>
+                </a:cxnLst>
+                <a:rect l="l" t="t" r="r" b="b"/>
+                <a:pathLst>
+                  <a:path w="915654" h="1393466">
+                    <a:moveTo>
+                      <a:pt x="0" y="0"/>
+                    </a:moveTo>
+                    <a:cubicBezTo>
+                      <a:pt x="152607" y="0"/>
+                      <a:pt x="167102" y="4762"/>
+                      <a:pt x="319709" y="4762"/>
+                    </a:cubicBezTo>
+                    <a:cubicBezTo>
+                      <a:pt x="572557" y="4762"/>
+                      <a:pt x="913261" y="465547"/>
+                      <a:pt x="915642" y="696733"/>
+                    </a:cubicBezTo>
+                    <a:cubicBezTo>
+                      <a:pt x="918023" y="927919"/>
+                      <a:pt x="586844" y="1391878"/>
+                      <a:pt x="333996" y="1391878"/>
+                    </a:cubicBezTo>
+                    <a:lnTo>
+                      <a:pt x="0" y="1393466"/>
+                    </a:lnTo>
+                    <a:lnTo>
+                      <a:pt x="0" y="0"/>
+                    </a:lnTo>
+                    <a:close/>
+                  </a:path>
+                </a:pathLst>
+              </a:custGeom>
+              <a:solidFill>
+                <a:schemeClr val="bg2">
+                  <a:lumMod val="90000"/>
+                </a:schemeClr>
+              </a:solidFill>
+              <a:ln>
+                <a:solidFill>
+                  <a:schemeClr val="bg2">
+                    <a:lumMod val="50000"/>
+                  </a:schemeClr>
+                </a:solidFill>
+              </a:ln>
+            </p:spPr>
+            <p:style>
+              <a:lnRef idx="2">
+                <a:schemeClr val="accent1">
+                  <a:shade val="50000"/>
+                </a:schemeClr>
+              </a:lnRef>
+              <a:fillRef idx="1">
+                <a:schemeClr val="accent1"/>
+              </a:fillRef>
+              <a:effectRef idx="0">
+                <a:schemeClr val="accent1"/>
+              </a:effectRef>
+              <a:fontRef idx="minor">
+                <a:schemeClr val="lt1"/>
+              </a:fontRef>
+            </p:style>
+            <p:txBody>
+              <a:bodyPr rtlCol="0" anchor="ctr"/>
+              <a:lstStyle/>
+              <a:p>
+                <a:pPr algn="ctr"/>
+                <a:endParaRPr lang="pt-PT" dirty="0"/>
+              </a:p>
+            </p:txBody>
+          </p:sp>
+          <p:sp>
+            <p:nvSpPr>
+              <p:cNvPr id="10" name="Fluxograma: Atraso 9">
+                <a:extLst>
+                  <a:ext uri="{FF2B5EF4-FFF2-40B4-BE49-F238E27FC236}">
+                    <a16:creationId xmlns:a16="http://schemas.microsoft.com/office/drawing/2014/main" id="{A0E66709-B77D-F6EA-3038-FEA15EC45FDC}"/>
+                  </a:ext>
+                </a:extLst>
+              </p:cNvPr>
+              <p:cNvSpPr/>
+              <p:nvPr/>
+            </p:nvSpPr>
+            <p:spPr>
+              <a:xfrm>
+                <a:off x="8108124" y="3263624"/>
+                <a:ext cx="634345" cy="1406166"/>
+              </a:xfrm>
+              <a:custGeom>
+                <a:avLst/>
+                <a:gdLst>
+                  <a:gd name="connsiteX0" fmla="*/ 0 w 608937"/>
+                  <a:gd name="connsiteY0" fmla="*/ 0 h 1393466"/>
+                  <a:gd name="connsiteX1" fmla="*/ 304469 w 608937"/>
+                  <a:gd name="connsiteY1" fmla="*/ 0 h 1393466"/>
+                  <a:gd name="connsiteX2" fmla="*/ 608938 w 608937"/>
+                  <a:gd name="connsiteY2" fmla="*/ 696733 h 1393466"/>
+                  <a:gd name="connsiteX3" fmla="*/ 304469 w 608937"/>
+                  <a:gd name="connsiteY3" fmla="*/ 1393466 h 1393466"/>
+                  <a:gd name="connsiteX4" fmla="*/ 0 w 608937"/>
+                  <a:gd name="connsiteY4" fmla="*/ 1393466 h 1393466"/>
+                  <a:gd name="connsiteX5" fmla="*/ 0 w 608937"/>
+                  <a:gd name="connsiteY5" fmla="*/ 0 h 1393466"/>
+                  <a:gd name="connsiteX0" fmla="*/ 0 w 634338"/>
+                  <a:gd name="connsiteY0" fmla="*/ 0 h 1393466"/>
+                  <a:gd name="connsiteX1" fmla="*/ 304469 w 634338"/>
+                  <a:gd name="connsiteY1" fmla="*/ 0 h 1393466"/>
+                  <a:gd name="connsiteX2" fmla="*/ 634338 w 634338"/>
+                  <a:gd name="connsiteY2" fmla="*/ 696733 h 1393466"/>
+                  <a:gd name="connsiteX3" fmla="*/ 304469 w 634338"/>
+                  <a:gd name="connsiteY3" fmla="*/ 1393466 h 1393466"/>
+                  <a:gd name="connsiteX4" fmla="*/ 0 w 634338"/>
+                  <a:gd name="connsiteY4" fmla="*/ 1393466 h 1393466"/>
+                  <a:gd name="connsiteX5" fmla="*/ 0 w 634338"/>
+                  <a:gd name="connsiteY5" fmla="*/ 0 h 1393466"/>
+                  <a:gd name="connsiteX0" fmla="*/ 0 w 635654"/>
+                  <a:gd name="connsiteY0" fmla="*/ 0 h 1399816"/>
+                  <a:gd name="connsiteX1" fmla="*/ 304469 w 635654"/>
+                  <a:gd name="connsiteY1" fmla="*/ 0 h 1399816"/>
+                  <a:gd name="connsiteX2" fmla="*/ 634338 w 635654"/>
+                  <a:gd name="connsiteY2" fmla="*/ 696733 h 1399816"/>
+                  <a:gd name="connsiteX3" fmla="*/ 193344 w 635654"/>
+                  <a:gd name="connsiteY3" fmla="*/ 1399816 h 1399816"/>
+                  <a:gd name="connsiteX4" fmla="*/ 0 w 635654"/>
+                  <a:gd name="connsiteY4" fmla="*/ 1393466 h 1399816"/>
+                  <a:gd name="connsiteX5" fmla="*/ 0 w 635654"/>
+                  <a:gd name="connsiteY5" fmla="*/ 0 h 1399816"/>
+                  <a:gd name="connsiteX0" fmla="*/ 0 w 636413"/>
+                  <a:gd name="connsiteY0" fmla="*/ 0 h 1402991"/>
+                  <a:gd name="connsiteX1" fmla="*/ 304469 w 636413"/>
+                  <a:gd name="connsiteY1" fmla="*/ 0 h 1402991"/>
+                  <a:gd name="connsiteX2" fmla="*/ 634338 w 636413"/>
+                  <a:gd name="connsiteY2" fmla="*/ 696733 h 1402991"/>
+                  <a:gd name="connsiteX3" fmla="*/ 161594 w 636413"/>
+                  <a:gd name="connsiteY3" fmla="*/ 1402991 h 1402991"/>
+                  <a:gd name="connsiteX4" fmla="*/ 0 w 636413"/>
+                  <a:gd name="connsiteY4" fmla="*/ 1393466 h 1402991"/>
+                  <a:gd name="connsiteX5" fmla="*/ 0 w 636413"/>
+                  <a:gd name="connsiteY5" fmla="*/ 0 h 1402991"/>
+                  <a:gd name="connsiteX0" fmla="*/ 0 w 637888"/>
+                  <a:gd name="connsiteY0" fmla="*/ 0 h 1393466"/>
+                  <a:gd name="connsiteX1" fmla="*/ 304469 w 637888"/>
+                  <a:gd name="connsiteY1" fmla="*/ 0 h 1393466"/>
+                  <a:gd name="connsiteX2" fmla="*/ 634338 w 637888"/>
+                  <a:gd name="connsiteY2" fmla="*/ 696733 h 1393466"/>
+                  <a:gd name="connsiteX3" fmla="*/ 110794 w 637888"/>
+                  <a:gd name="connsiteY3" fmla="*/ 1390291 h 1393466"/>
+                  <a:gd name="connsiteX4" fmla="*/ 0 w 637888"/>
+                  <a:gd name="connsiteY4" fmla="*/ 1393466 h 1393466"/>
+                  <a:gd name="connsiteX5" fmla="*/ 0 w 637888"/>
+                  <a:gd name="connsiteY5" fmla="*/ 0 h 1393466"/>
+                  <a:gd name="connsiteX0" fmla="*/ 0 w 637888"/>
+                  <a:gd name="connsiteY0" fmla="*/ 0 h 1393466"/>
+                  <a:gd name="connsiteX1" fmla="*/ 304469 w 637888"/>
+                  <a:gd name="connsiteY1" fmla="*/ 0 h 1393466"/>
+                  <a:gd name="connsiteX2" fmla="*/ 634338 w 637888"/>
+                  <a:gd name="connsiteY2" fmla="*/ 696733 h 1393466"/>
+                  <a:gd name="connsiteX3" fmla="*/ 110794 w 637888"/>
+                  <a:gd name="connsiteY3" fmla="*/ 1390291 h 1393466"/>
+                  <a:gd name="connsiteX4" fmla="*/ 0 w 637888"/>
+                  <a:gd name="connsiteY4" fmla="*/ 1393466 h 1393466"/>
+                  <a:gd name="connsiteX5" fmla="*/ 0 w 637888"/>
+                  <a:gd name="connsiteY5" fmla="*/ 0 h 1393466"/>
+                  <a:gd name="connsiteX0" fmla="*/ 0 w 641730"/>
+                  <a:gd name="connsiteY0" fmla="*/ 0 h 1399816"/>
+                  <a:gd name="connsiteX1" fmla="*/ 304469 w 641730"/>
+                  <a:gd name="connsiteY1" fmla="*/ 0 h 1399816"/>
+                  <a:gd name="connsiteX2" fmla="*/ 634338 w 641730"/>
+                  <a:gd name="connsiteY2" fmla="*/ 696733 h 1399816"/>
+                  <a:gd name="connsiteX3" fmla="*/ 6019 w 641730"/>
+                  <a:gd name="connsiteY3" fmla="*/ 1399816 h 1399816"/>
+                  <a:gd name="connsiteX4" fmla="*/ 0 w 641730"/>
+                  <a:gd name="connsiteY4" fmla="*/ 1393466 h 1399816"/>
+                  <a:gd name="connsiteX5" fmla="*/ 0 w 641730"/>
+                  <a:gd name="connsiteY5" fmla="*/ 0 h 1399816"/>
+                  <a:gd name="connsiteX0" fmla="*/ 0 w 641730"/>
+                  <a:gd name="connsiteY0" fmla="*/ 0 h 1399816"/>
+                  <a:gd name="connsiteX1" fmla="*/ 304469 w 641730"/>
+                  <a:gd name="connsiteY1" fmla="*/ 0 h 1399816"/>
+                  <a:gd name="connsiteX2" fmla="*/ 634338 w 641730"/>
+                  <a:gd name="connsiteY2" fmla="*/ 696733 h 1399816"/>
+                  <a:gd name="connsiteX3" fmla="*/ 6019 w 641730"/>
+                  <a:gd name="connsiteY3" fmla="*/ 1399816 h 1399816"/>
+                  <a:gd name="connsiteX4" fmla="*/ 0 w 641730"/>
+                  <a:gd name="connsiteY4" fmla="*/ 1393466 h 1399816"/>
+                  <a:gd name="connsiteX5" fmla="*/ 0 w 641730"/>
+                  <a:gd name="connsiteY5" fmla="*/ 0 h 1399816"/>
+                  <a:gd name="connsiteX0" fmla="*/ 0 w 634338"/>
+                  <a:gd name="connsiteY0" fmla="*/ 0 h 1399816"/>
+                  <a:gd name="connsiteX1" fmla="*/ 9194 w 634338"/>
+                  <a:gd name="connsiteY1" fmla="*/ 12700 h 1399816"/>
+                  <a:gd name="connsiteX2" fmla="*/ 634338 w 634338"/>
+                  <a:gd name="connsiteY2" fmla="*/ 696733 h 1399816"/>
+                  <a:gd name="connsiteX3" fmla="*/ 6019 w 634338"/>
+                  <a:gd name="connsiteY3" fmla="*/ 1399816 h 1399816"/>
+                  <a:gd name="connsiteX4" fmla="*/ 0 w 634338"/>
+                  <a:gd name="connsiteY4" fmla="*/ 1393466 h 1399816"/>
+                  <a:gd name="connsiteX5" fmla="*/ 0 w 634338"/>
+                  <a:gd name="connsiteY5" fmla="*/ 0 h 1399816"/>
+                  <a:gd name="connsiteX0" fmla="*/ 0 w 634338"/>
+                  <a:gd name="connsiteY0" fmla="*/ 0 h 1399816"/>
+                  <a:gd name="connsiteX1" fmla="*/ 9194 w 634338"/>
+                  <a:gd name="connsiteY1" fmla="*/ 12700 h 1399816"/>
+                  <a:gd name="connsiteX2" fmla="*/ 634338 w 634338"/>
+                  <a:gd name="connsiteY2" fmla="*/ 696733 h 1399816"/>
+                  <a:gd name="connsiteX3" fmla="*/ 6019 w 634338"/>
+                  <a:gd name="connsiteY3" fmla="*/ 1399816 h 1399816"/>
+                  <a:gd name="connsiteX4" fmla="*/ 0 w 634338"/>
+                  <a:gd name="connsiteY4" fmla="*/ 1393466 h 1399816"/>
+                  <a:gd name="connsiteX5" fmla="*/ 0 w 634338"/>
+                  <a:gd name="connsiteY5" fmla="*/ 0 h 1399816"/>
+                  <a:gd name="connsiteX0" fmla="*/ 0 w 634338"/>
+                  <a:gd name="connsiteY0" fmla="*/ 0 h 1399816"/>
+                  <a:gd name="connsiteX1" fmla="*/ 9194 w 634338"/>
+                  <a:gd name="connsiteY1" fmla="*/ 12700 h 1399816"/>
+                  <a:gd name="connsiteX2" fmla="*/ 634338 w 634338"/>
+                  <a:gd name="connsiteY2" fmla="*/ 696733 h 1399816"/>
+                  <a:gd name="connsiteX3" fmla="*/ 6019 w 634338"/>
+                  <a:gd name="connsiteY3" fmla="*/ 1399816 h 1399816"/>
+                  <a:gd name="connsiteX4" fmla="*/ 0 w 634338"/>
+                  <a:gd name="connsiteY4" fmla="*/ 1393466 h 1399816"/>
+                  <a:gd name="connsiteX5" fmla="*/ 0 w 634338"/>
+                  <a:gd name="connsiteY5" fmla="*/ 0 h 1399816"/>
+                  <a:gd name="connsiteX0" fmla="*/ 0 w 634345"/>
+                  <a:gd name="connsiteY0" fmla="*/ 6350 h 1406166"/>
+                  <a:gd name="connsiteX1" fmla="*/ 15544 w 634345"/>
+                  <a:gd name="connsiteY1" fmla="*/ 0 h 1406166"/>
+                  <a:gd name="connsiteX2" fmla="*/ 634338 w 634345"/>
+                  <a:gd name="connsiteY2" fmla="*/ 703083 h 1406166"/>
+                  <a:gd name="connsiteX3" fmla="*/ 6019 w 634345"/>
+                  <a:gd name="connsiteY3" fmla="*/ 1406166 h 1406166"/>
+                  <a:gd name="connsiteX4" fmla="*/ 0 w 634345"/>
+                  <a:gd name="connsiteY4" fmla="*/ 1399816 h 1406166"/>
+                  <a:gd name="connsiteX5" fmla="*/ 0 w 634345"/>
+                  <a:gd name="connsiteY5" fmla="*/ 6350 h 1406166"/>
+                  <a:gd name="connsiteX0" fmla="*/ 0 w 634345"/>
+                  <a:gd name="connsiteY0" fmla="*/ 12700 h 1406166"/>
+                  <a:gd name="connsiteX1" fmla="*/ 15544 w 634345"/>
+                  <a:gd name="connsiteY1" fmla="*/ 0 h 1406166"/>
+                  <a:gd name="connsiteX2" fmla="*/ 634338 w 634345"/>
+                  <a:gd name="connsiteY2" fmla="*/ 703083 h 1406166"/>
+                  <a:gd name="connsiteX3" fmla="*/ 6019 w 634345"/>
+                  <a:gd name="connsiteY3" fmla="*/ 1406166 h 1406166"/>
+                  <a:gd name="connsiteX4" fmla="*/ 0 w 634345"/>
+                  <a:gd name="connsiteY4" fmla="*/ 1399816 h 1406166"/>
+                  <a:gd name="connsiteX5" fmla="*/ 0 w 634345"/>
+                  <a:gd name="connsiteY5" fmla="*/ 12700 h 1406166"/>
+                </a:gdLst>
+                <a:ahLst/>
+                <a:cxnLst>
+                  <a:cxn ang="0">
+                    <a:pos x="connsiteX0" y="connsiteY0"/>
+                  </a:cxn>
+                  <a:cxn ang="0">
+                    <a:pos x="connsiteX1" y="connsiteY1"/>
+                  </a:cxn>
+                  <a:cxn ang="0">
+                    <a:pos x="connsiteX2" y="connsiteY2"/>
+                  </a:cxn>
+                  <a:cxn ang="0">
+                    <a:pos x="connsiteX3" y="connsiteY3"/>
+                  </a:cxn>
+                  <a:cxn ang="0">
+                    <a:pos x="connsiteX4" y="connsiteY4"/>
+                  </a:cxn>
+                  <a:cxn ang="0">
+                    <a:pos x="connsiteX5" y="connsiteY5"/>
+                  </a:cxn>
+                </a:cxnLst>
+                <a:rect l="l" t="t" r="r" b="b"/>
+                <a:pathLst>
+                  <a:path w="634345" h="1406166">
+                    <a:moveTo>
+                      <a:pt x="0" y="12700"/>
+                    </a:moveTo>
+                    <a:lnTo>
+                      <a:pt x="15544" y="0"/>
+                    </a:lnTo>
+                    <a:cubicBezTo>
+                      <a:pt x="367848" y="203200"/>
+                      <a:pt x="635926" y="468722"/>
+                      <a:pt x="634338" y="703083"/>
+                    </a:cubicBezTo>
+                    <a:cubicBezTo>
+                      <a:pt x="632751" y="937444"/>
+                      <a:pt x="532948" y="1095016"/>
+                      <a:pt x="6019" y="1406166"/>
+                    </a:cubicBezTo>
+                    <a:lnTo>
+                      <a:pt x="0" y="1399816"/>
+                    </a:lnTo>
+                    <a:lnTo>
+                      <a:pt x="0" y="12700"/>
+                    </a:lnTo>
+                    <a:close/>
+                  </a:path>
+                </a:pathLst>
+              </a:custGeom>
+              <a:solidFill>
+                <a:schemeClr val="bg2">
+                  <a:lumMod val="90000"/>
+                </a:schemeClr>
+              </a:solidFill>
+              <a:ln>
+                <a:solidFill>
+                  <a:schemeClr val="bg2">
+                    <a:lumMod val="50000"/>
+                  </a:schemeClr>
+                </a:solidFill>
+              </a:ln>
+            </p:spPr>
+            <p:style>
+              <a:lnRef idx="2">
+                <a:schemeClr val="accent1">
+                  <a:shade val="50000"/>
+                </a:schemeClr>
+              </a:lnRef>
+              <a:fillRef idx="1">
+                <a:schemeClr val="accent1"/>
+              </a:fillRef>
+              <a:effectRef idx="0">
+                <a:schemeClr val="accent1"/>
+              </a:effectRef>
+              <a:fontRef idx="minor">
+                <a:schemeClr val="lt1"/>
+              </a:fontRef>
+            </p:style>
+            <p:txBody>
+              <a:bodyPr rtlCol="0" anchor="ctr"/>
+              <a:lstStyle/>
+              <a:p>
+                <a:pPr algn="ctr"/>
+                <a:endParaRPr lang="pt-PT" dirty="0"/>
+              </a:p>
+            </p:txBody>
+          </p:sp>
+        </p:grpSp>
+        <p:grpSp>
+          <p:nvGrpSpPr>
+            <p:cNvPr id="50" name="Agrupar 49">
+              <a:extLst>
+                <a:ext uri="{FF2B5EF4-FFF2-40B4-BE49-F238E27FC236}">
+                  <a16:creationId xmlns:a16="http://schemas.microsoft.com/office/drawing/2014/main" id="{6943E87C-8474-1CD7-B77F-275FCB6DD712}"/>
+                </a:ext>
+              </a:extLst>
+            </p:cNvPr>
+            <p:cNvGrpSpPr/>
+            <p:nvPr/>
+          </p:nvGrpSpPr>
+          <p:grpSpPr>
+            <a:xfrm>
+              <a:off x="3924251" y="4256426"/>
+              <a:ext cx="2117268" cy="288000"/>
+              <a:chOff x="3924251" y="4256426"/>
+              <a:chExt cx="2117268" cy="288000"/>
+            </a:xfrm>
+          </p:grpSpPr>
+          <p:sp>
+            <p:nvSpPr>
+              <p:cNvPr id="40" name="Retângulo 39">
+                <a:extLst>
+                  <a:ext uri="{FF2B5EF4-FFF2-40B4-BE49-F238E27FC236}">
+                    <a16:creationId xmlns:a16="http://schemas.microsoft.com/office/drawing/2014/main" id="{E940D367-2F15-6FDB-F707-AE2FE3392466}"/>
+                  </a:ext>
+                </a:extLst>
+              </p:cNvPr>
+              <p:cNvSpPr/>
+              <p:nvPr/>
+            </p:nvSpPr>
+            <p:spPr>
+              <a:xfrm>
+                <a:off x="3924251" y="4256426"/>
+                <a:ext cx="288000" cy="288000"/>
+              </a:xfrm>
+              <a:prstGeom prst="rect">
+                <a:avLst/>
+              </a:prstGeom>
+            </p:spPr>
+            <p:style>
+              <a:lnRef idx="2">
+                <a:schemeClr val="accent1">
+                  <a:shade val="50000"/>
+                </a:schemeClr>
+              </a:lnRef>
+              <a:fillRef idx="1">
+                <a:schemeClr val="accent1"/>
+              </a:fillRef>
+              <a:effectRef idx="0">
+                <a:schemeClr val="accent1"/>
+              </a:effectRef>
+              <a:fontRef idx="minor">
+                <a:schemeClr val="lt1"/>
+              </a:fontRef>
+            </p:style>
+            <p:txBody>
+              <a:bodyPr rtlCol="0" anchor="ctr"/>
+              <a:lstStyle/>
+              <a:p>
+                <a:pPr algn="ctr"/>
+                <a:endParaRPr lang="pt-PT" dirty="0"/>
+              </a:p>
+            </p:txBody>
+          </p:sp>
+          <p:sp>
+            <p:nvSpPr>
+              <p:cNvPr id="46" name="Retângulo 45">
+                <a:extLst>
+                  <a:ext uri="{FF2B5EF4-FFF2-40B4-BE49-F238E27FC236}">
+                    <a16:creationId xmlns:a16="http://schemas.microsoft.com/office/drawing/2014/main" id="{B5224A88-713B-CD1F-1529-67D389DFBD58}"/>
+                  </a:ext>
+                </a:extLst>
+              </p:cNvPr>
+              <p:cNvSpPr/>
+              <p:nvPr/>
+            </p:nvSpPr>
+            <p:spPr>
+              <a:xfrm>
+                <a:off x="4382181" y="4256426"/>
+                <a:ext cx="288000" cy="288000"/>
+              </a:xfrm>
+              <a:prstGeom prst="rect">
+                <a:avLst/>
+              </a:prstGeom>
+            </p:spPr>
+            <p:style>
+              <a:lnRef idx="2">
+                <a:schemeClr val="accent1">
+                  <a:shade val="50000"/>
+                </a:schemeClr>
+              </a:lnRef>
+              <a:fillRef idx="1">
+                <a:schemeClr val="accent1"/>
+              </a:fillRef>
+              <a:effectRef idx="0">
+                <a:schemeClr val="accent1"/>
+              </a:effectRef>
+              <a:fontRef idx="minor">
+                <a:schemeClr val="lt1"/>
+              </a:fontRef>
+            </p:style>
+            <p:txBody>
+              <a:bodyPr rtlCol="0" anchor="ctr"/>
+              <a:lstStyle/>
+              <a:p>
+                <a:pPr algn="ctr"/>
+                <a:endParaRPr lang="pt-PT" dirty="0"/>
+              </a:p>
+            </p:txBody>
+          </p:sp>
+          <p:sp>
+            <p:nvSpPr>
+              <p:cNvPr id="47" name="Retângulo 46">
+                <a:extLst>
+                  <a:ext uri="{FF2B5EF4-FFF2-40B4-BE49-F238E27FC236}">
+                    <a16:creationId xmlns:a16="http://schemas.microsoft.com/office/drawing/2014/main" id="{7EBC3461-4AE7-0B83-700D-B6F164B815B0}"/>
+                  </a:ext>
+                </a:extLst>
+              </p:cNvPr>
+              <p:cNvSpPr/>
+              <p:nvPr/>
+            </p:nvSpPr>
+            <p:spPr>
+              <a:xfrm>
+                <a:off x="4840111" y="4256426"/>
+                <a:ext cx="288000" cy="288000"/>
+              </a:xfrm>
+              <a:prstGeom prst="rect">
+                <a:avLst/>
+              </a:prstGeom>
+            </p:spPr>
+            <p:style>
+              <a:lnRef idx="2">
+                <a:schemeClr val="accent1">
+                  <a:shade val="50000"/>
+                </a:schemeClr>
+              </a:lnRef>
+              <a:fillRef idx="1">
+                <a:schemeClr val="accent1"/>
+              </a:fillRef>
+              <a:effectRef idx="0">
+                <a:schemeClr val="accent1"/>
+              </a:effectRef>
+              <a:fontRef idx="minor">
+                <a:schemeClr val="lt1"/>
+              </a:fontRef>
+            </p:style>
+            <p:txBody>
+              <a:bodyPr rtlCol="0" anchor="ctr"/>
+              <a:lstStyle/>
+              <a:p>
+                <a:pPr algn="ctr"/>
+                <a:endParaRPr lang="pt-PT" dirty="0"/>
+              </a:p>
+            </p:txBody>
+          </p:sp>
+          <p:sp>
+            <p:nvSpPr>
+              <p:cNvPr id="48" name="Retângulo 47">
+                <a:extLst>
+                  <a:ext uri="{FF2B5EF4-FFF2-40B4-BE49-F238E27FC236}">
+                    <a16:creationId xmlns:a16="http://schemas.microsoft.com/office/drawing/2014/main" id="{EBEBE159-84D9-B6A1-6C65-C87BE4A09315}"/>
+                  </a:ext>
+                </a:extLst>
+              </p:cNvPr>
+              <p:cNvSpPr/>
+              <p:nvPr/>
+            </p:nvSpPr>
+            <p:spPr>
+              <a:xfrm>
+                <a:off x="5295692" y="4256426"/>
+                <a:ext cx="288000" cy="288000"/>
+              </a:xfrm>
+              <a:prstGeom prst="rect">
+                <a:avLst/>
+              </a:prstGeom>
+            </p:spPr>
+            <p:style>
+              <a:lnRef idx="2">
+                <a:schemeClr val="accent1">
+                  <a:shade val="50000"/>
+                </a:schemeClr>
+              </a:lnRef>
+              <a:fillRef idx="1">
+                <a:schemeClr val="accent1"/>
+              </a:fillRef>
+              <a:effectRef idx="0">
+                <a:schemeClr val="accent1"/>
+              </a:effectRef>
+              <a:fontRef idx="minor">
+                <a:schemeClr val="lt1"/>
+              </a:fontRef>
+            </p:style>
+            <p:txBody>
+              <a:bodyPr rtlCol="0" anchor="ctr"/>
+              <a:lstStyle/>
+              <a:p>
+                <a:pPr algn="ctr"/>
+                <a:endParaRPr lang="pt-PT" dirty="0"/>
+              </a:p>
+            </p:txBody>
+          </p:sp>
+          <p:sp>
+            <p:nvSpPr>
+              <p:cNvPr id="49" name="Retângulo 48">
+                <a:extLst>
+                  <a:ext uri="{FF2B5EF4-FFF2-40B4-BE49-F238E27FC236}">
+                    <a16:creationId xmlns:a16="http://schemas.microsoft.com/office/drawing/2014/main" id="{D19FFEEF-D3C7-F18A-9562-395A4D44FE90}"/>
+                  </a:ext>
+                </a:extLst>
+              </p:cNvPr>
+              <p:cNvSpPr/>
+              <p:nvPr/>
+            </p:nvSpPr>
+            <p:spPr>
+              <a:xfrm>
+                <a:off x="5753519" y="4256426"/>
+                <a:ext cx="288000" cy="288000"/>
+              </a:xfrm>
+              <a:prstGeom prst="rect">
+                <a:avLst/>
+              </a:prstGeom>
+            </p:spPr>
+            <p:style>
+              <a:lnRef idx="2">
+                <a:schemeClr val="accent1">
+                  <a:shade val="50000"/>
+                </a:schemeClr>
+              </a:lnRef>
+              <a:fillRef idx="1">
+                <a:schemeClr val="accent1"/>
+              </a:fillRef>
+              <a:effectRef idx="0">
+                <a:schemeClr val="accent1"/>
+              </a:effectRef>
+              <a:fontRef idx="minor">
+                <a:schemeClr val="lt1"/>
+              </a:fontRef>
+            </p:style>
+            <p:txBody>
+              <a:bodyPr rtlCol="0" anchor="ctr"/>
+              <a:lstStyle/>
+              <a:p>
+                <a:pPr algn="ctr"/>
+                <a:endParaRPr lang="pt-PT" dirty="0"/>
+              </a:p>
+            </p:txBody>
+          </p:sp>
+        </p:grpSp>
+        <p:grpSp>
+          <p:nvGrpSpPr>
+            <p:cNvPr id="51" name="Agrupar 50">
+              <a:extLst>
+                <a:ext uri="{FF2B5EF4-FFF2-40B4-BE49-F238E27FC236}">
+                  <a16:creationId xmlns:a16="http://schemas.microsoft.com/office/drawing/2014/main" id="{3CA821DE-A524-5743-15A4-153C6786628A}"/>
+                </a:ext>
+              </a:extLst>
+            </p:cNvPr>
+            <p:cNvGrpSpPr/>
+            <p:nvPr/>
+          </p:nvGrpSpPr>
+          <p:grpSpPr>
+            <a:xfrm>
+              <a:off x="3931484" y="5113273"/>
+              <a:ext cx="2117268" cy="288000"/>
+              <a:chOff x="3924251" y="4256426"/>
+              <a:chExt cx="2117268" cy="288000"/>
+            </a:xfrm>
+          </p:grpSpPr>
+          <p:sp>
+            <p:nvSpPr>
+              <p:cNvPr id="52" name="Retângulo 51">
+                <a:extLst>
+                  <a:ext uri="{FF2B5EF4-FFF2-40B4-BE49-F238E27FC236}">
+                    <a16:creationId xmlns:a16="http://schemas.microsoft.com/office/drawing/2014/main" id="{31DE9993-1867-0EAB-4826-1FC9BCA933B0}"/>
+                  </a:ext>
+                </a:extLst>
+              </p:cNvPr>
+              <p:cNvSpPr/>
+              <p:nvPr/>
+            </p:nvSpPr>
+            <p:spPr>
+              <a:xfrm>
+                <a:off x="3924251" y="4256426"/>
+                <a:ext cx="288000" cy="288000"/>
+              </a:xfrm>
+              <a:prstGeom prst="rect">
+                <a:avLst/>
+              </a:prstGeom>
+            </p:spPr>
+            <p:style>
+              <a:lnRef idx="2">
+                <a:schemeClr val="accent1">
+                  <a:shade val="50000"/>
+                </a:schemeClr>
+              </a:lnRef>
+              <a:fillRef idx="1">
+                <a:schemeClr val="accent1"/>
+              </a:fillRef>
+              <a:effectRef idx="0">
+                <a:schemeClr val="accent1"/>
+              </a:effectRef>
+              <a:fontRef idx="minor">
+                <a:schemeClr val="lt1"/>
+              </a:fontRef>
+            </p:style>
+            <p:txBody>
+              <a:bodyPr rtlCol="0" anchor="ctr"/>
+              <a:lstStyle/>
+              <a:p>
+                <a:pPr algn="ctr"/>
+                <a:endParaRPr lang="pt-PT" dirty="0"/>
+              </a:p>
+            </p:txBody>
+          </p:sp>
+          <p:sp>
+            <p:nvSpPr>
+              <p:cNvPr id="53" name="Retângulo 52">
+                <a:extLst>
+                  <a:ext uri="{FF2B5EF4-FFF2-40B4-BE49-F238E27FC236}">
+                    <a16:creationId xmlns:a16="http://schemas.microsoft.com/office/drawing/2014/main" id="{841E6150-441D-FB38-A8A5-E97C17886390}"/>
+                  </a:ext>
+                </a:extLst>
+              </p:cNvPr>
+              <p:cNvSpPr/>
+              <p:nvPr/>
+            </p:nvSpPr>
+            <p:spPr>
+              <a:xfrm>
+                <a:off x="4382181" y="4256426"/>
+                <a:ext cx="288000" cy="288000"/>
+              </a:xfrm>
+              <a:prstGeom prst="rect">
+                <a:avLst/>
+              </a:prstGeom>
+            </p:spPr>
+            <p:style>
+              <a:lnRef idx="2">
+                <a:schemeClr val="accent1">
+                  <a:shade val="50000"/>
+                </a:schemeClr>
+              </a:lnRef>
+              <a:fillRef idx="1">
+                <a:schemeClr val="accent1"/>
+              </a:fillRef>
+              <a:effectRef idx="0">
+                <a:schemeClr val="accent1"/>
+              </a:effectRef>
+              <a:fontRef idx="minor">
+                <a:schemeClr val="lt1"/>
+              </a:fontRef>
+            </p:style>
+            <p:txBody>
+              <a:bodyPr rtlCol="0" anchor="ctr"/>
+              <a:lstStyle/>
+              <a:p>
+                <a:pPr algn="ctr"/>
+                <a:endParaRPr lang="pt-PT" dirty="0"/>
+              </a:p>
+            </p:txBody>
+          </p:sp>
+          <p:sp>
+            <p:nvSpPr>
+              <p:cNvPr id="54" name="Retângulo 53">
+                <a:extLst>
+                  <a:ext uri="{FF2B5EF4-FFF2-40B4-BE49-F238E27FC236}">
+                    <a16:creationId xmlns:a16="http://schemas.microsoft.com/office/drawing/2014/main" id="{88B94301-C8D6-3A7C-5E3E-1E5DB8DA4CBE}"/>
+                  </a:ext>
+                </a:extLst>
+              </p:cNvPr>
+              <p:cNvSpPr/>
+              <p:nvPr/>
+            </p:nvSpPr>
+            <p:spPr>
+              <a:xfrm>
+                <a:off x="4840111" y="4256426"/>
+                <a:ext cx="288000" cy="288000"/>
+              </a:xfrm>
+              <a:prstGeom prst="rect">
+                <a:avLst/>
+              </a:prstGeom>
+            </p:spPr>
+            <p:style>
+              <a:lnRef idx="2">
+                <a:schemeClr val="accent1">
+                  <a:shade val="50000"/>
+                </a:schemeClr>
+              </a:lnRef>
+              <a:fillRef idx="1">
+                <a:schemeClr val="accent1"/>
+              </a:fillRef>
+              <a:effectRef idx="0">
+                <a:schemeClr val="accent1"/>
+              </a:effectRef>
+              <a:fontRef idx="minor">
+                <a:schemeClr val="lt1"/>
+              </a:fontRef>
+            </p:style>
+            <p:txBody>
+              <a:bodyPr rtlCol="0" anchor="ctr"/>
+              <a:lstStyle/>
+              <a:p>
+                <a:pPr algn="ctr"/>
+                <a:endParaRPr lang="pt-PT" dirty="0"/>
+              </a:p>
+            </p:txBody>
+          </p:sp>
+          <p:sp>
+            <p:nvSpPr>
+              <p:cNvPr id="55" name="Retângulo 54">
+                <a:extLst>
+                  <a:ext uri="{FF2B5EF4-FFF2-40B4-BE49-F238E27FC236}">
+                    <a16:creationId xmlns:a16="http://schemas.microsoft.com/office/drawing/2014/main" id="{560F2F22-E6E7-4CAB-EDB8-45F44493033C}"/>
+                  </a:ext>
+                </a:extLst>
+              </p:cNvPr>
+              <p:cNvSpPr/>
+              <p:nvPr/>
+            </p:nvSpPr>
+            <p:spPr>
+              <a:xfrm>
+                <a:off x="5295692" y="4256426"/>
+                <a:ext cx="288000" cy="288000"/>
+              </a:xfrm>
+              <a:prstGeom prst="rect">
+                <a:avLst/>
+              </a:prstGeom>
+            </p:spPr>
+            <p:style>
+              <a:lnRef idx="2">
+                <a:schemeClr val="accent1">
+                  <a:shade val="50000"/>
+                </a:schemeClr>
+              </a:lnRef>
+              <a:fillRef idx="1">
+                <a:schemeClr val="accent1"/>
+              </a:fillRef>
+              <a:effectRef idx="0">
+                <a:schemeClr val="accent1"/>
+              </a:effectRef>
+              <a:fontRef idx="minor">
+                <a:schemeClr val="lt1"/>
+              </a:fontRef>
+            </p:style>
+            <p:txBody>
+              <a:bodyPr rtlCol="0" anchor="ctr"/>
+              <a:lstStyle/>
+              <a:p>
+                <a:pPr algn="ctr"/>
+                <a:endParaRPr lang="pt-PT" dirty="0"/>
+              </a:p>
+            </p:txBody>
+          </p:sp>
+          <p:sp>
+            <p:nvSpPr>
+              <p:cNvPr id="56" name="Retângulo 55">
+                <a:extLst>
+                  <a:ext uri="{FF2B5EF4-FFF2-40B4-BE49-F238E27FC236}">
+                    <a16:creationId xmlns:a16="http://schemas.microsoft.com/office/drawing/2014/main" id="{1F31C486-DC80-82B9-22AC-FE96B00C7C53}"/>
+                  </a:ext>
+                </a:extLst>
+              </p:cNvPr>
+              <p:cNvSpPr/>
+              <p:nvPr/>
+            </p:nvSpPr>
+            <p:spPr>
+              <a:xfrm>
+                <a:off x="5753519" y="4256426"/>
+                <a:ext cx="288000" cy="288000"/>
+              </a:xfrm>
+              <a:prstGeom prst="rect">
+                <a:avLst/>
+              </a:prstGeom>
+            </p:spPr>
+            <p:style>
+              <a:lnRef idx="2">
+                <a:schemeClr val="accent1">
+                  <a:shade val="50000"/>
+                </a:schemeClr>
+              </a:lnRef>
+              <a:fillRef idx="1">
+                <a:schemeClr val="accent1"/>
+              </a:fillRef>
+              <a:effectRef idx="0">
+                <a:schemeClr val="accent1"/>
+              </a:effectRef>
+              <a:fontRef idx="minor">
+                <a:schemeClr val="lt1"/>
+              </a:fontRef>
+            </p:style>
+            <p:txBody>
+              <a:bodyPr rtlCol="0" anchor="ctr"/>
+              <a:lstStyle/>
+              <a:p>
+                <a:pPr algn="ctr"/>
+                <a:endParaRPr lang="pt-PT" dirty="0"/>
+              </a:p>
+            </p:txBody>
+          </p:sp>
+        </p:grpSp>
+        <p:sp>
+          <p:nvSpPr>
+            <p:cNvPr id="57" name="Retângulo 56">
+              <a:extLst>
+                <a:ext uri="{FF2B5EF4-FFF2-40B4-BE49-F238E27FC236}">
+                  <a16:creationId xmlns:a16="http://schemas.microsoft.com/office/drawing/2014/main" id="{A27D8E75-4212-D5F7-B3F6-16E76DE1FDEB}"/>
+                </a:ext>
+              </a:extLst>
+            </p:cNvPr>
+            <p:cNvSpPr/>
+            <p:nvPr/>
+          </p:nvSpPr>
+          <p:spPr>
+            <a:xfrm>
+              <a:off x="7261774" y="4679956"/>
+              <a:ext cx="288000" cy="288000"/>
+            </a:xfrm>
+            <a:prstGeom prst="rect">
+              <a:avLst/>
+            </a:prstGeom>
+          </p:spPr>
+          <p:style>
+            <a:lnRef idx="2">
+              <a:schemeClr val="accent1">
+                <a:shade val="50000"/>
+              </a:schemeClr>
+            </a:lnRef>
+            <a:fillRef idx="1">
+              <a:schemeClr val="accent1"/>
+            </a:fillRef>
+            <a:effectRef idx="0">
+              <a:schemeClr val="accent1"/>
+            </a:effectRef>
+            <a:fontRef idx="minor">
+              <a:schemeClr val="lt1"/>
+            </a:fontRef>
+          </p:style>
+          <p:txBody>
+            <a:bodyPr rtlCol="0" anchor="ctr"/>
+            <a:lstStyle/>
+            <a:p>
+              <a:pPr algn="ctr"/>
+              <a:endParaRPr lang="pt-PT" dirty="0"/>
+            </a:p>
+          </p:txBody>
+        </p:sp>
+        <p:sp>
+          <p:nvSpPr>
+            <p:cNvPr id="81" name="Retângulo 80">
+              <a:extLst>
+                <a:ext uri="{FF2B5EF4-FFF2-40B4-BE49-F238E27FC236}">
+                  <a16:creationId xmlns:a16="http://schemas.microsoft.com/office/drawing/2014/main" id="{6173FC49-578A-48B0-C570-9CC79BBE4E0C}"/>
+                </a:ext>
+              </a:extLst>
+            </p:cNvPr>
+            <p:cNvSpPr/>
+            <p:nvPr/>
+          </p:nvSpPr>
+          <p:spPr>
+            <a:xfrm>
+              <a:off x="2273718" y="2700824"/>
+              <a:ext cx="180000" cy="180475"/>
+            </a:xfrm>
+            <a:prstGeom prst="rect">
+              <a:avLst/>
+            </a:prstGeom>
+          </p:spPr>
+          <p:style>
+            <a:lnRef idx="2">
+              <a:schemeClr val="accent1">
+                <a:shade val="50000"/>
+              </a:schemeClr>
+            </a:lnRef>
+            <a:fillRef idx="1">
+              <a:schemeClr val="accent1"/>
+            </a:fillRef>
+            <a:effectRef idx="0">
+              <a:schemeClr val="accent1"/>
+            </a:effectRef>
+            <a:fontRef idx="minor">
+              <a:schemeClr val="lt1"/>
+            </a:fontRef>
+          </p:style>
+          <p:txBody>
+            <a:bodyPr rtlCol="0" anchor="ctr"/>
+            <a:lstStyle/>
+            <a:p>
+              <a:pPr algn="ctr"/>
+              <a:endParaRPr lang="pt-PT" dirty="0"/>
+            </a:p>
+          </p:txBody>
+        </p:sp>
+        <p:sp>
+          <p:nvSpPr>
+            <p:cNvPr id="82" name="CaixaDeTexto 81">
+              <a:extLst>
+                <a:ext uri="{FF2B5EF4-FFF2-40B4-BE49-F238E27FC236}">
+                  <a16:creationId xmlns:a16="http://schemas.microsoft.com/office/drawing/2014/main" id="{15AEE124-2274-067B-5DF9-936A5B4C377D}"/>
+                </a:ext>
+              </a:extLst>
+            </p:cNvPr>
+            <p:cNvSpPr txBox="1"/>
+            <p:nvPr/>
+          </p:nvSpPr>
+          <p:spPr>
+            <a:xfrm>
+              <a:off x="2421606" y="2667950"/>
+              <a:ext cx="1501091" cy="246221"/>
+            </a:xfrm>
+            <a:prstGeom prst="rect">
+              <a:avLst/>
+            </a:prstGeom>
+            <a:noFill/>
+          </p:spPr>
+          <p:txBody>
+            <a:bodyPr wrap="square" rtlCol="0">
+              <a:spAutoFit/>
+            </a:bodyPr>
+            <a:lstStyle/>
+            <a:p>
+              <a:r>
+                <a:rPr lang="pt-PT" sz="1000" dirty="0"/>
+                <a:t>-</a:t>
+              </a:r>
+              <a:r>
+                <a:rPr lang="pt-PT" sz="800" dirty="0"/>
+                <a:t>Passengers</a:t>
+              </a:r>
+            </a:p>
+          </p:txBody>
+        </p:sp>
+        <p:grpSp>
+          <p:nvGrpSpPr>
+            <p:cNvPr id="92" name="Agrupar 91">
+              <a:extLst>
+                <a:ext uri="{FF2B5EF4-FFF2-40B4-BE49-F238E27FC236}">
+                  <a16:creationId xmlns:a16="http://schemas.microsoft.com/office/drawing/2014/main" id="{DBAFB52E-56C3-EFEC-602C-6CEA54655F8A}"/>
+                </a:ext>
+              </a:extLst>
+            </p:cNvPr>
+            <p:cNvGrpSpPr/>
+            <p:nvPr/>
+          </p:nvGrpSpPr>
+          <p:grpSpPr>
+            <a:xfrm>
+              <a:off x="3779698" y="803945"/>
+              <a:ext cx="1696900" cy="2223748"/>
+              <a:chOff x="3779698" y="803945"/>
+              <a:chExt cx="1696900" cy="2223748"/>
+            </a:xfrm>
+          </p:grpSpPr>
+          <p:sp>
+            <p:nvSpPr>
+              <p:cNvPr id="87" name="Retângulo 86">
+                <a:extLst>
+                  <a:ext uri="{FF2B5EF4-FFF2-40B4-BE49-F238E27FC236}">
+                    <a16:creationId xmlns:a16="http://schemas.microsoft.com/office/drawing/2014/main" id="{8666E87B-F3E3-CFC5-9938-B4946B652580}"/>
+                  </a:ext>
+                </a:extLst>
+              </p:cNvPr>
+              <p:cNvSpPr/>
+              <p:nvPr/>
+            </p:nvSpPr>
+            <p:spPr>
+              <a:xfrm rot="5400000">
+                <a:off x="4270566" y="1337952"/>
+                <a:ext cx="245863" cy="1227600"/>
+              </a:xfrm>
+              <a:prstGeom prst="rect">
+                <a:avLst/>
+              </a:prstGeom>
+              <a:solidFill>
+                <a:schemeClr val="bg2">
+                  <a:lumMod val="50000"/>
+                </a:schemeClr>
+              </a:solidFill>
+              <a:ln>
+                <a:solidFill>
+                  <a:schemeClr val="bg2">
+                    <a:lumMod val="50000"/>
+                  </a:schemeClr>
+                </a:solidFill>
+              </a:ln>
+            </p:spPr>
+            <p:style>
+              <a:lnRef idx="2">
+                <a:schemeClr val="accent1">
+                  <a:shade val="50000"/>
+                </a:schemeClr>
+              </a:lnRef>
+              <a:fillRef idx="1">
+                <a:schemeClr val="accent1"/>
+              </a:fillRef>
+              <a:effectRef idx="0">
+                <a:schemeClr val="accent1"/>
+              </a:effectRef>
+              <a:fontRef idx="minor">
+                <a:schemeClr val="lt1"/>
+              </a:fontRef>
+            </p:style>
+            <p:txBody>
+              <a:bodyPr rtlCol="0" anchor="ctr"/>
+              <a:lstStyle/>
+              <a:p>
+                <a:pPr algn="ctr"/>
+                <a:endParaRPr lang="pt-PT" dirty="0"/>
+              </a:p>
+            </p:txBody>
+          </p:sp>
+          <p:sp>
+            <p:nvSpPr>
+              <p:cNvPr id="90" name="Retângulo 89">
+                <a:extLst>
+                  <a:ext uri="{FF2B5EF4-FFF2-40B4-BE49-F238E27FC236}">
+                    <a16:creationId xmlns:a16="http://schemas.microsoft.com/office/drawing/2014/main" id="{BEEA3335-942E-39E0-5AD8-B1CC19B30438}"/>
+                  </a:ext>
+                </a:extLst>
+              </p:cNvPr>
+              <p:cNvSpPr/>
+              <p:nvPr/>
+            </p:nvSpPr>
+            <p:spPr>
+              <a:xfrm rot="8598820">
+                <a:off x="5230735" y="1800093"/>
+                <a:ext cx="245863" cy="1227600"/>
+              </a:xfrm>
+              <a:prstGeom prst="rect">
+                <a:avLst/>
+              </a:prstGeom>
+              <a:solidFill>
+                <a:schemeClr val="bg2">
+                  <a:lumMod val="50000"/>
+                </a:schemeClr>
+              </a:solidFill>
+              <a:ln>
+                <a:solidFill>
+                  <a:schemeClr val="bg2">
+                    <a:lumMod val="50000"/>
+                  </a:schemeClr>
+                </a:solidFill>
+              </a:ln>
+            </p:spPr>
+            <p:style>
+              <a:lnRef idx="2">
+                <a:schemeClr val="accent1">
+                  <a:shade val="50000"/>
+                </a:schemeClr>
+              </a:lnRef>
+              <a:fillRef idx="1">
+                <a:schemeClr val="accent1"/>
+              </a:fillRef>
+              <a:effectRef idx="0">
+                <a:schemeClr val="accent1"/>
+              </a:effectRef>
+              <a:fontRef idx="minor">
+                <a:schemeClr val="lt1"/>
+              </a:fontRef>
+            </p:style>
+            <p:txBody>
+              <a:bodyPr rtlCol="0" anchor="ctr"/>
+              <a:lstStyle/>
+              <a:p>
+                <a:pPr algn="ctr"/>
+                <a:endParaRPr lang="pt-PT" dirty="0"/>
+              </a:p>
+            </p:txBody>
+          </p:sp>
+          <p:sp>
+            <p:nvSpPr>
+              <p:cNvPr id="91" name="Retângulo 90">
+                <a:extLst>
+                  <a:ext uri="{FF2B5EF4-FFF2-40B4-BE49-F238E27FC236}">
+                    <a16:creationId xmlns:a16="http://schemas.microsoft.com/office/drawing/2014/main" id="{18A04A70-82D5-66BA-58E0-A705F426AA71}"/>
+                  </a:ext>
+                </a:extLst>
+              </p:cNvPr>
+              <p:cNvSpPr/>
+              <p:nvPr/>
+            </p:nvSpPr>
+            <p:spPr>
+              <a:xfrm rot="12648134">
+                <a:off x="5188055" y="803945"/>
+                <a:ext cx="245863" cy="1227600"/>
+              </a:xfrm>
+              <a:prstGeom prst="rect">
+                <a:avLst/>
+              </a:prstGeom>
+              <a:solidFill>
+                <a:schemeClr val="bg2">
+                  <a:lumMod val="50000"/>
+                </a:schemeClr>
+              </a:solidFill>
+              <a:ln>
+                <a:solidFill>
+                  <a:schemeClr val="bg2">
+                    <a:lumMod val="50000"/>
+                  </a:schemeClr>
+                </a:solidFill>
+              </a:ln>
+            </p:spPr>
+            <p:style>
+              <a:lnRef idx="2">
+                <a:schemeClr val="accent1">
+                  <a:shade val="50000"/>
+                </a:schemeClr>
+              </a:lnRef>
+              <a:fillRef idx="1">
+                <a:schemeClr val="accent1"/>
+              </a:fillRef>
+              <a:effectRef idx="0">
+                <a:schemeClr val="accent1"/>
+              </a:effectRef>
+              <a:fontRef idx="minor">
+                <a:schemeClr val="lt1"/>
+              </a:fontRef>
+            </p:style>
+            <p:txBody>
+              <a:bodyPr rtlCol="0" anchor="ctr"/>
+              <a:lstStyle/>
+              <a:p>
+                <a:pPr algn="ctr"/>
+                <a:endParaRPr lang="pt-PT" dirty="0"/>
+              </a:p>
+            </p:txBody>
+          </p:sp>
+        </p:grpSp>
+        <p:grpSp>
+          <p:nvGrpSpPr>
+            <p:cNvPr id="93" name="Agrupar 92">
+              <a:extLst>
+                <a:ext uri="{FF2B5EF4-FFF2-40B4-BE49-F238E27FC236}">
+                  <a16:creationId xmlns:a16="http://schemas.microsoft.com/office/drawing/2014/main" id="{75B9BAF1-0D45-BA1B-6233-25411B290E73}"/>
+                </a:ext>
+              </a:extLst>
+            </p:cNvPr>
+            <p:cNvGrpSpPr/>
+            <p:nvPr/>
+          </p:nvGrpSpPr>
+          <p:grpSpPr>
+            <a:xfrm rot="15411599">
+              <a:off x="6901768" y="1183760"/>
+              <a:ext cx="1696900" cy="2223748"/>
+              <a:chOff x="3779698" y="803945"/>
+              <a:chExt cx="1696900" cy="2223748"/>
+            </a:xfrm>
+          </p:grpSpPr>
+          <p:sp>
+            <p:nvSpPr>
+              <p:cNvPr id="94" name="Retângulo 93">
+                <a:extLst>
+                  <a:ext uri="{FF2B5EF4-FFF2-40B4-BE49-F238E27FC236}">
+                    <a16:creationId xmlns:a16="http://schemas.microsoft.com/office/drawing/2014/main" id="{63403F3E-0834-F52A-F29F-B4FC480C3002}"/>
+                  </a:ext>
+                </a:extLst>
+              </p:cNvPr>
+              <p:cNvSpPr/>
+              <p:nvPr/>
+            </p:nvSpPr>
+            <p:spPr>
+              <a:xfrm rot="5400000">
+                <a:off x="4270566" y="1337952"/>
+                <a:ext cx="245863" cy="1227600"/>
+              </a:xfrm>
+              <a:prstGeom prst="rect">
+                <a:avLst/>
+              </a:prstGeom>
+              <a:solidFill>
+                <a:schemeClr val="bg2">
+                  <a:lumMod val="50000"/>
+                </a:schemeClr>
+              </a:solidFill>
+              <a:ln>
+                <a:solidFill>
+                  <a:schemeClr val="bg2">
+                    <a:lumMod val="50000"/>
+                  </a:schemeClr>
+                </a:solidFill>
+              </a:ln>
+            </p:spPr>
+            <p:style>
+              <a:lnRef idx="2">
+                <a:schemeClr val="accent1">
+                  <a:shade val="50000"/>
+                </a:schemeClr>
+              </a:lnRef>
+              <a:fillRef idx="1">
+                <a:schemeClr val="accent1"/>
+              </a:fillRef>
+              <a:effectRef idx="0">
+                <a:schemeClr val="accent1"/>
+              </a:effectRef>
+              <a:fontRef idx="minor">
+                <a:schemeClr val="lt1"/>
+              </a:fontRef>
+            </p:style>
+            <p:txBody>
+              <a:bodyPr rtlCol="0" anchor="ctr"/>
+              <a:lstStyle/>
+              <a:p>
+                <a:pPr algn="ctr"/>
+                <a:endParaRPr lang="pt-PT" dirty="0"/>
+              </a:p>
+            </p:txBody>
+          </p:sp>
+          <p:sp>
+            <p:nvSpPr>
+              <p:cNvPr id="95" name="Retângulo 94">
+                <a:extLst>
+                  <a:ext uri="{FF2B5EF4-FFF2-40B4-BE49-F238E27FC236}">
+                    <a16:creationId xmlns:a16="http://schemas.microsoft.com/office/drawing/2014/main" id="{D6D89799-2E3B-81C0-DD3C-4EF02C389BEA}"/>
+                  </a:ext>
+                </a:extLst>
+              </p:cNvPr>
+              <p:cNvSpPr/>
+              <p:nvPr/>
+            </p:nvSpPr>
+            <p:spPr>
+              <a:xfrm rot="8598820">
+                <a:off x="5230735" y="1800093"/>
+                <a:ext cx="245863" cy="1227600"/>
+              </a:xfrm>
+              <a:prstGeom prst="rect">
+                <a:avLst/>
+              </a:prstGeom>
+              <a:solidFill>
+                <a:schemeClr val="bg2">
+                  <a:lumMod val="50000"/>
+                </a:schemeClr>
+              </a:solidFill>
+              <a:ln>
+                <a:solidFill>
+                  <a:schemeClr val="bg2">
+                    <a:lumMod val="50000"/>
+                  </a:schemeClr>
+                </a:solidFill>
+              </a:ln>
+            </p:spPr>
+            <p:style>
+              <a:lnRef idx="2">
+                <a:schemeClr val="accent1">
+                  <a:shade val="50000"/>
+                </a:schemeClr>
+              </a:lnRef>
+              <a:fillRef idx="1">
+                <a:schemeClr val="accent1"/>
+              </a:fillRef>
+              <a:effectRef idx="0">
+                <a:schemeClr val="accent1"/>
+              </a:effectRef>
+              <a:fontRef idx="minor">
+                <a:schemeClr val="lt1"/>
+              </a:fontRef>
+            </p:style>
+            <p:txBody>
+              <a:bodyPr rtlCol="0" anchor="ctr"/>
+              <a:lstStyle/>
+              <a:p>
+                <a:pPr algn="ctr"/>
+                <a:endParaRPr lang="pt-PT" dirty="0"/>
+              </a:p>
+            </p:txBody>
+          </p:sp>
+          <p:sp>
+            <p:nvSpPr>
+              <p:cNvPr id="96" name="Retângulo 95">
+                <a:extLst>
+                  <a:ext uri="{FF2B5EF4-FFF2-40B4-BE49-F238E27FC236}">
+                    <a16:creationId xmlns:a16="http://schemas.microsoft.com/office/drawing/2014/main" id="{91FE3F5C-0A4A-0605-A20E-E6C6AECA3E21}"/>
+                  </a:ext>
+                </a:extLst>
+              </p:cNvPr>
+              <p:cNvSpPr/>
+              <p:nvPr/>
+            </p:nvSpPr>
+            <p:spPr>
+              <a:xfrm rot="12648134">
+                <a:off x="5188055" y="803945"/>
+                <a:ext cx="245863" cy="1227600"/>
+              </a:xfrm>
+              <a:prstGeom prst="rect">
+                <a:avLst/>
+              </a:prstGeom>
+              <a:solidFill>
+                <a:schemeClr val="bg2">
+                  <a:lumMod val="50000"/>
+                </a:schemeClr>
+              </a:solidFill>
+              <a:ln>
+                <a:solidFill>
+                  <a:schemeClr val="bg2">
+                    <a:lumMod val="50000"/>
+                  </a:schemeClr>
+                </a:solidFill>
+              </a:ln>
+            </p:spPr>
+            <p:style>
+              <a:lnRef idx="2">
+                <a:schemeClr val="accent1">
+                  <a:shade val="50000"/>
+                </a:schemeClr>
+              </a:lnRef>
+              <a:fillRef idx="1">
+                <a:schemeClr val="accent1"/>
+              </a:fillRef>
+              <a:effectRef idx="0">
+                <a:schemeClr val="accent1"/>
+              </a:effectRef>
+              <a:fontRef idx="minor">
+                <a:schemeClr val="lt1"/>
+              </a:fontRef>
+            </p:style>
+            <p:txBody>
+              <a:bodyPr rtlCol="0" anchor="ctr"/>
+              <a:lstStyle/>
+              <a:p>
+                <a:pPr algn="ctr"/>
+                <a:endParaRPr lang="pt-PT" dirty="0"/>
+              </a:p>
+            </p:txBody>
+          </p:sp>
+        </p:grpSp>
+        <p:grpSp>
+          <p:nvGrpSpPr>
+            <p:cNvPr id="97" name="Agrupar 96">
+              <a:extLst>
+                <a:ext uri="{FF2B5EF4-FFF2-40B4-BE49-F238E27FC236}">
+                  <a16:creationId xmlns:a16="http://schemas.microsoft.com/office/drawing/2014/main" id="{4D7E3363-B30B-A71C-7F57-07773D3BA454}"/>
+                </a:ext>
+              </a:extLst>
+            </p:cNvPr>
+            <p:cNvGrpSpPr/>
+            <p:nvPr/>
+          </p:nvGrpSpPr>
+          <p:grpSpPr>
+            <a:xfrm>
+              <a:off x="2205002" y="3306746"/>
+              <a:ext cx="180000" cy="256000"/>
+              <a:chOff x="3779698" y="803945"/>
+              <a:chExt cx="1696900" cy="2223748"/>
+            </a:xfrm>
+          </p:grpSpPr>
+          <p:sp>
+            <p:nvSpPr>
+              <p:cNvPr id="98" name="Retângulo 97">
+                <a:extLst>
+                  <a:ext uri="{FF2B5EF4-FFF2-40B4-BE49-F238E27FC236}">
+                    <a16:creationId xmlns:a16="http://schemas.microsoft.com/office/drawing/2014/main" id="{55989BC5-2555-2873-F610-4CE124315995}"/>
+                  </a:ext>
+                </a:extLst>
+              </p:cNvPr>
+              <p:cNvSpPr/>
+              <p:nvPr/>
+            </p:nvSpPr>
+            <p:spPr>
+              <a:xfrm rot="5400000">
+                <a:off x="4270566" y="1337952"/>
+                <a:ext cx="245863" cy="1227600"/>
+              </a:xfrm>
+              <a:prstGeom prst="rect">
+                <a:avLst/>
+              </a:prstGeom>
+              <a:solidFill>
+                <a:schemeClr val="bg2">
+                  <a:lumMod val="50000"/>
+                </a:schemeClr>
+              </a:solidFill>
+              <a:ln>
+                <a:solidFill>
+                  <a:schemeClr val="bg2">
+                    <a:lumMod val="50000"/>
+                  </a:schemeClr>
+                </a:solidFill>
+              </a:ln>
+            </p:spPr>
+            <p:style>
+              <a:lnRef idx="2">
+                <a:schemeClr val="accent1">
+                  <a:shade val="50000"/>
+                </a:schemeClr>
+              </a:lnRef>
+              <a:fillRef idx="1">
+                <a:schemeClr val="accent1"/>
+              </a:fillRef>
+              <a:effectRef idx="0">
+                <a:schemeClr val="accent1"/>
+              </a:effectRef>
+              <a:fontRef idx="minor">
+                <a:schemeClr val="lt1"/>
+              </a:fontRef>
+            </p:style>
+            <p:txBody>
+              <a:bodyPr rtlCol="0" anchor="ctr"/>
+              <a:lstStyle/>
+              <a:p>
+                <a:pPr algn="ctr"/>
+                <a:endParaRPr lang="pt-PT" dirty="0"/>
+              </a:p>
+            </p:txBody>
+          </p:sp>
+          <p:sp>
+            <p:nvSpPr>
+              <p:cNvPr id="99" name="Retângulo 98">
+                <a:extLst>
+                  <a:ext uri="{FF2B5EF4-FFF2-40B4-BE49-F238E27FC236}">
+                    <a16:creationId xmlns:a16="http://schemas.microsoft.com/office/drawing/2014/main" id="{71D89E37-DDF4-15E0-D6D2-D2E97B5F1B2A}"/>
+                  </a:ext>
+                </a:extLst>
+              </p:cNvPr>
+              <p:cNvSpPr/>
+              <p:nvPr/>
+            </p:nvSpPr>
+            <p:spPr>
+              <a:xfrm rot="8598820">
+                <a:off x="5230735" y="1800093"/>
+                <a:ext cx="245863" cy="1227600"/>
+              </a:xfrm>
+              <a:prstGeom prst="rect">
+                <a:avLst/>
+              </a:prstGeom>
+              <a:solidFill>
+                <a:schemeClr val="bg2">
+                  <a:lumMod val="50000"/>
+                </a:schemeClr>
+              </a:solidFill>
+              <a:ln>
+                <a:solidFill>
+                  <a:schemeClr val="bg2">
+                    <a:lumMod val="50000"/>
+                  </a:schemeClr>
+                </a:solidFill>
+              </a:ln>
+            </p:spPr>
+            <p:style>
+              <a:lnRef idx="2">
+                <a:schemeClr val="accent1">
+                  <a:shade val="50000"/>
+                </a:schemeClr>
+              </a:lnRef>
+              <a:fillRef idx="1">
+                <a:schemeClr val="accent1"/>
+              </a:fillRef>
+              <a:effectRef idx="0">
+                <a:schemeClr val="accent1"/>
+              </a:effectRef>
+              <a:fontRef idx="minor">
+                <a:schemeClr val="lt1"/>
+              </a:fontRef>
+            </p:style>
+            <p:txBody>
+              <a:bodyPr rtlCol="0" anchor="ctr"/>
+              <a:lstStyle/>
+              <a:p>
+                <a:pPr algn="ctr"/>
+                <a:endParaRPr lang="pt-PT" dirty="0"/>
+              </a:p>
+            </p:txBody>
+          </p:sp>
+          <p:sp>
+            <p:nvSpPr>
+              <p:cNvPr id="100" name="Retângulo 99">
+                <a:extLst>
+                  <a:ext uri="{FF2B5EF4-FFF2-40B4-BE49-F238E27FC236}">
+                    <a16:creationId xmlns:a16="http://schemas.microsoft.com/office/drawing/2014/main" id="{021985E4-A1D4-971A-B599-8B6D998D8230}"/>
+                  </a:ext>
+                </a:extLst>
+              </p:cNvPr>
+              <p:cNvSpPr/>
+              <p:nvPr/>
+            </p:nvSpPr>
+            <p:spPr>
+              <a:xfrm rot="12648134">
+                <a:off x="5188059" y="803945"/>
+                <a:ext cx="245862" cy="1227596"/>
+              </a:xfrm>
+              <a:prstGeom prst="rect">
+                <a:avLst/>
+              </a:prstGeom>
+              <a:solidFill>
+                <a:schemeClr val="bg2">
+                  <a:lumMod val="50000"/>
+                </a:schemeClr>
+              </a:solidFill>
+              <a:ln>
+                <a:solidFill>
+                  <a:schemeClr val="bg2">
+                    <a:lumMod val="50000"/>
+                  </a:schemeClr>
+                </a:solidFill>
+              </a:ln>
+            </p:spPr>
+            <p:style>
+              <a:lnRef idx="2">
+                <a:schemeClr val="accent1">
+                  <a:shade val="50000"/>
+                </a:schemeClr>
+              </a:lnRef>
+              <a:fillRef idx="1">
+                <a:schemeClr val="accent1"/>
+              </a:fillRef>
+              <a:effectRef idx="0">
+                <a:schemeClr val="accent1"/>
+              </a:effectRef>
+              <a:fontRef idx="minor">
+                <a:schemeClr val="lt1"/>
+              </a:fontRef>
+            </p:style>
+            <p:txBody>
+              <a:bodyPr rtlCol="0" anchor="ctr"/>
+              <a:lstStyle/>
+              <a:p>
+                <a:pPr algn="ctr"/>
+                <a:endParaRPr lang="pt-PT" dirty="0"/>
+              </a:p>
+            </p:txBody>
+          </p:sp>
+        </p:grpSp>
+        <p:sp>
+          <p:nvSpPr>
+            <p:cNvPr id="105" name="CaixaDeTexto 104">
+              <a:extLst>
+                <a:ext uri="{FF2B5EF4-FFF2-40B4-BE49-F238E27FC236}">
+                  <a16:creationId xmlns:a16="http://schemas.microsoft.com/office/drawing/2014/main" id="{B3AF3909-C915-C07B-1D65-8308A8D5707F}"/>
+                </a:ext>
+              </a:extLst>
+            </p:cNvPr>
+            <p:cNvSpPr txBox="1"/>
+            <p:nvPr/>
+          </p:nvSpPr>
+          <p:spPr>
+            <a:xfrm>
+              <a:off x="2406097" y="3301030"/>
+              <a:ext cx="1783469" cy="246221"/>
+            </a:xfrm>
+            <a:prstGeom prst="rect">
+              <a:avLst/>
+            </a:prstGeom>
+            <a:noFill/>
+          </p:spPr>
+          <p:txBody>
+            <a:bodyPr wrap="square" rtlCol="0">
+              <a:spAutoFit/>
+            </a:bodyPr>
+            <a:lstStyle/>
+            <a:p>
+              <a:r>
+                <a:rPr lang="pt-PT" sz="1000" dirty="0"/>
+                <a:t>-</a:t>
+              </a:r>
+              <a:r>
+                <a:rPr lang="pt-PT" sz="800" dirty="0"/>
+                <a:t>Electric Rotor</a:t>
+              </a:r>
+            </a:p>
+          </p:txBody>
+        </p:sp>
+      </p:grpSp>
+      <p:sp>
+        <p:nvSpPr>
+          <p:cNvPr id="2" name="Arrow: Right 1">
+            <a:extLst>
+              <a:ext uri="{FF2B5EF4-FFF2-40B4-BE49-F238E27FC236}">
+                <a16:creationId xmlns:a16="http://schemas.microsoft.com/office/drawing/2014/main" id="{5C823BAD-FE97-4FD1-8815-5BA34DC4F792}"/>
+              </a:ext>
+            </a:extLst>
+          </p:cNvPr>
+          <p:cNvSpPr/>
+          <p:nvPr/>
+        </p:nvSpPr>
+        <p:spPr>
+          <a:xfrm>
+            <a:off x="4103532" y="4814222"/>
+            <a:ext cx="2254840" cy="51081"/>
+          </a:xfrm>
+          <a:prstGeom prst="rightArrow">
+            <a:avLst/>
+          </a:prstGeom>
+        </p:spPr>
+        <p:style>
+          <a:lnRef idx="2">
+            <a:schemeClr val="accent1">
+              <a:shade val="50000"/>
+            </a:schemeClr>
+          </a:lnRef>
+          <a:fillRef idx="1">
+            <a:schemeClr val="accent1"/>
+          </a:fillRef>
+          <a:effectRef idx="0">
+            <a:schemeClr val="accent1"/>
+          </a:effectRef>
+          <a:fontRef idx="minor">
+            <a:schemeClr val="lt1"/>
+          </a:fontRef>
+        </p:style>
+        <p:txBody>
+          <a:bodyPr rtlCol="0" anchor="ctr"/>
+          <a:lstStyle/>
+          <a:p>
+            <a:pPr algn="ctr"/>
+            <a:endParaRPr lang="en-US"/>
+          </a:p>
+        </p:txBody>
+      </p:sp>
+      <p:sp>
+        <p:nvSpPr>
+          <p:cNvPr id="4" name="Arrow: Up 3">
+            <a:extLst>
+              <a:ext uri="{FF2B5EF4-FFF2-40B4-BE49-F238E27FC236}">
+                <a16:creationId xmlns:a16="http://schemas.microsoft.com/office/drawing/2014/main" id="{16C16668-3A65-41EC-A588-85C0B48AEF43}"/>
+              </a:ext>
+            </a:extLst>
+          </p:cNvPr>
+          <p:cNvSpPr/>
+          <p:nvPr/>
+        </p:nvSpPr>
+        <p:spPr>
+          <a:xfrm>
+            <a:off x="6684595" y="3929449"/>
+            <a:ext cx="45719" cy="763223"/>
+          </a:xfrm>
+          <a:prstGeom prst="upArrow">
+            <a:avLst/>
+          </a:prstGeom>
+        </p:spPr>
+        <p:style>
+          <a:lnRef idx="2">
+            <a:schemeClr val="accent1">
+              <a:shade val="50000"/>
+            </a:schemeClr>
+          </a:lnRef>
+          <a:fillRef idx="1">
+            <a:schemeClr val="accent1"/>
+          </a:fillRef>
+          <a:effectRef idx="0">
+            <a:schemeClr val="accent1"/>
+          </a:effectRef>
+          <a:fontRef idx="minor">
+            <a:schemeClr val="lt1"/>
+          </a:fontRef>
+        </p:style>
+        <p:txBody>
+          <a:bodyPr rtlCol="0" anchor="ctr"/>
+          <a:lstStyle/>
+          <a:p>
+            <a:pPr algn="ctr"/>
+            <a:endParaRPr lang="en-US"/>
+          </a:p>
+        </p:txBody>
+      </p:sp>
+      <p:sp>
+        <p:nvSpPr>
+          <p:cNvPr id="76" name="Arrow: Up 75">
+            <a:extLst>
+              <a:ext uri="{FF2B5EF4-FFF2-40B4-BE49-F238E27FC236}">
+                <a16:creationId xmlns:a16="http://schemas.microsoft.com/office/drawing/2014/main" id="{F7E56AA2-57EE-444F-85E0-50F0927FFF3F}"/>
+              </a:ext>
+            </a:extLst>
+          </p:cNvPr>
+          <p:cNvSpPr/>
+          <p:nvPr/>
+        </p:nvSpPr>
+        <p:spPr>
+          <a:xfrm flipV="1">
+            <a:off x="6690568" y="4988194"/>
+            <a:ext cx="45719" cy="763223"/>
+          </a:xfrm>
+          <a:prstGeom prst="upArrow">
+            <a:avLst/>
+          </a:prstGeom>
+        </p:spPr>
+        <p:style>
+          <a:lnRef idx="2">
+            <a:schemeClr val="accent1">
+              <a:shade val="50000"/>
+            </a:schemeClr>
+          </a:lnRef>
+          <a:fillRef idx="1">
+            <a:schemeClr val="accent1"/>
+          </a:fillRef>
+          <a:effectRef idx="0">
+            <a:schemeClr val="accent1"/>
+          </a:effectRef>
+          <a:fontRef idx="minor">
+            <a:schemeClr val="lt1"/>
+          </a:fontRef>
+        </p:style>
+        <p:txBody>
+          <a:bodyPr rtlCol="0" anchor="ctr"/>
+          <a:lstStyle/>
+          <a:p>
+            <a:pPr algn="ctr"/>
+            <a:endParaRPr lang="en-US"/>
+          </a:p>
+        </p:txBody>
+      </p:sp>
+    </p:spTree>
+    <p:extLst>
+      <p:ext uri="{BB962C8B-B14F-4D97-AF65-F5344CB8AC3E}">
+        <p14:creationId xmlns:p14="http://schemas.microsoft.com/office/powerpoint/2010/main" val="3667165424"/>
+      </p:ext>
+    </p:extLst>
+  </p:cSld>
+  <p:clrMapOvr>
+    <a:masterClrMapping/>
+  </p:clrMapOvr>
+</p:sld>
+</file>
+
 <file path=ppt/theme/theme1.xml><?xml version="1.0" encoding="utf-8"?>
 <a:theme xmlns:a="http://schemas.openxmlformats.org/drawingml/2006/main" name="Tema do Office">
   <a:themeElements>

</xml_diff>

<commit_message>
Plano de Evacuação VP
</commit_message>
<xml_diff>
--- a/DesignDeAltoNivel.pptx
+++ b/DesignDeAltoNivel.pptx
@@ -10,6 +10,7 @@
     <p:sldId id="261" r:id="rId4"/>
     <p:sldId id="258" r:id="rId5"/>
     <p:sldId id="259" r:id="rId6"/>
+    <p:sldId id="262" r:id="rId7"/>
   </p:sldIdLst>
   <p:sldSz cx="12192000" cy="6858000"/>
   <p:notesSz cx="6858000" cy="9144000"/>
@@ -16597,7 +16598,7 @@
               </a:r>
               <a:r>
                 <a:rPr lang="pt-PT" sz="800" dirty="0"/>
-                <a:t>Emergency Exits</a:t>
+                <a:t>Emergency Exit</a:t>
               </a:r>
             </a:p>
           </p:txBody>
@@ -16607,6 +16608,2329 @@
     <p:extLst>
       <p:ext uri="{BB962C8B-B14F-4D97-AF65-F5344CB8AC3E}">
         <p14:creationId xmlns:p14="http://schemas.microsoft.com/office/powerpoint/2010/main" val="3667165424"/>
+      </p:ext>
+    </p:extLst>
+  </p:cSld>
+  <p:clrMapOvr>
+    <a:masterClrMapping/>
+  </p:clrMapOvr>
+</p:sld>
+</file>
+
+<file path=ppt/slides/slide6.xml><?xml version="1.0" encoding="utf-8"?>
+<p:sld xmlns:a="http://schemas.openxmlformats.org/drawingml/2006/main" xmlns:r="http://schemas.openxmlformats.org/officeDocument/2006/relationships" xmlns:p="http://schemas.openxmlformats.org/presentationml/2006/main">
+  <p:cSld>
+    <p:spTree>
+      <p:nvGrpSpPr>
+        <p:cNvPr id="1" name=""/>
+        <p:cNvGrpSpPr/>
+        <p:nvPr/>
+      </p:nvGrpSpPr>
+      <p:grpSpPr>
+        <a:xfrm>
+          <a:off x="0" y="0"/>
+          <a:ext cx="0" cy="0"/>
+          <a:chOff x="0" y="0"/>
+          <a:chExt cx="0" cy="0"/>
+        </a:xfrm>
+      </p:grpSpPr>
+      <p:grpSp>
+        <p:nvGrpSpPr>
+          <p:cNvPr id="12" name="Group 11">
+            <a:extLst>
+              <a:ext uri="{FF2B5EF4-FFF2-40B4-BE49-F238E27FC236}">
+                <a16:creationId xmlns:a16="http://schemas.microsoft.com/office/drawing/2014/main" id="{5FDE1FD9-FAA5-4F9E-BE3A-DDF56B8790E9}"/>
+              </a:ext>
+            </a:extLst>
+          </p:cNvPr>
+          <p:cNvGrpSpPr/>
+          <p:nvPr/>
+        </p:nvGrpSpPr>
+        <p:grpSpPr>
+          <a:xfrm>
+            <a:off x="1913721" y="787470"/>
+            <a:ext cx="6684761" cy="4930996"/>
+            <a:chOff x="1913721" y="787470"/>
+            <a:chExt cx="6684761" cy="4930996"/>
+          </a:xfrm>
+        </p:grpSpPr>
+        <p:grpSp>
+          <p:nvGrpSpPr>
+            <p:cNvPr id="11" name="Group 10">
+              <a:extLst>
+                <a:ext uri="{FF2B5EF4-FFF2-40B4-BE49-F238E27FC236}">
+                  <a16:creationId xmlns:a16="http://schemas.microsoft.com/office/drawing/2014/main" id="{68FEDF00-BC94-4BCF-9EF3-1EE07170067E}"/>
+                </a:ext>
+              </a:extLst>
+            </p:cNvPr>
+            <p:cNvGrpSpPr/>
+            <p:nvPr/>
+          </p:nvGrpSpPr>
+          <p:grpSpPr>
+            <a:xfrm>
+              <a:off x="1941392" y="787470"/>
+              <a:ext cx="6657090" cy="4930996"/>
+              <a:chOff x="2237954" y="820421"/>
+              <a:chExt cx="6657090" cy="4930996"/>
+            </a:xfrm>
+          </p:grpSpPr>
+          <p:grpSp>
+            <p:nvGrpSpPr>
+              <p:cNvPr id="112" name="Agrupar 111">
+                <a:extLst>
+                  <a:ext uri="{FF2B5EF4-FFF2-40B4-BE49-F238E27FC236}">
+                    <a16:creationId xmlns:a16="http://schemas.microsoft.com/office/drawing/2014/main" id="{CB3BEEB5-D039-7BAA-4AE4-476AA991CF53}"/>
+                  </a:ext>
+                </a:extLst>
+              </p:cNvPr>
+              <p:cNvGrpSpPr/>
+              <p:nvPr/>
+            </p:nvGrpSpPr>
+            <p:grpSpPr>
+              <a:xfrm>
+                <a:off x="2237954" y="820421"/>
+                <a:ext cx="6657090" cy="4723095"/>
+                <a:chOff x="2205002" y="803945"/>
+                <a:chExt cx="6657090" cy="4723095"/>
+              </a:xfrm>
+            </p:grpSpPr>
+            <p:grpSp>
+              <p:nvGrpSpPr>
+                <p:cNvPr id="13" name="Agrupar 12">
+                  <a:extLst>
+                    <a:ext uri="{FF2B5EF4-FFF2-40B4-BE49-F238E27FC236}">
+                      <a16:creationId xmlns:a16="http://schemas.microsoft.com/office/drawing/2014/main" id="{7D681D2C-1226-68D3-E858-81DF708ADBF9}"/>
+                    </a:ext>
+                  </a:extLst>
+                </p:cNvPr>
+                <p:cNvGrpSpPr/>
+                <p:nvPr/>
+              </p:nvGrpSpPr>
+              <p:grpSpPr>
+                <a:xfrm flipH="1">
+                  <a:off x="3089239" y="1848232"/>
+                  <a:ext cx="5538906" cy="3678808"/>
+                  <a:chOff x="3203563" y="990982"/>
+                  <a:chExt cx="5538906" cy="3678808"/>
+                </a:xfrm>
+              </p:grpSpPr>
+              <p:sp>
+                <p:nvSpPr>
+                  <p:cNvPr id="8" name="Retângulo 7">
+                    <a:extLst>
+                      <a:ext uri="{FF2B5EF4-FFF2-40B4-BE49-F238E27FC236}">
+                        <a16:creationId xmlns:a16="http://schemas.microsoft.com/office/drawing/2014/main" id="{9E6BDAEE-2DF3-B4FD-6729-0E9FE57D7A76}"/>
+                      </a:ext>
+                    </a:extLst>
+                  </p:cNvPr>
+                  <p:cNvSpPr/>
+                  <p:nvPr/>
+                </p:nvSpPr>
+                <p:spPr>
+                  <a:xfrm>
+                    <a:off x="3510280" y="990982"/>
+                    <a:ext cx="1226820" cy="3337178"/>
+                  </a:xfrm>
+                  <a:prstGeom prst="rect">
+                    <a:avLst/>
+                  </a:prstGeom>
+                  <a:solidFill>
+                    <a:schemeClr val="bg2">
+                      <a:lumMod val="90000"/>
+                    </a:schemeClr>
+                  </a:solidFill>
+                  <a:ln>
+                    <a:solidFill>
+                      <a:schemeClr val="bg2">
+                        <a:lumMod val="50000"/>
+                      </a:schemeClr>
+                    </a:solidFill>
+                  </a:ln>
+                </p:spPr>
+                <p:style>
+                  <a:lnRef idx="2">
+                    <a:schemeClr val="accent1">
+                      <a:shade val="50000"/>
+                    </a:schemeClr>
+                  </a:lnRef>
+                  <a:fillRef idx="1">
+                    <a:schemeClr val="accent1"/>
+                  </a:fillRef>
+                  <a:effectRef idx="0">
+                    <a:schemeClr val="accent1"/>
+                  </a:effectRef>
+                  <a:fontRef idx="minor">
+                    <a:schemeClr val="lt1"/>
+                  </a:fontRef>
+                </p:style>
+                <p:txBody>
+                  <a:bodyPr rtlCol="0" anchor="ctr"/>
+                  <a:lstStyle/>
+                  <a:p>
+                    <a:pPr algn="ctr"/>
+                    <a:endParaRPr lang="pt-PT" dirty="0"/>
+                  </a:p>
+                </p:txBody>
+              </p:sp>
+              <p:sp>
+                <p:nvSpPr>
+                  <p:cNvPr id="9" name="Retângulo 8">
+                    <a:extLst>
+                      <a:ext uri="{FF2B5EF4-FFF2-40B4-BE49-F238E27FC236}">
+                        <a16:creationId xmlns:a16="http://schemas.microsoft.com/office/drawing/2014/main" id="{064401E6-1760-7B57-FA17-A25A90420738}"/>
+                      </a:ext>
+                    </a:extLst>
+                  </p:cNvPr>
+                  <p:cNvSpPr/>
+                  <p:nvPr/>
+                </p:nvSpPr>
+                <p:spPr>
+                  <a:xfrm>
+                    <a:off x="6173966" y="990982"/>
+                    <a:ext cx="1226820" cy="3337178"/>
+                  </a:xfrm>
+                  <a:prstGeom prst="rect">
+                    <a:avLst/>
+                  </a:prstGeom>
+                  <a:solidFill>
+                    <a:schemeClr val="bg2">
+                      <a:lumMod val="90000"/>
+                    </a:schemeClr>
+                  </a:solidFill>
+                  <a:ln>
+                    <a:solidFill>
+                      <a:schemeClr val="bg2">
+                        <a:lumMod val="50000"/>
+                      </a:schemeClr>
+                    </a:solidFill>
+                  </a:ln>
+                </p:spPr>
+                <p:style>
+                  <a:lnRef idx="2">
+                    <a:schemeClr val="accent1">
+                      <a:shade val="50000"/>
+                    </a:schemeClr>
+                  </a:lnRef>
+                  <a:fillRef idx="1">
+                    <a:schemeClr val="accent1"/>
+                  </a:fillRef>
+                  <a:effectRef idx="0">
+                    <a:schemeClr val="accent1"/>
+                  </a:effectRef>
+                  <a:fontRef idx="minor">
+                    <a:schemeClr val="lt1"/>
+                  </a:fontRef>
+                </p:style>
+                <p:txBody>
+                  <a:bodyPr rtlCol="0" anchor="ctr"/>
+                  <a:lstStyle/>
+                  <a:p>
+                    <a:pPr algn="ctr"/>
+                    <a:endParaRPr lang="pt-PT" dirty="0"/>
+                  </a:p>
+                </p:txBody>
+              </p:sp>
+              <p:sp>
+                <p:nvSpPr>
+                  <p:cNvPr id="6" name="Retângulo 5">
+                    <a:extLst>
+                      <a:ext uri="{FF2B5EF4-FFF2-40B4-BE49-F238E27FC236}">
+                        <a16:creationId xmlns:a16="http://schemas.microsoft.com/office/drawing/2014/main" id="{A8A3E4C9-41B0-CAE7-7F23-19CECA504009}"/>
+                      </a:ext>
+                    </a:extLst>
+                  </p:cNvPr>
+                  <p:cNvSpPr/>
+                  <p:nvPr/>
+                </p:nvSpPr>
+                <p:spPr>
+                  <a:xfrm>
+                    <a:off x="4119217" y="3269974"/>
+                    <a:ext cx="3988905" cy="1393466"/>
+                  </a:xfrm>
+                  <a:prstGeom prst="rect">
+                    <a:avLst/>
+                  </a:prstGeom>
+                  <a:solidFill>
+                    <a:schemeClr val="bg2">
+                      <a:lumMod val="90000"/>
+                    </a:schemeClr>
+                  </a:solidFill>
+                  <a:ln>
+                    <a:solidFill>
+                      <a:schemeClr val="bg2">
+                        <a:lumMod val="50000"/>
+                      </a:schemeClr>
+                    </a:solidFill>
+                  </a:ln>
+                </p:spPr>
+                <p:style>
+                  <a:lnRef idx="2">
+                    <a:schemeClr val="accent1">
+                      <a:shade val="50000"/>
+                    </a:schemeClr>
+                  </a:lnRef>
+                  <a:fillRef idx="1">
+                    <a:schemeClr val="accent1"/>
+                  </a:fillRef>
+                  <a:effectRef idx="0">
+                    <a:schemeClr val="accent1"/>
+                  </a:effectRef>
+                  <a:fontRef idx="minor">
+                    <a:schemeClr val="lt1"/>
+                  </a:fontRef>
+                </p:style>
+                <p:txBody>
+                  <a:bodyPr rtlCol="0" anchor="ctr"/>
+                  <a:lstStyle/>
+                  <a:p>
+                    <a:pPr algn="ctr"/>
+                    <a:endParaRPr lang="pt-PT" dirty="0"/>
+                  </a:p>
+                </p:txBody>
+              </p:sp>
+              <p:sp>
+                <p:nvSpPr>
+                  <p:cNvPr id="7" name="Fluxograma: Atraso 6">
+                    <a:extLst>
+                      <a:ext uri="{FF2B5EF4-FFF2-40B4-BE49-F238E27FC236}">
+                        <a16:creationId xmlns:a16="http://schemas.microsoft.com/office/drawing/2014/main" id="{A6DF496E-F81E-8138-F775-0BB5981FBC7C}"/>
+                      </a:ext>
+                    </a:extLst>
+                  </p:cNvPr>
+                  <p:cNvSpPr/>
+                  <p:nvPr/>
+                </p:nvSpPr>
+                <p:spPr>
+                  <a:xfrm flipH="1">
+                    <a:off x="3203563" y="3269974"/>
+                    <a:ext cx="915654" cy="1393466"/>
+                  </a:xfrm>
+                  <a:custGeom>
+                    <a:avLst/>
+                    <a:gdLst>
+                      <a:gd name="connsiteX0" fmla="*/ 0 w 915642"/>
+                      <a:gd name="connsiteY0" fmla="*/ 0 h 1393466"/>
+                      <a:gd name="connsiteX1" fmla="*/ 457821 w 915642"/>
+                      <a:gd name="connsiteY1" fmla="*/ 0 h 1393466"/>
+                      <a:gd name="connsiteX2" fmla="*/ 915642 w 915642"/>
+                      <a:gd name="connsiteY2" fmla="*/ 696733 h 1393466"/>
+                      <a:gd name="connsiteX3" fmla="*/ 457821 w 915642"/>
+                      <a:gd name="connsiteY3" fmla="*/ 1393466 h 1393466"/>
+                      <a:gd name="connsiteX4" fmla="*/ 0 w 915642"/>
+                      <a:gd name="connsiteY4" fmla="*/ 1393466 h 1393466"/>
+                      <a:gd name="connsiteX5" fmla="*/ 0 w 915642"/>
+                      <a:gd name="connsiteY5" fmla="*/ 0 h 1393466"/>
+                      <a:gd name="connsiteX0" fmla="*/ 0 w 921802"/>
+                      <a:gd name="connsiteY0" fmla="*/ 0 h 1393466"/>
+                      <a:gd name="connsiteX1" fmla="*/ 162546 w 921802"/>
+                      <a:gd name="connsiteY1" fmla="*/ 9525 h 1393466"/>
+                      <a:gd name="connsiteX2" fmla="*/ 915642 w 921802"/>
+                      <a:gd name="connsiteY2" fmla="*/ 696733 h 1393466"/>
+                      <a:gd name="connsiteX3" fmla="*/ 457821 w 921802"/>
+                      <a:gd name="connsiteY3" fmla="*/ 1393466 h 1393466"/>
+                      <a:gd name="connsiteX4" fmla="*/ 0 w 921802"/>
+                      <a:gd name="connsiteY4" fmla="*/ 1393466 h 1393466"/>
+                      <a:gd name="connsiteX5" fmla="*/ 0 w 921802"/>
+                      <a:gd name="connsiteY5" fmla="*/ 0 h 1393466"/>
+                      <a:gd name="connsiteX0" fmla="*/ 0 w 917247"/>
+                      <a:gd name="connsiteY0" fmla="*/ 0 h 1393466"/>
+                      <a:gd name="connsiteX1" fmla="*/ 319709 w 917247"/>
+                      <a:gd name="connsiteY1" fmla="*/ 4762 h 1393466"/>
+                      <a:gd name="connsiteX2" fmla="*/ 915642 w 917247"/>
+                      <a:gd name="connsiteY2" fmla="*/ 696733 h 1393466"/>
+                      <a:gd name="connsiteX3" fmla="*/ 457821 w 917247"/>
+                      <a:gd name="connsiteY3" fmla="*/ 1393466 h 1393466"/>
+                      <a:gd name="connsiteX4" fmla="*/ 0 w 917247"/>
+                      <a:gd name="connsiteY4" fmla="*/ 1393466 h 1393466"/>
+                      <a:gd name="connsiteX5" fmla="*/ 0 w 917247"/>
+                      <a:gd name="connsiteY5" fmla="*/ 0 h 1393466"/>
+                      <a:gd name="connsiteX0" fmla="*/ 0 w 917247"/>
+                      <a:gd name="connsiteY0" fmla="*/ 0 h 1395582"/>
+                      <a:gd name="connsiteX1" fmla="*/ 319709 w 917247"/>
+                      <a:gd name="connsiteY1" fmla="*/ 4762 h 1395582"/>
+                      <a:gd name="connsiteX2" fmla="*/ 915642 w 917247"/>
+                      <a:gd name="connsiteY2" fmla="*/ 696733 h 1395582"/>
+                      <a:gd name="connsiteX3" fmla="*/ 457821 w 917247"/>
+                      <a:gd name="connsiteY3" fmla="*/ 1393466 h 1395582"/>
+                      <a:gd name="connsiteX4" fmla="*/ 0 w 917247"/>
+                      <a:gd name="connsiteY4" fmla="*/ 1393466 h 1395582"/>
+                      <a:gd name="connsiteX5" fmla="*/ 0 w 917247"/>
+                      <a:gd name="connsiteY5" fmla="*/ 0 h 1395582"/>
+                      <a:gd name="connsiteX0" fmla="*/ 0 w 916004"/>
+                      <a:gd name="connsiteY0" fmla="*/ 0 h 1395582"/>
+                      <a:gd name="connsiteX1" fmla="*/ 319709 w 916004"/>
+                      <a:gd name="connsiteY1" fmla="*/ 4762 h 1395582"/>
+                      <a:gd name="connsiteX2" fmla="*/ 915642 w 916004"/>
+                      <a:gd name="connsiteY2" fmla="*/ 696733 h 1395582"/>
+                      <a:gd name="connsiteX3" fmla="*/ 391146 w 916004"/>
+                      <a:gd name="connsiteY3" fmla="*/ 1393466 h 1395582"/>
+                      <a:gd name="connsiteX4" fmla="*/ 0 w 916004"/>
+                      <a:gd name="connsiteY4" fmla="*/ 1393466 h 1395582"/>
+                      <a:gd name="connsiteX5" fmla="*/ 0 w 916004"/>
+                      <a:gd name="connsiteY5" fmla="*/ 0 h 1395582"/>
+                      <a:gd name="connsiteX0" fmla="*/ 0 w 915678"/>
+                      <a:gd name="connsiteY0" fmla="*/ 0 h 1399561"/>
+                      <a:gd name="connsiteX1" fmla="*/ 319709 w 915678"/>
+                      <a:gd name="connsiteY1" fmla="*/ 4762 h 1399561"/>
+                      <a:gd name="connsiteX2" fmla="*/ 915642 w 915678"/>
+                      <a:gd name="connsiteY2" fmla="*/ 696733 h 1399561"/>
+                      <a:gd name="connsiteX3" fmla="*/ 343521 w 915678"/>
+                      <a:gd name="connsiteY3" fmla="*/ 1398228 h 1399561"/>
+                      <a:gd name="connsiteX4" fmla="*/ 0 w 915678"/>
+                      <a:gd name="connsiteY4" fmla="*/ 1393466 h 1399561"/>
+                      <a:gd name="connsiteX5" fmla="*/ 0 w 915678"/>
+                      <a:gd name="connsiteY5" fmla="*/ 0 h 1399561"/>
+                      <a:gd name="connsiteX0" fmla="*/ 0 w 915654"/>
+                      <a:gd name="connsiteY0" fmla="*/ 0 h 1393466"/>
+                      <a:gd name="connsiteX1" fmla="*/ 319709 w 915654"/>
+                      <a:gd name="connsiteY1" fmla="*/ 4762 h 1393466"/>
+                      <a:gd name="connsiteX2" fmla="*/ 915642 w 915654"/>
+                      <a:gd name="connsiteY2" fmla="*/ 696733 h 1393466"/>
+                      <a:gd name="connsiteX3" fmla="*/ 333996 w 915654"/>
+                      <a:gd name="connsiteY3" fmla="*/ 1391878 h 1393466"/>
+                      <a:gd name="connsiteX4" fmla="*/ 0 w 915654"/>
+                      <a:gd name="connsiteY4" fmla="*/ 1393466 h 1393466"/>
+                      <a:gd name="connsiteX5" fmla="*/ 0 w 915654"/>
+                      <a:gd name="connsiteY5" fmla="*/ 0 h 1393466"/>
+                    </a:gdLst>
+                    <a:ahLst/>
+                    <a:cxnLst>
+                      <a:cxn ang="0">
+                        <a:pos x="connsiteX0" y="connsiteY0"/>
+                      </a:cxn>
+                      <a:cxn ang="0">
+                        <a:pos x="connsiteX1" y="connsiteY1"/>
+                      </a:cxn>
+                      <a:cxn ang="0">
+                        <a:pos x="connsiteX2" y="connsiteY2"/>
+                      </a:cxn>
+                      <a:cxn ang="0">
+                        <a:pos x="connsiteX3" y="connsiteY3"/>
+                      </a:cxn>
+                      <a:cxn ang="0">
+                        <a:pos x="connsiteX4" y="connsiteY4"/>
+                      </a:cxn>
+                      <a:cxn ang="0">
+                        <a:pos x="connsiteX5" y="connsiteY5"/>
+                      </a:cxn>
+                    </a:cxnLst>
+                    <a:rect l="l" t="t" r="r" b="b"/>
+                    <a:pathLst>
+                      <a:path w="915654" h="1393466">
+                        <a:moveTo>
+                          <a:pt x="0" y="0"/>
+                        </a:moveTo>
+                        <a:cubicBezTo>
+                          <a:pt x="152607" y="0"/>
+                          <a:pt x="167102" y="4762"/>
+                          <a:pt x="319709" y="4762"/>
+                        </a:cubicBezTo>
+                        <a:cubicBezTo>
+                          <a:pt x="572557" y="4762"/>
+                          <a:pt x="913261" y="465547"/>
+                          <a:pt x="915642" y="696733"/>
+                        </a:cubicBezTo>
+                        <a:cubicBezTo>
+                          <a:pt x="918023" y="927919"/>
+                          <a:pt x="586844" y="1391878"/>
+                          <a:pt x="333996" y="1391878"/>
+                        </a:cubicBezTo>
+                        <a:lnTo>
+                          <a:pt x="0" y="1393466"/>
+                        </a:lnTo>
+                        <a:lnTo>
+                          <a:pt x="0" y="0"/>
+                        </a:lnTo>
+                        <a:close/>
+                      </a:path>
+                    </a:pathLst>
+                  </a:custGeom>
+                  <a:solidFill>
+                    <a:schemeClr val="bg2">
+                      <a:lumMod val="90000"/>
+                    </a:schemeClr>
+                  </a:solidFill>
+                  <a:ln>
+                    <a:solidFill>
+                      <a:schemeClr val="bg2">
+                        <a:lumMod val="50000"/>
+                      </a:schemeClr>
+                    </a:solidFill>
+                  </a:ln>
+                </p:spPr>
+                <p:style>
+                  <a:lnRef idx="2">
+                    <a:schemeClr val="accent1">
+                      <a:shade val="50000"/>
+                    </a:schemeClr>
+                  </a:lnRef>
+                  <a:fillRef idx="1">
+                    <a:schemeClr val="accent1"/>
+                  </a:fillRef>
+                  <a:effectRef idx="0">
+                    <a:schemeClr val="accent1"/>
+                  </a:effectRef>
+                  <a:fontRef idx="minor">
+                    <a:schemeClr val="lt1"/>
+                  </a:fontRef>
+                </p:style>
+                <p:txBody>
+                  <a:bodyPr rtlCol="0" anchor="ctr"/>
+                  <a:lstStyle/>
+                  <a:p>
+                    <a:pPr algn="ctr"/>
+                    <a:endParaRPr lang="pt-PT" dirty="0"/>
+                  </a:p>
+                </p:txBody>
+              </p:sp>
+              <p:sp>
+                <p:nvSpPr>
+                  <p:cNvPr id="10" name="Fluxograma: Atraso 9">
+                    <a:extLst>
+                      <a:ext uri="{FF2B5EF4-FFF2-40B4-BE49-F238E27FC236}">
+                        <a16:creationId xmlns:a16="http://schemas.microsoft.com/office/drawing/2014/main" id="{A0E66709-B77D-F6EA-3038-FEA15EC45FDC}"/>
+                      </a:ext>
+                    </a:extLst>
+                  </p:cNvPr>
+                  <p:cNvSpPr/>
+                  <p:nvPr/>
+                </p:nvSpPr>
+                <p:spPr>
+                  <a:xfrm>
+                    <a:off x="8108124" y="3263624"/>
+                    <a:ext cx="634345" cy="1406166"/>
+                  </a:xfrm>
+                  <a:custGeom>
+                    <a:avLst/>
+                    <a:gdLst>
+                      <a:gd name="connsiteX0" fmla="*/ 0 w 608937"/>
+                      <a:gd name="connsiteY0" fmla="*/ 0 h 1393466"/>
+                      <a:gd name="connsiteX1" fmla="*/ 304469 w 608937"/>
+                      <a:gd name="connsiteY1" fmla="*/ 0 h 1393466"/>
+                      <a:gd name="connsiteX2" fmla="*/ 608938 w 608937"/>
+                      <a:gd name="connsiteY2" fmla="*/ 696733 h 1393466"/>
+                      <a:gd name="connsiteX3" fmla="*/ 304469 w 608937"/>
+                      <a:gd name="connsiteY3" fmla="*/ 1393466 h 1393466"/>
+                      <a:gd name="connsiteX4" fmla="*/ 0 w 608937"/>
+                      <a:gd name="connsiteY4" fmla="*/ 1393466 h 1393466"/>
+                      <a:gd name="connsiteX5" fmla="*/ 0 w 608937"/>
+                      <a:gd name="connsiteY5" fmla="*/ 0 h 1393466"/>
+                      <a:gd name="connsiteX0" fmla="*/ 0 w 634338"/>
+                      <a:gd name="connsiteY0" fmla="*/ 0 h 1393466"/>
+                      <a:gd name="connsiteX1" fmla="*/ 304469 w 634338"/>
+                      <a:gd name="connsiteY1" fmla="*/ 0 h 1393466"/>
+                      <a:gd name="connsiteX2" fmla="*/ 634338 w 634338"/>
+                      <a:gd name="connsiteY2" fmla="*/ 696733 h 1393466"/>
+                      <a:gd name="connsiteX3" fmla="*/ 304469 w 634338"/>
+                      <a:gd name="connsiteY3" fmla="*/ 1393466 h 1393466"/>
+                      <a:gd name="connsiteX4" fmla="*/ 0 w 634338"/>
+                      <a:gd name="connsiteY4" fmla="*/ 1393466 h 1393466"/>
+                      <a:gd name="connsiteX5" fmla="*/ 0 w 634338"/>
+                      <a:gd name="connsiteY5" fmla="*/ 0 h 1393466"/>
+                      <a:gd name="connsiteX0" fmla="*/ 0 w 635654"/>
+                      <a:gd name="connsiteY0" fmla="*/ 0 h 1399816"/>
+                      <a:gd name="connsiteX1" fmla="*/ 304469 w 635654"/>
+                      <a:gd name="connsiteY1" fmla="*/ 0 h 1399816"/>
+                      <a:gd name="connsiteX2" fmla="*/ 634338 w 635654"/>
+                      <a:gd name="connsiteY2" fmla="*/ 696733 h 1399816"/>
+                      <a:gd name="connsiteX3" fmla="*/ 193344 w 635654"/>
+                      <a:gd name="connsiteY3" fmla="*/ 1399816 h 1399816"/>
+                      <a:gd name="connsiteX4" fmla="*/ 0 w 635654"/>
+                      <a:gd name="connsiteY4" fmla="*/ 1393466 h 1399816"/>
+                      <a:gd name="connsiteX5" fmla="*/ 0 w 635654"/>
+                      <a:gd name="connsiteY5" fmla="*/ 0 h 1399816"/>
+                      <a:gd name="connsiteX0" fmla="*/ 0 w 636413"/>
+                      <a:gd name="connsiteY0" fmla="*/ 0 h 1402991"/>
+                      <a:gd name="connsiteX1" fmla="*/ 304469 w 636413"/>
+                      <a:gd name="connsiteY1" fmla="*/ 0 h 1402991"/>
+                      <a:gd name="connsiteX2" fmla="*/ 634338 w 636413"/>
+                      <a:gd name="connsiteY2" fmla="*/ 696733 h 1402991"/>
+                      <a:gd name="connsiteX3" fmla="*/ 161594 w 636413"/>
+                      <a:gd name="connsiteY3" fmla="*/ 1402991 h 1402991"/>
+                      <a:gd name="connsiteX4" fmla="*/ 0 w 636413"/>
+                      <a:gd name="connsiteY4" fmla="*/ 1393466 h 1402991"/>
+                      <a:gd name="connsiteX5" fmla="*/ 0 w 636413"/>
+                      <a:gd name="connsiteY5" fmla="*/ 0 h 1402991"/>
+                      <a:gd name="connsiteX0" fmla="*/ 0 w 637888"/>
+                      <a:gd name="connsiteY0" fmla="*/ 0 h 1393466"/>
+                      <a:gd name="connsiteX1" fmla="*/ 304469 w 637888"/>
+                      <a:gd name="connsiteY1" fmla="*/ 0 h 1393466"/>
+                      <a:gd name="connsiteX2" fmla="*/ 634338 w 637888"/>
+                      <a:gd name="connsiteY2" fmla="*/ 696733 h 1393466"/>
+                      <a:gd name="connsiteX3" fmla="*/ 110794 w 637888"/>
+                      <a:gd name="connsiteY3" fmla="*/ 1390291 h 1393466"/>
+                      <a:gd name="connsiteX4" fmla="*/ 0 w 637888"/>
+                      <a:gd name="connsiteY4" fmla="*/ 1393466 h 1393466"/>
+                      <a:gd name="connsiteX5" fmla="*/ 0 w 637888"/>
+                      <a:gd name="connsiteY5" fmla="*/ 0 h 1393466"/>
+                      <a:gd name="connsiteX0" fmla="*/ 0 w 637888"/>
+                      <a:gd name="connsiteY0" fmla="*/ 0 h 1393466"/>
+                      <a:gd name="connsiteX1" fmla="*/ 304469 w 637888"/>
+                      <a:gd name="connsiteY1" fmla="*/ 0 h 1393466"/>
+                      <a:gd name="connsiteX2" fmla="*/ 634338 w 637888"/>
+                      <a:gd name="connsiteY2" fmla="*/ 696733 h 1393466"/>
+                      <a:gd name="connsiteX3" fmla="*/ 110794 w 637888"/>
+                      <a:gd name="connsiteY3" fmla="*/ 1390291 h 1393466"/>
+                      <a:gd name="connsiteX4" fmla="*/ 0 w 637888"/>
+                      <a:gd name="connsiteY4" fmla="*/ 1393466 h 1393466"/>
+                      <a:gd name="connsiteX5" fmla="*/ 0 w 637888"/>
+                      <a:gd name="connsiteY5" fmla="*/ 0 h 1393466"/>
+                      <a:gd name="connsiteX0" fmla="*/ 0 w 641730"/>
+                      <a:gd name="connsiteY0" fmla="*/ 0 h 1399816"/>
+                      <a:gd name="connsiteX1" fmla="*/ 304469 w 641730"/>
+                      <a:gd name="connsiteY1" fmla="*/ 0 h 1399816"/>
+                      <a:gd name="connsiteX2" fmla="*/ 634338 w 641730"/>
+                      <a:gd name="connsiteY2" fmla="*/ 696733 h 1399816"/>
+                      <a:gd name="connsiteX3" fmla="*/ 6019 w 641730"/>
+                      <a:gd name="connsiteY3" fmla="*/ 1399816 h 1399816"/>
+                      <a:gd name="connsiteX4" fmla="*/ 0 w 641730"/>
+                      <a:gd name="connsiteY4" fmla="*/ 1393466 h 1399816"/>
+                      <a:gd name="connsiteX5" fmla="*/ 0 w 641730"/>
+                      <a:gd name="connsiteY5" fmla="*/ 0 h 1399816"/>
+                      <a:gd name="connsiteX0" fmla="*/ 0 w 641730"/>
+                      <a:gd name="connsiteY0" fmla="*/ 0 h 1399816"/>
+                      <a:gd name="connsiteX1" fmla="*/ 304469 w 641730"/>
+                      <a:gd name="connsiteY1" fmla="*/ 0 h 1399816"/>
+                      <a:gd name="connsiteX2" fmla="*/ 634338 w 641730"/>
+                      <a:gd name="connsiteY2" fmla="*/ 696733 h 1399816"/>
+                      <a:gd name="connsiteX3" fmla="*/ 6019 w 641730"/>
+                      <a:gd name="connsiteY3" fmla="*/ 1399816 h 1399816"/>
+                      <a:gd name="connsiteX4" fmla="*/ 0 w 641730"/>
+                      <a:gd name="connsiteY4" fmla="*/ 1393466 h 1399816"/>
+                      <a:gd name="connsiteX5" fmla="*/ 0 w 641730"/>
+                      <a:gd name="connsiteY5" fmla="*/ 0 h 1399816"/>
+                      <a:gd name="connsiteX0" fmla="*/ 0 w 634338"/>
+                      <a:gd name="connsiteY0" fmla="*/ 0 h 1399816"/>
+                      <a:gd name="connsiteX1" fmla="*/ 9194 w 634338"/>
+                      <a:gd name="connsiteY1" fmla="*/ 12700 h 1399816"/>
+                      <a:gd name="connsiteX2" fmla="*/ 634338 w 634338"/>
+                      <a:gd name="connsiteY2" fmla="*/ 696733 h 1399816"/>
+                      <a:gd name="connsiteX3" fmla="*/ 6019 w 634338"/>
+                      <a:gd name="connsiteY3" fmla="*/ 1399816 h 1399816"/>
+                      <a:gd name="connsiteX4" fmla="*/ 0 w 634338"/>
+                      <a:gd name="connsiteY4" fmla="*/ 1393466 h 1399816"/>
+                      <a:gd name="connsiteX5" fmla="*/ 0 w 634338"/>
+                      <a:gd name="connsiteY5" fmla="*/ 0 h 1399816"/>
+                      <a:gd name="connsiteX0" fmla="*/ 0 w 634338"/>
+                      <a:gd name="connsiteY0" fmla="*/ 0 h 1399816"/>
+                      <a:gd name="connsiteX1" fmla="*/ 9194 w 634338"/>
+                      <a:gd name="connsiteY1" fmla="*/ 12700 h 1399816"/>
+                      <a:gd name="connsiteX2" fmla="*/ 634338 w 634338"/>
+                      <a:gd name="connsiteY2" fmla="*/ 696733 h 1399816"/>
+                      <a:gd name="connsiteX3" fmla="*/ 6019 w 634338"/>
+                      <a:gd name="connsiteY3" fmla="*/ 1399816 h 1399816"/>
+                      <a:gd name="connsiteX4" fmla="*/ 0 w 634338"/>
+                      <a:gd name="connsiteY4" fmla="*/ 1393466 h 1399816"/>
+                      <a:gd name="connsiteX5" fmla="*/ 0 w 634338"/>
+                      <a:gd name="connsiteY5" fmla="*/ 0 h 1399816"/>
+                      <a:gd name="connsiteX0" fmla="*/ 0 w 634338"/>
+                      <a:gd name="connsiteY0" fmla="*/ 0 h 1399816"/>
+                      <a:gd name="connsiteX1" fmla="*/ 9194 w 634338"/>
+                      <a:gd name="connsiteY1" fmla="*/ 12700 h 1399816"/>
+                      <a:gd name="connsiteX2" fmla="*/ 634338 w 634338"/>
+                      <a:gd name="connsiteY2" fmla="*/ 696733 h 1399816"/>
+                      <a:gd name="connsiteX3" fmla="*/ 6019 w 634338"/>
+                      <a:gd name="connsiteY3" fmla="*/ 1399816 h 1399816"/>
+                      <a:gd name="connsiteX4" fmla="*/ 0 w 634338"/>
+                      <a:gd name="connsiteY4" fmla="*/ 1393466 h 1399816"/>
+                      <a:gd name="connsiteX5" fmla="*/ 0 w 634338"/>
+                      <a:gd name="connsiteY5" fmla="*/ 0 h 1399816"/>
+                      <a:gd name="connsiteX0" fmla="*/ 0 w 634345"/>
+                      <a:gd name="connsiteY0" fmla="*/ 6350 h 1406166"/>
+                      <a:gd name="connsiteX1" fmla="*/ 15544 w 634345"/>
+                      <a:gd name="connsiteY1" fmla="*/ 0 h 1406166"/>
+                      <a:gd name="connsiteX2" fmla="*/ 634338 w 634345"/>
+                      <a:gd name="connsiteY2" fmla="*/ 703083 h 1406166"/>
+                      <a:gd name="connsiteX3" fmla="*/ 6019 w 634345"/>
+                      <a:gd name="connsiteY3" fmla="*/ 1406166 h 1406166"/>
+                      <a:gd name="connsiteX4" fmla="*/ 0 w 634345"/>
+                      <a:gd name="connsiteY4" fmla="*/ 1399816 h 1406166"/>
+                      <a:gd name="connsiteX5" fmla="*/ 0 w 634345"/>
+                      <a:gd name="connsiteY5" fmla="*/ 6350 h 1406166"/>
+                      <a:gd name="connsiteX0" fmla="*/ 0 w 634345"/>
+                      <a:gd name="connsiteY0" fmla="*/ 12700 h 1406166"/>
+                      <a:gd name="connsiteX1" fmla="*/ 15544 w 634345"/>
+                      <a:gd name="connsiteY1" fmla="*/ 0 h 1406166"/>
+                      <a:gd name="connsiteX2" fmla="*/ 634338 w 634345"/>
+                      <a:gd name="connsiteY2" fmla="*/ 703083 h 1406166"/>
+                      <a:gd name="connsiteX3" fmla="*/ 6019 w 634345"/>
+                      <a:gd name="connsiteY3" fmla="*/ 1406166 h 1406166"/>
+                      <a:gd name="connsiteX4" fmla="*/ 0 w 634345"/>
+                      <a:gd name="connsiteY4" fmla="*/ 1399816 h 1406166"/>
+                      <a:gd name="connsiteX5" fmla="*/ 0 w 634345"/>
+                      <a:gd name="connsiteY5" fmla="*/ 12700 h 1406166"/>
+                    </a:gdLst>
+                    <a:ahLst/>
+                    <a:cxnLst>
+                      <a:cxn ang="0">
+                        <a:pos x="connsiteX0" y="connsiteY0"/>
+                      </a:cxn>
+                      <a:cxn ang="0">
+                        <a:pos x="connsiteX1" y="connsiteY1"/>
+                      </a:cxn>
+                      <a:cxn ang="0">
+                        <a:pos x="connsiteX2" y="connsiteY2"/>
+                      </a:cxn>
+                      <a:cxn ang="0">
+                        <a:pos x="connsiteX3" y="connsiteY3"/>
+                      </a:cxn>
+                      <a:cxn ang="0">
+                        <a:pos x="connsiteX4" y="connsiteY4"/>
+                      </a:cxn>
+                      <a:cxn ang="0">
+                        <a:pos x="connsiteX5" y="connsiteY5"/>
+                      </a:cxn>
+                    </a:cxnLst>
+                    <a:rect l="l" t="t" r="r" b="b"/>
+                    <a:pathLst>
+                      <a:path w="634345" h="1406166">
+                        <a:moveTo>
+                          <a:pt x="0" y="12700"/>
+                        </a:moveTo>
+                        <a:lnTo>
+                          <a:pt x="15544" y="0"/>
+                        </a:lnTo>
+                        <a:cubicBezTo>
+                          <a:pt x="367848" y="203200"/>
+                          <a:pt x="635926" y="468722"/>
+                          <a:pt x="634338" y="703083"/>
+                        </a:cubicBezTo>
+                        <a:cubicBezTo>
+                          <a:pt x="632751" y="937444"/>
+                          <a:pt x="532948" y="1095016"/>
+                          <a:pt x="6019" y="1406166"/>
+                        </a:cubicBezTo>
+                        <a:lnTo>
+                          <a:pt x="0" y="1399816"/>
+                        </a:lnTo>
+                        <a:lnTo>
+                          <a:pt x="0" y="12700"/>
+                        </a:lnTo>
+                        <a:close/>
+                      </a:path>
+                    </a:pathLst>
+                  </a:custGeom>
+                  <a:solidFill>
+                    <a:schemeClr val="bg2">
+                      <a:lumMod val="90000"/>
+                    </a:schemeClr>
+                  </a:solidFill>
+                  <a:ln>
+                    <a:solidFill>
+                      <a:schemeClr val="bg2">
+                        <a:lumMod val="50000"/>
+                      </a:schemeClr>
+                    </a:solidFill>
+                  </a:ln>
+                </p:spPr>
+                <p:style>
+                  <a:lnRef idx="2">
+                    <a:schemeClr val="accent1">
+                      <a:shade val="50000"/>
+                    </a:schemeClr>
+                  </a:lnRef>
+                  <a:fillRef idx="1">
+                    <a:schemeClr val="accent1"/>
+                  </a:fillRef>
+                  <a:effectRef idx="0">
+                    <a:schemeClr val="accent1"/>
+                  </a:effectRef>
+                  <a:fontRef idx="minor">
+                    <a:schemeClr val="lt1"/>
+                  </a:fontRef>
+                </p:style>
+                <p:txBody>
+                  <a:bodyPr rtlCol="0" anchor="ctr"/>
+                  <a:lstStyle/>
+                  <a:p>
+                    <a:pPr algn="ctr"/>
+                    <a:endParaRPr lang="pt-PT" dirty="0"/>
+                  </a:p>
+                </p:txBody>
+              </p:sp>
+            </p:grpSp>
+            <p:grpSp>
+              <p:nvGrpSpPr>
+                <p:cNvPr id="50" name="Agrupar 49">
+                  <a:extLst>
+                    <a:ext uri="{FF2B5EF4-FFF2-40B4-BE49-F238E27FC236}">
+                      <a16:creationId xmlns:a16="http://schemas.microsoft.com/office/drawing/2014/main" id="{6943E87C-8474-1CD7-B77F-275FCB6DD712}"/>
+                    </a:ext>
+                  </a:extLst>
+                </p:cNvPr>
+                <p:cNvGrpSpPr/>
+                <p:nvPr/>
+              </p:nvGrpSpPr>
+              <p:grpSpPr>
+                <a:xfrm>
+                  <a:off x="3924251" y="4256426"/>
+                  <a:ext cx="2117268" cy="288000"/>
+                  <a:chOff x="3924251" y="4256426"/>
+                  <a:chExt cx="2117268" cy="288000"/>
+                </a:xfrm>
+              </p:grpSpPr>
+              <p:sp>
+                <p:nvSpPr>
+                  <p:cNvPr id="40" name="Retângulo 39">
+                    <a:extLst>
+                      <a:ext uri="{FF2B5EF4-FFF2-40B4-BE49-F238E27FC236}">
+                        <a16:creationId xmlns:a16="http://schemas.microsoft.com/office/drawing/2014/main" id="{E940D367-2F15-6FDB-F707-AE2FE3392466}"/>
+                      </a:ext>
+                    </a:extLst>
+                  </p:cNvPr>
+                  <p:cNvSpPr/>
+                  <p:nvPr/>
+                </p:nvSpPr>
+                <p:spPr>
+                  <a:xfrm>
+                    <a:off x="3924251" y="4256426"/>
+                    <a:ext cx="288000" cy="288000"/>
+                  </a:xfrm>
+                  <a:prstGeom prst="rect">
+                    <a:avLst/>
+                  </a:prstGeom>
+                </p:spPr>
+                <p:style>
+                  <a:lnRef idx="2">
+                    <a:schemeClr val="accent1">
+                      <a:shade val="50000"/>
+                    </a:schemeClr>
+                  </a:lnRef>
+                  <a:fillRef idx="1">
+                    <a:schemeClr val="accent1"/>
+                  </a:fillRef>
+                  <a:effectRef idx="0">
+                    <a:schemeClr val="accent1"/>
+                  </a:effectRef>
+                  <a:fontRef idx="minor">
+                    <a:schemeClr val="lt1"/>
+                  </a:fontRef>
+                </p:style>
+                <p:txBody>
+                  <a:bodyPr rtlCol="0" anchor="ctr"/>
+                  <a:lstStyle/>
+                  <a:p>
+                    <a:pPr algn="ctr"/>
+                    <a:endParaRPr lang="pt-PT" dirty="0"/>
+                  </a:p>
+                </p:txBody>
+              </p:sp>
+              <p:sp>
+                <p:nvSpPr>
+                  <p:cNvPr id="46" name="Retângulo 45">
+                    <a:extLst>
+                      <a:ext uri="{FF2B5EF4-FFF2-40B4-BE49-F238E27FC236}">
+                        <a16:creationId xmlns:a16="http://schemas.microsoft.com/office/drawing/2014/main" id="{B5224A88-713B-CD1F-1529-67D389DFBD58}"/>
+                      </a:ext>
+                    </a:extLst>
+                  </p:cNvPr>
+                  <p:cNvSpPr/>
+                  <p:nvPr/>
+                </p:nvSpPr>
+                <p:spPr>
+                  <a:xfrm>
+                    <a:off x="4382181" y="4256426"/>
+                    <a:ext cx="288000" cy="288000"/>
+                  </a:xfrm>
+                  <a:prstGeom prst="rect">
+                    <a:avLst/>
+                  </a:prstGeom>
+                </p:spPr>
+                <p:style>
+                  <a:lnRef idx="2">
+                    <a:schemeClr val="accent1">
+                      <a:shade val="50000"/>
+                    </a:schemeClr>
+                  </a:lnRef>
+                  <a:fillRef idx="1">
+                    <a:schemeClr val="accent1"/>
+                  </a:fillRef>
+                  <a:effectRef idx="0">
+                    <a:schemeClr val="accent1"/>
+                  </a:effectRef>
+                  <a:fontRef idx="minor">
+                    <a:schemeClr val="lt1"/>
+                  </a:fontRef>
+                </p:style>
+                <p:txBody>
+                  <a:bodyPr rtlCol="0" anchor="ctr"/>
+                  <a:lstStyle/>
+                  <a:p>
+                    <a:pPr algn="ctr"/>
+                    <a:endParaRPr lang="pt-PT" dirty="0"/>
+                  </a:p>
+                </p:txBody>
+              </p:sp>
+              <p:sp>
+                <p:nvSpPr>
+                  <p:cNvPr id="47" name="Retângulo 46">
+                    <a:extLst>
+                      <a:ext uri="{FF2B5EF4-FFF2-40B4-BE49-F238E27FC236}">
+                        <a16:creationId xmlns:a16="http://schemas.microsoft.com/office/drawing/2014/main" id="{7EBC3461-4AE7-0B83-700D-B6F164B815B0}"/>
+                      </a:ext>
+                    </a:extLst>
+                  </p:cNvPr>
+                  <p:cNvSpPr/>
+                  <p:nvPr/>
+                </p:nvSpPr>
+                <p:spPr>
+                  <a:xfrm>
+                    <a:off x="4840111" y="4256426"/>
+                    <a:ext cx="288000" cy="288000"/>
+                  </a:xfrm>
+                  <a:prstGeom prst="rect">
+                    <a:avLst/>
+                  </a:prstGeom>
+                </p:spPr>
+                <p:style>
+                  <a:lnRef idx="2">
+                    <a:schemeClr val="accent1">
+                      <a:shade val="50000"/>
+                    </a:schemeClr>
+                  </a:lnRef>
+                  <a:fillRef idx="1">
+                    <a:schemeClr val="accent1"/>
+                  </a:fillRef>
+                  <a:effectRef idx="0">
+                    <a:schemeClr val="accent1"/>
+                  </a:effectRef>
+                  <a:fontRef idx="minor">
+                    <a:schemeClr val="lt1"/>
+                  </a:fontRef>
+                </p:style>
+                <p:txBody>
+                  <a:bodyPr rtlCol="0" anchor="ctr"/>
+                  <a:lstStyle/>
+                  <a:p>
+                    <a:pPr algn="ctr"/>
+                    <a:endParaRPr lang="pt-PT" dirty="0"/>
+                  </a:p>
+                </p:txBody>
+              </p:sp>
+              <p:sp>
+                <p:nvSpPr>
+                  <p:cNvPr id="48" name="Retângulo 47">
+                    <a:extLst>
+                      <a:ext uri="{FF2B5EF4-FFF2-40B4-BE49-F238E27FC236}">
+                        <a16:creationId xmlns:a16="http://schemas.microsoft.com/office/drawing/2014/main" id="{EBEBE159-84D9-B6A1-6C65-C87BE4A09315}"/>
+                      </a:ext>
+                    </a:extLst>
+                  </p:cNvPr>
+                  <p:cNvSpPr/>
+                  <p:nvPr/>
+                </p:nvSpPr>
+                <p:spPr>
+                  <a:xfrm>
+                    <a:off x="5295692" y="4256426"/>
+                    <a:ext cx="288000" cy="288000"/>
+                  </a:xfrm>
+                  <a:prstGeom prst="rect">
+                    <a:avLst/>
+                  </a:prstGeom>
+                </p:spPr>
+                <p:style>
+                  <a:lnRef idx="2">
+                    <a:schemeClr val="accent1">
+                      <a:shade val="50000"/>
+                    </a:schemeClr>
+                  </a:lnRef>
+                  <a:fillRef idx="1">
+                    <a:schemeClr val="accent1"/>
+                  </a:fillRef>
+                  <a:effectRef idx="0">
+                    <a:schemeClr val="accent1"/>
+                  </a:effectRef>
+                  <a:fontRef idx="minor">
+                    <a:schemeClr val="lt1"/>
+                  </a:fontRef>
+                </p:style>
+                <p:txBody>
+                  <a:bodyPr rtlCol="0" anchor="ctr"/>
+                  <a:lstStyle/>
+                  <a:p>
+                    <a:pPr algn="ctr"/>
+                    <a:endParaRPr lang="pt-PT" dirty="0"/>
+                  </a:p>
+                </p:txBody>
+              </p:sp>
+              <p:sp>
+                <p:nvSpPr>
+                  <p:cNvPr id="49" name="Retângulo 48">
+                    <a:extLst>
+                      <a:ext uri="{FF2B5EF4-FFF2-40B4-BE49-F238E27FC236}">
+                        <a16:creationId xmlns:a16="http://schemas.microsoft.com/office/drawing/2014/main" id="{D19FFEEF-D3C7-F18A-9562-395A4D44FE90}"/>
+                      </a:ext>
+                    </a:extLst>
+                  </p:cNvPr>
+                  <p:cNvSpPr/>
+                  <p:nvPr/>
+                </p:nvSpPr>
+                <p:spPr>
+                  <a:xfrm>
+                    <a:off x="5753519" y="4256426"/>
+                    <a:ext cx="288000" cy="288000"/>
+                  </a:xfrm>
+                  <a:prstGeom prst="rect">
+                    <a:avLst/>
+                  </a:prstGeom>
+                </p:spPr>
+                <p:style>
+                  <a:lnRef idx="2">
+                    <a:schemeClr val="accent1">
+                      <a:shade val="50000"/>
+                    </a:schemeClr>
+                  </a:lnRef>
+                  <a:fillRef idx="1">
+                    <a:schemeClr val="accent1"/>
+                  </a:fillRef>
+                  <a:effectRef idx="0">
+                    <a:schemeClr val="accent1"/>
+                  </a:effectRef>
+                  <a:fontRef idx="minor">
+                    <a:schemeClr val="lt1"/>
+                  </a:fontRef>
+                </p:style>
+                <p:txBody>
+                  <a:bodyPr rtlCol="0" anchor="ctr"/>
+                  <a:lstStyle/>
+                  <a:p>
+                    <a:pPr algn="ctr"/>
+                    <a:endParaRPr lang="pt-PT" dirty="0"/>
+                  </a:p>
+                </p:txBody>
+              </p:sp>
+            </p:grpSp>
+            <p:grpSp>
+              <p:nvGrpSpPr>
+                <p:cNvPr id="51" name="Agrupar 50">
+                  <a:extLst>
+                    <a:ext uri="{FF2B5EF4-FFF2-40B4-BE49-F238E27FC236}">
+                      <a16:creationId xmlns:a16="http://schemas.microsoft.com/office/drawing/2014/main" id="{3CA821DE-A524-5743-15A4-153C6786628A}"/>
+                    </a:ext>
+                  </a:extLst>
+                </p:cNvPr>
+                <p:cNvGrpSpPr/>
+                <p:nvPr/>
+              </p:nvGrpSpPr>
+              <p:grpSpPr>
+                <a:xfrm>
+                  <a:off x="3931484" y="5113273"/>
+                  <a:ext cx="2117268" cy="288000"/>
+                  <a:chOff x="3924251" y="4256426"/>
+                  <a:chExt cx="2117268" cy="288000"/>
+                </a:xfrm>
+              </p:grpSpPr>
+              <p:sp>
+                <p:nvSpPr>
+                  <p:cNvPr id="52" name="Retângulo 51">
+                    <a:extLst>
+                      <a:ext uri="{FF2B5EF4-FFF2-40B4-BE49-F238E27FC236}">
+                        <a16:creationId xmlns:a16="http://schemas.microsoft.com/office/drawing/2014/main" id="{31DE9993-1867-0EAB-4826-1FC9BCA933B0}"/>
+                      </a:ext>
+                    </a:extLst>
+                  </p:cNvPr>
+                  <p:cNvSpPr/>
+                  <p:nvPr/>
+                </p:nvSpPr>
+                <p:spPr>
+                  <a:xfrm>
+                    <a:off x="3924251" y="4256426"/>
+                    <a:ext cx="288000" cy="288000"/>
+                  </a:xfrm>
+                  <a:prstGeom prst="rect">
+                    <a:avLst/>
+                  </a:prstGeom>
+                </p:spPr>
+                <p:style>
+                  <a:lnRef idx="2">
+                    <a:schemeClr val="accent1">
+                      <a:shade val="50000"/>
+                    </a:schemeClr>
+                  </a:lnRef>
+                  <a:fillRef idx="1">
+                    <a:schemeClr val="accent1"/>
+                  </a:fillRef>
+                  <a:effectRef idx="0">
+                    <a:schemeClr val="accent1"/>
+                  </a:effectRef>
+                  <a:fontRef idx="minor">
+                    <a:schemeClr val="lt1"/>
+                  </a:fontRef>
+                </p:style>
+                <p:txBody>
+                  <a:bodyPr rtlCol="0" anchor="ctr"/>
+                  <a:lstStyle/>
+                  <a:p>
+                    <a:pPr algn="ctr"/>
+                    <a:endParaRPr lang="pt-PT" dirty="0"/>
+                  </a:p>
+                </p:txBody>
+              </p:sp>
+              <p:sp>
+                <p:nvSpPr>
+                  <p:cNvPr id="53" name="Retângulo 52">
+                    <a:extLst>
+                      <a:ext uri="{FF2B5EF4-FFF2-40B4-BE49-F238E27FC236}">
+                        <a16:creationId xmlns:a16="http://schemas.microsoft.com/office/drawing/2014/main" id="{841E6150-441D-FB38-A8A5-E97C17886390}"/>
+                      </a:ext>
+                    </a:extLst>
+                  </p:cNvPr>
+                  <p:cNvSpPr/>
+                  <p:nvPr/>
+                </p:nvSpPr>
+                <p:spPr>
+                  <a:xfrm>
+                    <a:off x="4382181" y="4256426"/>
+                    <a:ext cx="288000" cy="288000"/>
+                  </a:xfrm>
+                  <a:prstGeom prst="rect">
+                    <a:avLst/>
+                  </a:prstGeom>
+                </p:spPr>
+                <p:style>
+                  <a:lnRef idx="2">
+                    <a:schemeClr val="accent1">
+                      <a:shade val="50000"/>
+                    </a:schemeClr>
+                  </a:lnRef>
+                  <a:fillRef idx="1">
+                    <a:schemeClr val="accent1"/>
+                  </a:fillRef>
+                  <a:effectRef idx="0">
+                    <a:schemeClr val="accent1"/>
+                  </a:effectRef>
+                  <a:fontRef idx="minor">
+                    <a:schemeClr val="lt1"/>
+                  </a:fontRef>
+                </p:style>
+                <p:txBody>
+                  <a:bodyPr rtlCol="0" anchor="ctr"/>
+                  <a:lstStyle/>
+                  <a:p>
+                    <a:pPr algn="ctr"/>
+                    <a:endParaRPr lang="pt-PT" dirty="0"/>
+                  </a:p>
+                </p:txBody>
+              </p:sp>
+              <p:sp>
+                <p:nvSpPr>
+                  <p:cNvPr id="54" name="Retângulo 53">
+                    <a:extLst>
+                      <a:ext uri="{FF2B5EF4-FFF2-40B4-BE49-F238E27FC236}">
+                        <a16:creationId xmlns:a16="http://schemas.microsoft.com/office/drawing/2014/main" id="{88B94301-C8D6-3A7C-5E3E-1E5DB8DA4CBE}"/>
+                      </a:ext>
+                    </a:extLst>
+                  </p:cNvPr>
+                  <p:cNvSpPr/>
+                  <p:nvPr/>
+                </p:nvSpPr>
+                <p:spPr>
+                  <a:xfrm>
+                    <a:off x="4840111" y="4256426"/>
+                    <a:ext cx="288000" cy="288000"/>
+                  </a:xfrm>
+                  <a:prstGeom prst="rect">
+                    <a:avLst/>
+                  </a:prstGeom>
+                </p:spPr>
+                <p:style>
+                  <a:lnRef idx="2">
+                    <a:schemeClr val="accent1">
+                      <a:shade val="50000"/>
+                    </a:schemeClr>
+                  </a:lnRef>
+                  <a:fillRef idx="1">
+                    <a:schemeClr val="accent1"/>
+                  </a:fillRef>
+                  <a:effectRef idx="0">
+                    <a:schemeClr val="accent1"/>
+                  </a:effectRef>
+                  <a:fontRef idx="minor">
+                    <a:schemeClr val="lt1"/>
+                  </a:fontRef>
+                </p:style>
+                <p:txBody>
+                  <a:bodyPr rtlCol="0" anchor="ctr"/>
+                  <a:lstStyle/>
+                  <a:p>
+                    <a:pPr algn="ctr"/>
+                    <a:endParaRPr lang="pt-PT" dirty="0"/>
+                  </a:p>
+                </p:txBody>
+              </p:sp>
+              <p:sp>
+                <p:nvSpPr>
+                  <p:cNvPr id="55" name="Retângulo 54">
+                    <a:extLst>
+                      <a:ext uri="{FF2B5EF4-FFF2-40B4-BE49-F238E27FC236}">
+                        <a16:creationId xmlns:a16="http://schemas.microsoft.com/office/drawing/2014/main" id="{560F2F22-E6E7-4CAB-EDB8-45F44493033C}"/>
+                      </a:ext>
+                    </a:extLst>
+                  </p:cNvPr>
+                  <p:cNvSpPr/>
+                  <p:nvPr/>
+                </p:nvSpPr>
+                <p:spPr>
+                  <a:xfrm>
+                    <a:off x="5295692" y="4256426"/>
+                    <a:ext cx="288000" cy="288000"/>
+                  </a:xfrm>
+                  <a:prstGeom prst="rect">
+                    <a:avLst/>
+                  </a:prstGeom>
+                </p:spPr>
+                <p:style>
+                  <a:lnRef idx="2">
+                    <a:schemeClr val="accent1">
+                      <a:shade val="50000"/>
+                    </a:schemeClr>
+                  </a:lnRef>
+                  <a:fillRef idx="1">
+                    <a:schemeClr val="accent1"/>
+                  </a:fillRef>
+                  <a:effectRef idx="0">
+                    <a:schemeClr val="accent1"/>
+                  </a:effectRef>
+                  <a:fontRef idx="minor">
+                    <a:schemeClr val="lt1"/>
+                  </a:fontRef>
+                </p:style>
+                <p:txBody>
+                  <a:bodyPr rtlCol="0" anchor="ctr"/>
+                  <a:lstStyle/>
+                  <a:p>
+                    <a:pPr algn="ctr"/>
+                    <a:endParaRPr lang="pt-PT" dirty="0"/>
+                  </a:p>
+                </p:txBody>
+              </p:sp>
+              <p:sp>
+                <p:nvSpPr>
+                  <p:cNvPr id="56" name="Retângulo 55">
+                    <a:extLst>
+                      <a:ext uri="{FF2B5EF4-FFF2-40B4-BE49-F238E27FC236}">
+                        <a16:creationId xmlns:a16="http://schemas.microsoft.com/office/drawing/2014/main" id="{1F31C486-DC80-82B9-22AC-FE96B00C7C53}"/>
+                      </a:ext>
+                    </a:extLst>
+                  </p:cNvPr>
+                  <p:cNvSpPr/>
+                  <p:nvPr/>
+                </p:nvSpPr>
+                <p:spPr>
+                  <a:xfrm>
+                    <a:off x="5753519" y="4256426"/>
+                    <a:ext cx="288000" cy="288000"/>
+                  </a:xfrm>
+                  <a:prstGeom prst="rect">
+                    <a:avLst/>
+                  </a:prstGeom>
+                </p:spPr>
+                <p:style>
+                  <a:lnRef idx="2">
+                    <a:schemeClr val="accent1">
+                      <a:shade val="50000"/>
+                    </a:schemeClr>
+                  </a:lnRef>
+                  <a:fillRef idx="1">
+                    <a:schemeClr val="accent1"/>
+                  </a:fillRef>
+                  <a:effectRef idx="0">
+                    <a:schemeClr val="accent1"/>
+                  </a:effectRef>
+                  <a:fontRef idx="minor">
+                    <a:schemeClr val="lt1"/>
+                  </a:fontRef>
+                </p:style>
+                <p:txBody>
+                  <a:bodyPr rtlCol="0" anchor="ctr"/>
+                  <a:lstStyle/>
+                  <a:p>
+                    <a:pPr algn="ctr"/>
+                    <a:endParaRPr lang="pt-PT" dirty="0"/>
+                  </a:p>
+                </p:txBody>
+              </p:sp>
+            </p:grpSp>
+            <p:sp>
+              <p:nvSpPr>
+                <p:cNvPr id="57" name="Retângulo 56">
+                  <a:extLst>
+                    <a:ext uri="{FF2B5EF4-FFF2-40B4-BE49-F238E27FC236}">
+                      <a16:creationId xmlns:a16="http://schemas.microsoft.com/office/drawing/2014/main" id="{A27D8E75-4212-D5F7-B3F6-16E76DE1FDEB}"/>
+                    </a:ext>
+                  </a:extLst>
+                </p:cNvPr>
+                <p:cNvSpPr/>
+                <p:nvPr/>
+              </p:nvSpPr>
+              <p:spPr>
+                <a:xfrm>
+                  <a:off x="7261774" y="4679956"/>
+                  <a:ext cx="288000" cy="288000"/>
+                </a:xfrm>
+                <a:prstGeom prst="rect">
+                  <a:avLst/>
+                </a:prstGeom>
+              </p:spPr>
+              <p:style>
+                <a:lnRef idx="2">
+                  <a:schemeClr val="accent1">
+                    <a:shade val="50000"/>
+                  </a:schemeClr>
+                </a:lnRef>
+                <a:fillRef idx="1">
+                  <a:schemeClr val="accent1"/>
+                </a:fillRef>
+                <a:effectRef idx="0">
+                  <a:schemeClr val="accent1"/>
+                </a:effectRef>
+                <a:fontRef idx="minor">
+                  <a:schemeClr val="lt1"/>
+                </a:fontRef>
+              </p:style>
+              <p:txBody>
+                <a:bodyPr rtlCol="0" anchor="ctr"/>
+                <a:lstStyle/>
+                <a:p>
+                  <a:pPr algn="ctr"/>
+                  <a:endParaRPr lang="pt-PT" dirty="0"/>
+                </a:p>
+              </p:txBody>
+            </p:sp>
+            <p:sp>
+              <p:nvSpPr>
+                <p:cNvPr id="81" name="Retângulo 80">
+                  <a:extLst>
+                    <a:ext uri="{FF2B5EF4-FFF2-40B4-BE49-F238E27FC236}">
+                      <a16:creationId xmlns:a16="http://schemas.microsoft.com/office/drawing/2014/main" id="{6173FC49-578A-48B0-C570-9CC79BBE4E0C}"/>
+                    </a:ext>
+                  </a:extLst>
+                </p:cNvPr>
+                <p:cNvSpPr/>
+                <p:nvPr/>
+              </p:nvSpPr>
+              <p:spPr>
+                <a:xfrm>
+                  <a:off x="2273718" y="2700824"/>
+                  <a:ext cx="180000" cy="180475"/>
+                </a:xfrm>
+                <a:prstGeom prst="rect">
+                  <a:avLst/>
+                </a:prstGeom>
+              </p:spPr>
+              <p:style>
+                <a:lnRef idx="2">
+                  <a:schemeClr val="accent1">
+                    <a:shade val="50000"/>
+                  </a:schemeClr>
+                </a:lnRef>
+                <a:fillRef idx="1">
+                  <a:schemeClr val="accent1"/>
+                </a:fillRef>
+                <a:effectRef idx="0">
+                  <a:schemeClr val="accent1"/>
+                </a:effectRef>
+                <a:fontRef idx="minor">
+                  <a:schemeClr val="lt1"/>
+                </a:fontRef>
+              </p:style>
+              <p:txBody>
+                <a:bodyPr rtlCol="0" anchor="ctr"/>
+                <a:lstStyle/>
+                <a:p>
+                  <a:pPr algn="ctr"/>
+                  <a:endParaRPr lang="pt-PT" dirty="0"/>
+                </a:p>
+              </p:txBody>
+            </p:sp>
+            <p:sp>
+              <p:nvSpPr>
+                <p:cNvPr id="82" name="CaixaDeTexto 81">
+                  <a:extLst>
+                    <a:ext uri="{FF2B5EF4-FFF2-40B4-BE49-F238E27FC236}">
+                      <a16:creationId xmlns:a16="http://schemas.microsoft.com/office/drawing/2014/main" id="{15AEE124-2274-067B-5DF9-936A5B4C377D}"/>
+                    </a:ext>
+                  </a:extLst>
+                </p:cNvPr>
+                <p:cNvSpPr txBox="1"/>
+                <p:nvPr/>
+              </p:nvSpPr>
+              <p:spPr>
+                <a:xfrm>
+                  <a:off x="2421606" y="2667950"/>
+                  <a:ext cx="1501091" cy="246221"/>
+                </a:xfrm>
+                <a:prstGeom prst="rect">
+                  <a:avLst/>
+                </a:prstGeom>
+                <a:noFill/>
+              </p:spPr>
+              <p:txBody>
+                <a:bodyPr wrap="square" rtlCol="0">
+                  <a:spAutoFit/>
+                </a:bodyPr>
+                <a:lstStyle/>
+                <a:p>
+                  <a:r>
+                    <a:rPr lang="pt-PT" sz="1000" dirty="0"/>
+                    <a:t>-</a:t>
+                  </a:r>
+                  <a:r>
+                    <a:rPr lang="pt-PT" sz="800" dirty="0"/>
+                    <a:t>Passageiros</a:t>
+                  </a:r>
+                </a:p>
+              </p:txBody>
+            </p:sp>
+            <p:grpSp>
+              <p:nvGrpSpPr>
+                <p:cNvPr id="92" name="Agrupar 91">
+                  <a:extLst>
+                    <a:ext uri="{FF2B5EF4-FFF2-40B4-BE49-F238E27FC236}">
+                      <a16:creationId xmlns:a16="http://schemas.microsoft.com/office/drawing/2014/main" id="{DBAFB52E-56C3-EFEC-602C-6CEA54655F8A}"/>
+                    </a:ext>
+                  </a:extLst>
+                </p:cNvPr>
+                <p:cNvGrpSpPr/>
+                <p:nvPr/>
+              </p:nvGrpSpPr>
+              <p:grpSpPr>
+                <a:xfrm>
+                  <a:off x="3779698" y="803945"/>
+                  <a:ext cx="1696900" cy="2223748"/>
+                  <a:chOff x="3779698" y="803945"/>
+                  <a:chExt cx="1696900" cy="2223748"/>
+                </a:xfrm>
+              </p:grpSpPr>
+              <p:sp>
+                <p:nvSpPr>
+                  <p:cNvPr id="87" name="Retângulo 86">
+                    <a:extLst>
+                      <a:ext uri="{FF2B5EF4-FFF2-40B4-BE49-F238E27FC236}">
+                        <a16:creationId xmlns:a16="http://schemas.microsoft.com/office/drawing/2014/main" id="{8666E87B-F3E3-CFC5-9938-B4946B652580}"/>
+                      </a:ext>
+                    </a:extLst>
+                  </p:cNvPr>
+                  <p:cNvSpPr/>
+                  <p:nvPr/>
+                </p:nvSpPr>
+                <p:spPr>
+                  <a:xfrm rot="5400000">
+                    <a:off x="4270566" y="1337952"/>
+                    <a:ext cx="245863" cy="1227600"/>
+                  </a:xfrm>
+                  <a:prstGeom prst="rect">
+                    <a:avLst/>
+                  </a:prstGeom>
+                  <a:solidFill>
+                    <a:schemeClr val="bg2">
+                      <a:lumMod val="50000"/>
+                    </a:schemeClr>
+                  </a:solidFill>
+                  <a:ln>
+                    <a:solidFill>
+                      <a:schemeClr val="bg2">
+                        <a:lumMod val="50000"/>
+                      </a:schemeClr>
+                    </a:solidFill>
+                  </a:ln>
+                </p:spPr>
+                <p:style>
+                  <a:lnRef idx="2">
+                    <a:schemeClr val="accent1">
+                      <a:shade val="50000"/>
+                    </a:schemeClr>
+                  </a:lnRef>
+                  <a:fillRef idx="1">
+                    <a:schemeClr val="accent1"/>
+                  </a:fillRef>
+                  <a:effectRef idx="0">
+                    <a:schemeClr val="accent1"/>
+                  </a:effectRef>
+                  <a:fontRef idx="minor">
+                    <a:schemeClr val="lt1"/>
+                  </a:fontRef>
+                </p:style>
+                <p:txBody>
+                  <a:bodyPr rtlCol="0" anchor="ctr"/>
+                  <a:lstStyle/>
+                  <a:p>
+                    <a:pPr algn="ctr"/>
+                    <a:endParaRPr lang="pt-PT" dirty="0"/>
+                  </a:p>
+                </p:txBody>
+              </p:sp>
+              <p:sp>
+                <p:nvSpPr>
+                  <p:cNvPr id="90" name="Retângulo 89">
+                    <a:extLst>
+                      <a:ext uri="{FF2B5EF4-FFF2-40B4-BE49-F238E27FC236}">
+                        <a16:creationId xmlns:a16="http://schemas.microsoft.com/office/drawing/2014/main" id="{BEEA3335-942E-39E0-5AD8-B1CC19B30438}"/>
+                      </a:ext>
+                    </a:extLst>
+                  </p:cNvPr>
+                  <p:cNvSpPr/>
+                  <p:nvPr/>
+                </p:nvSpPr>
+                <p:spPr>
+                  <a:xfrm rot="8598820">
+                    <a:off x="5230735" y="1800093"/>
+                    <a:ext cx="245863" cy="1227600"/>
+                  </a:xfrm>
+                  <a:prstGeom prst="rect">
+                    <a:avLst/>
+                  </a:prstGeom>
+                  <a:solidFill>
+                    <a:schemeClr val="bg2">
+                      <a:lumMod val="50000"/>
+                    </a:schemeClr>
+                  </a:solidFill>
+                  <a:ln>
+                    <a:solidFill>
+                      <a:schemeClr val="bg2">
+                        <a:lumMod val="50000"/>
+                      </a:schemeClr>
+                    </a:solidFill>
+                  </a:ln>
+                </p:spPr>
+                <p:style>
+                  <a:lnRef idx="2">
+                    <a:schemeClr val="accent1">
+                      <a:shade val="50000"/>
+                    </a:schemeClr>
+                  </a:lnRef>
+                  <a:fillRef idx="1">
+                    <a:schemeClr val="accent1"/>
+                  </a:fillRef>
+                  <a:effectRef idx="0">
+                    <a:schemeClr val="accent1"/>
+                  </a:effectRef>
+                  <a:fontRef idx="minor">
+                    <a:schemeClr val="lt1"/>
+                  </a:fontRef>
+                </p:style>
+                <p:txBody>
+                  <a:bodyPr rtlCol="0" anchor="ctr"/>
+                  <a:lstStyle/>
+                  <a:p>
+                    <a:pPr algn="ctr"/>
+                    <a:endParaRPr lang="pt-PT" dirty="0"/>
+                  </a:p>
+                </p:txBody>
+              </p:sp>
+              <p:sp>
+                <p:nvSpPr>
+                  <p:cNvPr id="91" name="Retângulo 90">
+                    <a:extLst>
+                      <a:ext uri="{FF2B5EF4-FFF2-40B4-BE49-F238E27FC236}">
+                        <a16:creationId xmlns:a16="http://schemas.microsoft.com/office/drawing/2014/main" id="{18A04A70-82D5-66BA-58E0-A705F426AA71}"/>
+                      </a:ext>
+                    </a:extLst>
+                  </p:cNvPr>
+                  <p:cNvSpPr/>
+                  <p:nvPr/>
+                </p:nvSpPr>
+                <p:spPr>
+                  <a:xfrm rot="12648134">
+                    <a:off x="5188055" y="803945"/>
+                    <a:ext cx="245863" cy="1227600"/>
+                  </a:xfrm>
+                  <a:prstGeom prst="rect">
+                    <a:avLst/>
+                  </a:prstGeom>
+                  <a:solidFill>
+                    <a:schemeClr val="bg2">
+                      <a:lumMod val="50000"/>
+                    </a:schemeClr>
+                  </a:solidFill>
+                  <a:ln>
+                    <a:solidFill>
+                      <a:schemeClr val="bg2">
+                        <a:lumMod val="50000"/>
+                      </a:schemeClr>
+                    </a:solidFill>
+                  </a:ln>
+                </p:spPr>
+                <p:style>
+                  <a:lnRef idx="2">
+                    <a:schemeClr val="accent1">
+                      <a:shade val="50000"/>
+                    </a:schemeClr>
+                  </a:lnRef>
+                  <a:fillRef idx="1">
+                    <a:schemeClr val="accent1"/>
+                  </a:fillRef>
+                  <a:effectRef idx="0">
+                    <a:schemeClr val="accent1"/>
+                  </a:effectRef>
+                  <a:fontRef idx="minor">
+                    <a:schemeClr val="lt1"/>
+                  </a:fontRef>
+                </p:style>
+                <p:txBody>
+                  <a:bodyPr rtlCol="0" anchor="ctr"/>
+                  <a:lstStyle/>
+                  <a:p>
+                    <a:pPr algn="ctr"/>
+                    <a:endParaRPr lang="pt-PT" dirty="0"/>
+                  </a:p>
+                </p:txBody>
+              </p:sp>
+            </p:grpSp>
+            <p:grpSp>
+              <p:nvGrpSpPr>
+                <p:cNvPr id="93" name="Agrupar 92">
+                  <a:extLst>
+                    <a:ext uri="{FF2B5EF4-FFF2-40B4-BE49-F238E27FC236}">
+                      <a16:creationId xmlns:a16="http://schemas.microsoft.com/office/drawing/2014/main" id="{75B9BAF1-0D45-BA1B-6233-25411B290E73}"/>
+                    </a:ext>
+                  </a:extLst>
+                </p:cNvPr>
+                <p:cNvGrpSpPr/>
+                <p:nvPr/>
+              </p:nvGrpSpPr>
+              <p:grpSpPr>
+                <a:xfrm rot="15411599">
+                  <a:off x="6901768" y="1183760"/>
+                  <a:ext cx="1696900" cy="2223748"/>
+                  <a:chOff x="3779698" y="803945"/>
+                  <a:chExt cx="1696900" cy="2223748"/>
+                </a:xfrm>
+              </p:grpSpPr>
+              <p:sp>
+                <p:nvSpPr>
+                  <p:cNvPr id="94" name="Retângulo 93">
+                    <a:extLst>
+                      <a:ext uri="{FF2B5EF4-FFF2-40B4-BE49-F238E27FC236}">
+                        <a16:creationId xmlns:a16="http://schemas.microsoft.com/office/drawing/2014/main" id="{63403F3E-0834-F52A-F29F-B4FC480C3002}"/>
+                      </a:ext>
+                    </a:extLst>
+                  </p:cNvPr>
+                  <p:cNvSpPr/>
+                  <p:nvPr/>
+                </p:nvSpPr>
+                <p:spPr>
+                  <a:xfrm rot="5400000">
+                    <a:off x="4270566" y="1337952"/>
+                    <a:ext cx="245863" cy="1227600"/>
+                  </a:xfrm>
+                  <a:prstGeom prst="rect">
+                    <a:avLst/>
+                  </a:prstGeom>
+                  <a:solidFill>
+                    <a:schemeClr val="bg2">
+                      <a:lumMod val="50000"/>
+                    </a:schemeClr>
+                  </a:solidFill>
+                  <a:ln>
+                    <a:solidFill>
+                      <a:schemeClr val="bg2">
+                        <a:lumMod val="50000"/>
+                      </a:schemeClr>
+                    </a:solidFill>
+                  </a:ln>
+                </p:spPr>
+                <p:style>
+                  <a:lnRef idx="2">
+                    <a:schemeClr val="accent1">
+                      <a:shade val="50000"/>
+                    </a:schemeClr>
+                  </a:lnRef>
+                  <a:fillRef idx="1">
+                    <a:schemeClr val="accent1"/>
+                  </a:fillRef>
+                  <a:effectRef idx="0">
+                    <a:schemeClr val="accent1"/>
+                  </a:effectRef>
+                  <a:fontRef idx="minor">
+                    <a:schemeClr val="lt1"/>
+                  </a:fontRef>
+                </p:style>
+                <p:txBody>
+                  <a:bodyPr rtlCol="0" anchor="ctr"/>
+                  <a:lstStyle/>
+                  <a:p>
+                    <a:pPr algn="ctr"/>
+                    <a:endParaRPr lang="pt-PT" dirty="0"/>
+                  </a:p>
+                </p:txBody>
+              </p:sp>
+              <p:sp>
+                <p:nvSpPr>
+                  <p:cNvPr id="95" name="Retângulo 94">
+                    <a:extLst>
+                      <a:ext uri="{FF2B5EF4-FFF2-40B4-BE49-F238E27FC236}">
+                        <a16:creationId xmlns:a16="http://schemas.microsoft.com/office/drawing/2014/main" id="{D6D89799-2E3B-81C0-DD3C-4EF02C389BEA}"/>
+                      </a:ext>
+                    </a:extLst>
+                  </p:cNvPr>
+                  <p:cNvSpPr/>
+                  <p:nvPr/>
+                </p:nvSpPr>
+                <p:spPr>
+                  <a:xfrm rot="8598820">
+                    <a:off x="5230735" y="1800093"/>
+                    <a:ext cx="245863" cy="1227600"/>
+                  </a:xfrm>
+                  <a:prstGeom prst="rect">
+                    <a:avLst/>
+                  </a:prstGeom>
+                  <a:solidFill>
+                    <a:schemeClr val="bg2">
+                      <a:lumMod val="50000"/>
+                    </a:schemeClr>
+                  </a:solidFill>
+                  <a:ln>
+                    <a:solidFill>
+                      <a:schemeClr val="bg2">
+                        <a:lumMod val="50000"/>
+                      </a:schemeClr>
+                    </a:solidFill>
+                  </a:ln>
+                </p:spPr>
+                <p:style>
+                  <a:lnRef idx="2">
+                    <a:schemeClr val="accent1">
+                      <a:shade val="50000"/>
+                    </a:schemeClr>
+                  </a:lnRef>
+                  <a:fillRef idx="1">
+                    <a:schemeClr val="accent1"/>
+                  </a:fillRef>
+                  <a:effectRef idx="0">
+                    <a:schemeClr val="accent1"/>
+                  </a:effectRef>
+                  <a:fontRef idx="minor">
+                    <a:schemeClr val="lt1"/>
+                  </a:fontRef>
+                </p:style>
+                <p:txBody>
+                  <a:bodyPr rtlCol="0" anchor="ctr"/>
+                  <a:lstStyle/>
+                  <a:p>
+                    <a:pPr algn="ctr"/>
+                    <a:endParaRPr lang="pt-PT" dirty="0"/>
+                  </a:p>
+                </p:txBody>
+              </p:sp>
+              <p:sp>
+                <p:nvSpPr>
+                  <p:cNvPr id="96" name="Retângulo 95">
+                    <a:extLst>
+                      <a:ext uri="{FF2B5EF4-FFF2-40B4-BE49-F238E27FC236}">
+                        <a16:creationId xmlns:a16="http://schemas.microsoft.com/office/drawing/2014/main" id="{91FE3F5C-0A4A-0605-A20E-E6C6AECA3E21}"/>
+                      </a:ext>
+                    </a:extLst>
+                  </p:cNvPr>
+                  <p:cNvSpPr/>
+                  <p:nvPr/>
+                </p:nvSpPr>
+                <p:spPr>
+                  <a:xfrm rot="12648134">
+                    <a:off x="5188055" y="803945"/>
+                    <a:ext cx="245863" cy="1227600"/>
+                  </a:xfrm>
+                  <a:prstGeom prst="rect">
+                    <a:avLst/>
+                  </a:prstGeom>
+                  <a:solidFill>
+                    <a:schemeClr val="bg2">
+                      <a:lumMod val="50000"/>
+                    </a:schemeClr>
+                  </a:solidFill>
+                  <a:ln>
+                    <a:solidFill>
+                      <a:schemeClr val="bg2">
+                        <a:lumMod val="50000"/>
+                      </a:schemeClr>
+                    </a:solidFill>
+                  </a:ln>
+                </p:spPr>
+                <p:style>
+                  <a:lnRef idx="2">
+                    <a:schemeClr val="accent1">
+                      <a:shade val="50000"/>
+                    </a:schemeClr>
+                  </a:lnRef>
+                  <a:fillRef idx="1">
+                    <a:schemeClr val="accent1"/>
+                  </a:fillRef>
+                  <a:effectRef idx="0">
+                    <a:schemeClr val="accent1"/>
+                  </a:effectRef>
+                  <a:fontRef idx="minor">
+                    <a:schemeClr val="lt1"/>
+                  </a:fontRef>
+                </p:style>
+                <p:txBody>
+                  <a:bodyPr rtlCol="0" anchor="ctr"/>
+                  <a:lstStyle/>
+                  <a:p>
+                    <a:pPr algn="ctr"/>
+                    <a:endParaRPr lang="pt-PT" dirty="0"/>
+                  </a:p>
+                </p:txBody>
+              </p:sp>
+            </p:grpSp>
+            <p:grpSp>
+              <p:nvGrpSpPr>
+                <p:cNvPr id="97" name="Agrupar 96">
+                  <a:extLst>
+                    <a:ext uri="{FF2B5EF4-FFF2-40B4-BE49-F238E27FC236}">
+                      <a16:creationId xmlns:a16="http://schemas.microsoft.com/office/drawing/2014/main" id="{4D7E3363-B30B-A71C-7F57-07773D3BA454}"/>
+                    </a:ext>
+                  </a:extLst>
+                </p:cNvPr>
+                <p:cNvGrpSpPr/>
+                <p:nvPr/>
+              </p:nvGrpSpPr>
+              <p:grpSpPr>
+                <a:xfrm>
+                  <a:off x="2205002" y="3306746"/>
+                  <a:ext cx="180000" cy="256000"/>
+                  <a:chOff x="3779698" y="803945"/>
+                  <a:chExt cx="1696900" cy="2223748"/>
+                </a:xfrm>
+              </p:grpSpPr>
+              <p:sp>
+                <p:nvSpPr>
+                  <p:cNvPr id="98" name="Retângulo 97">
+                    <a:extLst>
+                      <a:ext uri="{FF2B5EF4-FFF2-40B4-BE49-F238E27FC236}">
+                        <a16:creationId xmlns:a16="http://schemas.microsoft.com/office/drawing/2014/main" id="{55989BC5-2555-2873-F610-4CE124315995}"/>
+                      </a:ext>
+                    </a:extLst>
+                  </p:cNvPr>
+                  <p:cNvSpPr/>
+                  <p:nvPr/>
+                </p:nvSpPr>
+                <p:spPr>
+                  <a:xfrm rot="5400000">
+                    <a:off x="4270566" y="1337952"/>
+                    <a:ext cx="245863" cy="1227600"/>
+                  </a:xfrm>
+                  <a:prstGeom prst="rect">
+                    <a:avLst/>
+                  </a:prstGeom>
+                  <a:solidFill>
+                    <a:schemeClr val="bg2">
+                      <a:lumMod val="50000"/>
+                    </a:schemeClr>
+                  </a:solidFill>
+                  <a:ln>
+                    <a:solidFill>
+                      <a:schemeClr val="bg2">
+                        <a:lumMod val="50000"/>
+                      </a:schemeClr>
+                    </a:solidFill>
+                  </a:ln>
+                </p:spPr>
+                <p:style>
+                  <a:lnRef idx="2">
+                    <a:schemeClr val="accent1">
+                      <a:shade val="50000"/>
+                    </a:schemeClr>
+                  </a:lnRef>
+                  <a:fillRef idx="1">
+                    <a:schemeClr val="accent1"/>
+                  </a:fillRef>
+                  <a:effectRef idx="0">
+                    <a:schemeClr val="accent1"/>
+                  </a:effectRef>
+                  <a:fontRef idx="minor">
+                    <a:schemeClr val="lt1"/>
+                  </a:fontRef>
+                </p:style>
+                <p:txBody>
+                  <a:bodyPr rtlCol="0" anchor="ctr"/>
+                  <a:lstStyle/>
+                  <a:p>
+                    <a:pPr algn="ctr"/>
+                    <a:endParaRPr lang="pt-PT" dirty="0"/>
+                  </a:p>
+                </p:txBody>
+              </p:sp>
+              <p:sp>
+                <p:nvSpPr>
+                  <p:cNvPr id="99" name="Retângulo 98">
+                    <a:extLst>
+                      <a:ext uri="{FF2B5EF4-FFF2-40B4-BE49-F238E27FC236}">
+                        <a16:creationId xmlns:a16="http://schemas.microsoft.com/office/drawing/2014/main" id="{71D89E37-DDF4-15E0-D6D2-D2E97B5F1B2A}"/>
+                      </a:ext>
+                    </a:extLst>
+                  </p:cNvPr>
+                  <p:cNvSpPr/>
+                  <p:nvPr/>
+                </p:nvSpPr>
+                <p:spPr>
+                  <a:xfrm rot="8598820">
+                    <a:off x="5230735" y="1800093"/>
+                    <a:ext cx="245863" cy="1227600"/>
+                  </a:xfrm>
+                  <a:prstGeom prst="rect">
+                    <a:avLst/>
+                  </a:prstGeom>
+                  <a:solidFill>
+                    <a:schemeClr val="bg2">
+                      <a:lumMod val="50000"/>
+                    </a:schemeClr>
+                  </a:solidFill>
+                  <a:ln>
+                    <a:solidFill>
+                      <a:schemeClr val="bg2">
+                        <a:lumMod val="50000"/>
+                      </a:schemeClr>
+                    </a:solidFill>
+                  </a:ln>
+                </p:spPr>
+                <p:style>
+                  <a:lnRef idx="2">
+                    <a:schemeClr val="accent1">
+                      <a:shade val="50000"/>
+                    </a:schemeClr>
+                  </a:lnRef>
+                  <a:fillRef idx="1">
+                    <a:schemeClr val="accent1"/>
+                  </a:fillRef>
+                  <a:effectRef idx="0">
+                    <a:schemeClr val="accent1"/>
+                  </a:effectRef>
+                  <a:fontRef idx="minor">
+                    <a:schemeClr val="lt1"/>
+                  </a:fontRef>
+                </p:style>
+                <p:txBody>
+                  <a:bodyPr rtlCol="0" anchor="ctr"/>
+                  <a:lstStyle/>
+                  <a:p>
+                    <a:pPr algn="ctr"/>
+                    <a:endParaRPr lang="pt-PT" dirty="0"/>
+                  </a:p>
+                </p:txBody>
+              </p:sp>
+              <p:sp>
+                <p:nvSpPr>
+                  <p:cNvPr id="100" name="Retângulo 99">
+                    <a:extLst>
+                      <a:ext uri="{FF2B5EF4-FFF2-40B4-BE49-F238E27FC236}">
+                        <a16:creationId xmlns:a16="http://schemas.microsoft.com/office/drawing/2014/main" id="{021985E4-A1D4-971A-B599-8B6D998D8230}"/>
+                      </a:ext>
+                    </a:extLst>
+                  </p:cNvPr>
+                  <p:cNvSpPr/>
+                  <p:nvPr/>
+                </p:nvSpPr>
+                <p:spPr>
+                  <a:xfrm rot="12648134">
+                    <a:off x="5188059" y="803945"/>
+                    <a:ext cx="245862" cy="1227596"/>
+                  </a:xfrm>
+                  <a:prstGeom prst="rect">
+                    <a:avLst/>
+                  </a:prstGeom>
+                  <a:solidFill>
+                    <a:schemeClr val="bg2">
+                      <a:lumMod val="50000"/>
+                    </a:schemeClr>
+                  </a:solidFill>
+                  <a:ln>
+                    <a:solidFill>
+                      <a:schemeClr val="bg2">
+                        <a:lumMod val="50000"/>
+                      </a:schemeClr>
+                    </a:solidFill>
+                  </a:ln>
+                </p:spPr>
+                <p:style>
+                  <a:lnRef idx="2">
+                    <a:schemeClr val="accent1">
+                      <a:shade val="50000"/>
+                    </a:schemeClr>
+                  </a:lnRef>
+                  <a:fillRef idx="1">
+                    <a:schemeClr val="accent1"/>
+                  </a:fillRef>
+                  <a:effectRef idx="0">
+                    <a:schemeClr val="accent1"/>
+                  </a:effectRef>
+                  <a:fontRef idx="minor">
+                    <a:schemeClr val="lt1"/>
+                  </a:fontRef>
+                </p:style>
+                <p:txBody>
+                  <a:bodyPr rtlCol="0" anchor="ctr"/>
+                  <a:lstStyle/>
+                  <a:p>
+                    <a:pPr algn="ctr"/>
+                    <a:endParaRPr lang="pt-PT" dirty="0"/>
+                  </a:p>
+                </p:txBody>
+              </p:sp>
+            </p:grpSp>
+            <p:sp>
+              <p:nvSpPr>
+                <p:cNvPr id="105" name="CaixaDeTexto 104">
+                  <a:extLst>
+                    <a:ext uri="{FF2B5EF4-FFF2-40B4-BE49-F238E27FC236}">
+                      <a16:creationId xmlns:a16="http://schemas.microsoft.com/office/drawing/2014/main" id="{B3AF3909-C915-C07B-1D65-8308A8D5707F}"/>
+                    </a:ext>
+                  </a:extLst>
+                </p:cNvPr>
+                <p:cNvSpPr txBox="1"/>
+                <p:nvPr/>
+              </p:nvSpPr>
+              <p:spPr>
+                <a:xfrm>
+                  <a:off x="2406097" y="3301030"/>
+                  <a:ext cx="1783469" cy="246221"/>
+                </a:xfrm>
+                <a:prstGeom prst="rect">
+                  <a:avLst/>
+                </a:prstGeom>
+                <a:noFill/>
+              </p:spPr>
+              <p:txBody>
+                <a:bodyPr wrap="square" rtlCol="0">
+                  <a:spAutoFit/>
+                </a:bodyPr>
+                <a:lstStyle/>
+                <a:p>
+                  <a:r>
+                    <a:rPr lang="pt-PT" sz="1000" dirty="0"/>
+                    <a:t>-</a:t>
+                  </a:r>
+                  <a:r>
+                    <a:rPr lang="pt-PT" sz="800" dirty="0"/>
+                    <a:t>Rotor Elétrico</a:t>
+                  </a:r>
+                </a:p>
+              </p:txBody>
+            </p:sp>
+          </p:grpSp>
+          <p:sp>
+            <p:nvSpPr>
+              <p:cNvPr id="2" name="Arrow: Right 1">
+                <a:extLst>
+                  <a:ext uri="{FF2B5EF4-FFF2-40B4-BE49-F238E27FC236}">
+                    <a16:creationId xmlns:a16="http://schemas.microsoft.com/office/drawing/2014/main" id="{5C823BAD-FE97-4FD1-8815-5BA34DC4F792}"/>
+                  </a:ext>
+                </a:extLst>
+              </p:cNvPr>
+              <p:cNvSpPr/>
+              <p:nvPr/>
+            </p:nvSpPr>
+            <p:spPr>
+              <a:xfrm>
+                <a:off x="4103532" y="4814222"/>
+                <a:ext cx="2254840" cy="51081"/>
+              </a:xfrm>
+              <a:prstGeom prst="rightArrow">
+                <a:avLst/>
+              </a:prstGeom>
+            </p:spPr>
+            <p:style>
+              <a:lnRef idx="2">
+                <a:schemeClr val="accent1">
+                  <a:shade val="50000"/>
+                </a:schemeClr>
+              </a:lnRef>
+              <a:fillRef idx="1">
+                <a:schemeClr val="accent1"/>
+              </a:fillRef>
+              <a:effectRef idx="0">
+                <a:schemeClr val="accent1"/>
+              </a:effectRef>
+              <a:fontRef idx="minor">
+                <a:schemeClr val="lt1"/>
+              </a:fontRef>
+            </p:style>
+            <p:txBody>
+              <a:bodyPr rtlCol="0" anchor="ctr"/>
+              <a:lstStyle/>
+              <a:p>
+                <a:pPr algn="ctr"/>
+                <a:endParaRPr lang="en-US"/>
+              </a:p>
+            </p:txBody>
+          </p:sp>
+          <p:sp>
+            <p:nvSpPr>
+              <p:cNvPr id="4" name="Arrow: Up 3">
+                <a:extLst>
+                  <a:ext uri="{FF2B5EF4-FFF2-40B4-BE49-F238E27FC236}">
+                    <a16:creationId xmlns:a16="http://schemas.microsoft.com/office/drawing/2014/main" id="{16C16668-3A65-41EC-A588-85C0B48AEF43}"/>
+                  </a:ext>
+                </a:extLst>
+              </p:cNvPr>
+              <p:cNvSpPr/>
+              <p:nvPr/>
+            </p:nvSpPr>
+            <p:spPr>
+              <a:xfrm>
+                <a:off x="6684595" y="3929449"/>
+                <a:ext cx="45719" cy="763223"/>
+              </a:xfrm>
+              <a:prstGeom prst="upArrow">
+                <a:avLst/>
+              </a:prstGeom>
+            </p:spPr>
+            <p:style>
+              <a:lnRef idx="2">
+                <a:schemeClr val="accent1">
+                  <a:shade val="50000"/>
+                </a:schemeClr>
+              </a:lnRef>
+              <a:fillRef idx="1">
+                <a:schemeClr val="accent1"/>
+              </a:fillRef>
+              <a:effectRef idx="0">
+                <a:schemeClr val="accent1"/>
+              </a:effectRef>
+              <a:fontRef idx="minor">
+                <a:schemeClr val="lt1"/>
+              </a:fontRef>
+            </p:style>
+            <p:txBody>
+              <a:bodyPr rtlCol="0" anchor="ctr"/>
+              <a:lstStyle/>
+              <a:p>
+                <a:pPr algn="ctr"/>
+                <a:endParaRPr lang="en-US"/>
+              </a:p>
+            </p:txBody>
+          </p:sp>
+          <p:sp>
+            <p:nvSpPr>
+              <p:cNvPr id="76" name="Arrow: Up 75">
+                <a:extLst>
+                  <a:ext uri="{FF2B5EF4-FFF2-40B4-BE49-F238E27FC236}">
+                    <a16:creationId xmlns:a16="http://schemas.microsoft.com/office/drawing/2014/main" id="{F7E56AA2-57EE-444F-85E0-50F0927FFF3F}"/>
+                  </a:ext>
+                </a:extLst>
+              </p:cNvPr>
+              <p:cNvSpPr/>
+              <p:nvPr/>
+            </p:nvSpPr>
+            <p:spPr>
+              <a:xfrm flipV="1">
+                <a:off x="6690568" y="4988194"/>
+                <a:ext cx="45719" cy="763223"/>
+              </a:xfrm>
+              <a:prstGeom prst="upArrow">
+                <a:avLst/>
+              </a:prstGeom>
+            </p:spPr>
+            <p:style>
+              <a:lnRef idx="2">
+                <a:schemeClr val="accent1">
+                  <a:shade val="50000"/>
+                </a:schemeClr>
+              </a:lnRef>
+              <a:fillRef idx="1">
+                <a:schemeClr val="accent1"/>
+              </a:fillRef>
+              <a:effectRef idx="0">
+                <a:schemeClr val="accent1"/>
+              </a:effectRef>
+              <a:fontRef idx="minor">
+                <a:schemeClr val="lt1"/>
+              </a:fontRef>
+            </p:style>
+            <p:txBody>
+              <a:bodyPr rtlCol="0" anchor="ctr"/>
+              <a:lstStyle/>
+              <a:p>
+                <a:pPr algn="ctr"/>
+                <a:endParaRPr lang="en-US"/>
+              </a:p>
+            </p:txBody>
+          </p:sp>
+          <p:sp>
+            <p:nvSpPr>
+              <p:cNvPr id="3" name="Rectangle: Rounded Corners 2">
+                <a:extLst>
+                  <a:ext uri="{FF2B5EF4-FFF2-40B4-BE49-F238E27FC236}">
+                    <a16:creationId xmlns:a16="http://schemas.microsoft.com/office/drawing/2014/main" id="{82613164-6C8C-414E-BBE3-2905814DA228}"/>
+                  </a:ext>
+                </a:extLst>
+              </p:cNvPr>
+              <p:cNvSpPr/>
+              <p:nvPr/>
+            </p:nvSpPr>
+            <p:spPr>
+              <a:xfrm>
+                <a:off x="6453512" y="4139606"/>
+                <a:ext cx="507884" cy="135552"/>
+              </a:xfrm>
+              <a:prstGeom prst="roundRect">
+                <a:avLst/>
+              </a:prstGeom>
+              <a:noFill/>
+            </p:spPr>
+            <p:style>
+              <a:lnRef idx="2">
+                <a:schemeClr val="accent1">
+                  <a:shade val="50000"/>
+                </a:schemeClr>
+              </a:lnRef>
+              <a:fillRef idx="1">
+                <a:schemeClr val="accent1"/>
+              </a:fillRef>
+              <a:effectRef idx="0">
+                <a:schemeClr val="accent1"/>
+              </a:effectRef>
+              <a:fontRef idx="minor">
+                <a:schemeClr val="lt1"/>
+              </a:fontRef>
+            </p:style>
+            <p:txBody>
+              <a:bodyPr rtlCol="0" anchor="ctr"/>
+              <a:lstStyle/>
+              <a:p>
+                <a:pPr algn="ctr"/>
+                <a:endParaRPr lang="en-US"/>
+              </a:p>
+            </p:txBody>
+          </p:sp>
+          <p:sp>
+            <p:nvSpPr>
+              <p:cNvPr id="41" name="Rectangle: Rounded Corners 40">
+                <a:extLst>
+                  <a:ext uri="{FF2B5EF4-FFF2-40B4-BE49-F238E27FC236}">
+                    <a16:creationId xmlns:a16="http://schemas.microsoft.com/office/drawing/2014/main" id="{FF77AF8B-C4BC-4F70-AE81-204F52EE2731}"/>
+                  </a:ext>
+                </a:extLst>
+              </p:cNvPr>
+              <p:cNvSpPr/>
+              <p:nvPr/>
+            </p:nvSpPr>
+            <p:spPr>
+              <a:xfrm>
+                <a:off x="6453512" y="5400989"/>
+                <a:ext cx="507884" cy="135552"/>
+              </a:xfrm>
+              <a:prstGeom prst="roundRect">
+                <a:avLst/>
+              </a:prstGeom>
+              <a:noFill/>
+            </p:spPr>
+            <p:style>
+              <a:lnRef idx="2">
+                <a:schemeClr val="accent1">
+                  <a:shade val="50000"/>
+                </a:schemeClr>
+              </a:lnRef>
+              <a:fillRef idx="1">
+                <a:schemeClr val="accent1"/>
+              </a:fillRef>
+              <a:effectRef idx="0">
+                <a:schemeClr val="accent1"/>
+              </a:effectRef>
+              <a:fontRef idx="minor">
+                <a:schemeClr val="lt1"/>
+              </a:fontRef>
+            </p:style>
+            <p:txBody>
+              <a:bodyPr rtlCol="0" anchor="ctr"/>
+              <a:lstStyle/>
+              <a:p>
+                <a:pPr algn="ctr"/>
+                <a:endParaRPr lang="en-US"/>
+              </a:p>
+            </p:txBody>
+          </p:sp>
+        </p:grpSp>
+        <p:sp>
+          <p:nvSpPr>
+            <p:cNvPr id="44" name="Rectangle: Rounded Corners 43">
+              <a:extLst>
+                <a:ext uri="{FF2B5EF4-FFF2-40B4-BE49-F238E27FC236}">
+                  <a16:creationId xmlns:a16="http://schemas.microsoft.com/office/drawing/2014/main" id="{3595ED5B-6FD7-4D71-97E0-6C882A94A96C}"/>
+                </a:ext>
+              </a:extLst>
+            </p:cNvPr>
+            <p:cNvSpPr/>
+            <p:nvPr/>
+          </p:nvSpPr>
+          <p:spPr>
+            <a:xfrm>
+              <a:off x="1913721" y="3028577"/>
+              <a:ext cx="315777" cy="123865"/>
+            </a:xfrm>
+            <a:prstGeom prst="roundRect">
+              <a:avLst/>
+            </a:prstGeom>
+            <a:noFill/>
+          </p:spPr>
+          <p:style>
+            <a:lnRef idx="2">
+              <a:schemeClr val="accent1">
+                <a:shade val="50000"/>
+              </a:schemeClr>
+            </a:lnRef>
+            <a:fillRef idx="1">
+              <a:schemeClr val="accent1"/>
+            </a:fillRef>
+            <a:effectRef idx="0">
+              <a:schemeClr val="accent1"/>
+            </a:effectRef>
+            <a:fontRef idx="minor">
+              <a:schemeClr val="lt1"/>
+            </a:fontRef>
+          </p:style>
+          <p:txBody>
+            <a:bodyPr rtlCol="0" anchor="ctr"/>
+            <a:lstStyle/>
+            <a:p>
+              <a:pPr algn="ctr"/>
+              <a:endParaRPr lang="en-US"/>
+            </a:p>
+          </p:txBody>
+        </p:sp>
+        <p:sp>
+          <p:nvSpPr>
+            <p:cNvPr id="45" name="CaixaDeTexto 104">
+              <a:extLst>
+                <a:ext uri="{FF2B5EF4-FFF2-40B4-BE49-F238E27FC236}">
+                  <a16:creationId xmlns:a16="http://schemas.microsoft.com/office/drawing/2014/main" id="{05822943-8596-4A61-BFB4-45A83592D1DC}"/>
+                </a:ext>
+              </a:extLst>
+            </p:cNvPr>
+            <p:cNvSpPr txBox="1"/>
+            <p:nvPr/>
+          </p:nvSpPr>
+          <p:spPr>
+            <a:xfrm>
+              <a:off x="2190108" y="2970074"/>
+              <a:ext cx="1783469" cy="246221"/>
+            </a:xfrm>
+            <a:prstGeom prst="rect">
+              <a:avLst/>
+            </a:prstGeom>
+            <a:noFill/>
+          </p:spPr>
+          <p:txBody>
+            <a:bodyPr wrap="square" rtlCol="0">
+              <a:spAutoFit/>
+            </a:bodyPr>
+            <a:lstStyle/>
+            <a:p>
+              <a:r>
+                <a:rPr lang="pt-PT" sz="1000" dirty="0"/>
+                <a:t>-</a:t>
+              </a:r>
+              <a:r>
+                <a:rPr lang="pt-PT" sz="800" dirty="0"/>
+                <a:t>Saída de Emergência</a:t>
+              </a:r>
+            </a:p>
+          </p:txBody>
+        </p:sp>
+      </p:grpSp>
+    </p:spTree>
+    <p:extLst>
+      <p:ext uri="{BB962C8B-B14F-4D97-AF65-F5344CB8AC3E}">
+        <p14:creationId xmlns:p14="http://schemas.microsoft.com/office/powerpoint/2010/main" val="1399795729"/>
       </p:ext>
     </p:extLst>
   </p:cSld>

</xml_diff>